<commit_message>
many fixes, presentation animations
</commit_message>
<xml_diff>
--- a/Praesentation/FMSynthese-Gary.pptx
+++ b/Praesentation/FMSynthese-Gary.pptx
@@ -5,7 +5,7 @@
     <p:sldMasterId id="2147483648" r:id="rId1"/>
   </p:sldMasterIdLst>
   <p:notesMasterIdLst>
-    <p:notesMasterId r:id="rId24"/>
+    <p:notesMasterId r:id="rId25"/>
   </p:notesMasterIdLst>
   <p:sldIdLst>
     <p:sldId id="259" r:id="rId2"/>
@@ -25,11 +25,12 @@
     <p:sldId id="270" r:id="rId16"/>
     <p:sldId id="274" r:id="rId17"/>
     <p:sldId id="273" r:id="rId18"/>
-    <p:sldId id="275" r:id="rId19"/>
-    <p:sldId id="276" r:id="rId20"/>
-    <p:sldId id="279" r:id="rId21"/>
-    <p:sldId id="277" r:id="rId22"/>
-    <p:sldId id="278" r:id="rId23"/>
+    <p:sldId id="280" r:id="rId19"/>
+    <p:sldId id="275" r:id="rId20"/>
+    <p:sldId id="276" r:id="rId21"/>
+    <p:sldId id="279" r:id="rId22"/>
+    <p:sldId id="277" r:id="rId23"/>
+    <p:sldId id="278" r:id="rId24"/>
   </p:sldIdLst>
   <p:sldSz cx="9144000" cy="5143500" type="screen16x9"/>
   <p:notesSz cx="6858000" cy="9144000"/>
@@ -163,7 +164,7 @@
 
 <file path=ppt/commentAuthors.xml><?xml version="1.0" encoding="utf-8"?>
 <p:cmAuthorLst xmlns:a="http://schemas.openxmlformats.org/drawingml/2006/main" xmlns:r="http://schemas.openxmlformats.org/officeDocument/2006/relationships" xmlns:p="http://schemas.openxmlformats.org/presentationml/2006/main">
-  <p:cmAuthor id="1" name="Stefan Gerasch" initials="SG" lastIdx="1" clrIdx="0">
+  <p:cmAuthor id="1" name="Stefan Gerasch" initials="SG" lastIdx="2" clrIdx="0">
     <p:extLst>
       <p:ext uri="{19B8F6BF-5375-455C-9EA6-DF929625EA0E}">
         <p15:presenceInfo xmlns:p15="http://schemas.microsoft.com/office/powerpoint/2012/main" userId="598ddf3b84a370a1" providerId="Windows Live"/>
@@ -175,9 +176,9 @@
 
 <file path=ppt/comments/comment1.xml><?xml version="1.0" encoding="utf-8"?>
 <p:cmLst xmlns:a="http://schemas.openxmlformats.org/drawingml/2006/main" xmlns:r="http://schemas.openxmlformats.org/officeDocument/2006/relationships" xmlns:p="http://schemas.openxmlformats.org/presentationml/2006/main">
-  <p:cm authorId="1" dt="2015-06-19T16:23:17.393" idx="1">
-    <p:pos x="5472" y="756"/>
-    <p:text>Skalierung zu Hochpass anpassen</p:text>
+  <p:cm authorId="1" dt="2015-06-20T12:56:09.904" idx="2">
+    <p:pos x="2098" y="2198"/>
+    <p:text>testen ob man mit dem stift im präsi modus schreiben kann</p:text>
     <p:extLst>
       <p:ext uri="{C676402C-5697-4E1C-873F-D02D1690AC5C}">
         <p15:threadingInfo xmlns:p15="http://schemas.microsoft.com/office/powerpoint/2012/main" timeZoneBias="-120"/>
@@ -270,7 +271,7 @@
             <a:fld id="{364A5697-ABCF-455C-8519-931EFDD64AAA}" type="datetimeFigureOut">
               <a:rPr lang="de-DE" smtClean="0"/>
               <a:pPr/>
-              <a:t>19.06.2015</a:t>
+              <a:t>20.06.2015</a:t>
             </a:fld>
             <a:endParaRPr lang="de-DE"/>
           </a:p>
@@ -711,6 +712,124 @@
 </p:notes>
 </file>
 
+<file path=ppt/notesSlides/notesSlide3.xml><?xml version="1.0" encoding="utf-8"?>
+<p:notes xmlns:a="http://schemas.openxmlformats.org/drawingml/2006/main" xmlns:r="http://schemas.openxmlformats.org/officeDocument/2006/relationships" xmlns:p="http://schemas.openxmlformats.org/presentationml/2006/main">
+  <p:cSld>
+    <p:spTree>
+      <p:nvGrpSpPr>
+        <p:cNvPr id="1" name=""/>
+        <p:cNvGrpSpPr/>
+        <p:nvPr/>
+      </p:nvGrpSpPr>
+      <p:grpSpPr>
+        <a:xfrm>
+          <a:off x="0" y="0"/>
+          <a:ext cx="0" cy="0"/>
+          <a:chOff x="0" y="0"/>
+          <a:chExt cx="0" cy="0"/>
+        </a:xfrm>
+      </p:grpSpPr>
+      <p:sp>
+        <p:nvSpPr>
+          <p:cNvPr id="2" name="Folienbildplatzhalter 1"/>
+          <p:cNvSpPr>
+            <a:spLocks noGrp="1" noRot="1" noChangeAspect="1"/>
+          </p:cNvSpPr>
+          <p:nvPr>
+            <p:ph type="sldImg"/>
+          </p:nvPr>
+        </p:nvSpPr>
+        <p:spPr/>
+      </p:sp>
+      <p:sp>
+        <p:nvSpPr>
+          <p:cNvPr id="3" name="Notizenplatzhalter 2"/>
+          <p:cNvSpPr>
+            <a:spLocks noGrp="1"/>
+          </p:cNvSpPr>
+          <p:nvPr>
+            <p:ph type="body" idx="1"/>
+          </p:nvPr>
+        </p:nvSpPr>
+        <p:spPr/>
+        <p:txBody>
+          <a:bodyPr/>
+          <a:lstStyle/>
+          <a:p>
+            <a:r>
+              <a:rPr lang="de-DE" dirty="0" smtClean="0"/>
+              <a:t>1 = Sample</a:t>
+            </a:r>
+          </a:p>
+          <a:p>
+            <a:r>
+              <a:rPr lang="de-DE" dirty="0" smtClean="0"/>
+              <a:t>2</a:t>
+            </a:r>
+            <a:r>
+              <a:rPr lang="de-DE" baseline="0" dirty="0" smtClean="0"/>
+              <a:t> = FM </a:t>
+            </a:r>
+            <a:r>
+              <a:rPr lang="de-DE" baseline="0" dirty="0" err="1" smtClean="0"/>
+              <a:t>Synth</a:t>
+            </a:r>
+            <a:endParaRPr lang="de-DE" baseline="0" dirty="0" smtClean="0"/>
+          </a:p>
+          <a:p>
+            <a:r>
+              <a:rPr lang="de-DE" baseline="0" dirty="0" smtClean="0"/>
+              <a:t>3 = FM8</a:t>
+            </a:r>
+          </a:p>
+          <a:p>
+            <a:r>
+              <a:rPr lang="de-DE" baseline="0" dirty="0" smtClean="0"/>
+              <a:t>4 = Original</a:t>
+            </a:r>
+          </a:p>
+          <a:p>
+            <a:endParaRPr lang="en-US" dirty="0"/>
+          </a:p>
+        </p:txBody>
+      </p:sp>
+      <p:sp>
+        <p:nvSpPr>
+          <p:cNvPr id="4" name="Foliennummernplatzhalter 3"/>
+          <p:cNvSpPr>
+            <a:spLocks noGrp="1"/>
+          </p:cNvSpPr>
+          <p:nvPr>
+            <p:ph type="sldNum" sz="quarter" idx="10"/>
+          </p:nvPr>
+        </p:nvSpPr>
+        <p:spPr/>
+        <p:txBody>
+          <a:bodyPr/>
+          <a:lstStyle/>
+          <a:p>
+            <a:fld id="{B162E40F-E87F-4C0D-9DAF-92DD7B84B6D5}" type="slidenum">
+              <a:rPr lang="de-DE" smtClean="0"/>
+              <a:pPr/>
+              <a:t>18</a:t>
+            </a:fld>
+            <a:endParaRPr lang="de-DE"/>
+          </a:p>
+        </p:txBody>
+      </p:sp>
+    </p:spTree>
+    <p:extLst>
+      <p:ext uri="{BB962C8B-B14F-4D97-AF65-F5344CB8AC3E}">
+        <p14:creationId xmlns:p14="http://schemas.microsoft.com/office/powerpoint/2010/main" val="4211575174"/>
+      </p:ext>
+    </p:extLst>
+  </p:cSld>
+  <p:clrMapOvr>
+    <a:masterClrMapping/>
+  </p:clrMapOvr>
+</p:notes>
+</file>
+
 <file path=ppt/slideLayouts/slideLayout1.xml><?xml version="1.0" encoding="utf-8"?>
 <p:sldLayout xmlns:a="http://schemas.openxmlformats.org/drawingml/2006/main" xmlns:r="http://schemas.openxmlformats.org/officeDocument/2006/relationships" xmlns:p="http://schemas.openxmlformats.org/presentationml/2006/main" preserve="1" userDrawn="1">
   <p:cSld name="Titelfolie">
@@ -924,7 +1043,7 @@
           <a:p>
             <a:fld id="{296000BE-0612-4D88-A1AC-FF1287139C2E}" type="datetime1">
               <a:rPr lang="de-DE" smtClean="0"/>
-              <a:t>19.06.2015</a:t>
+              <a:t>20.06.2015</a:t>
             </a:fld>
             <a:endParaRPr lang="de-DE" dirty="0"/>
           </a:p>
@@ -986,6 +1105,18 @@
   <p:clrMapOvr>
     <a:masterClrMapping/>
   </p:clrMapOvr>
+  <mc:AlternateContent xmlns:mc="http://schemas.openxmlformats.org/markup-compatibility/2006">
+    <mc:Choice xmlns:p14="http://schemas.microsoft.com/office/powerpoint/2010/main" Requires="p14">
+      <p:transition spd="med" p14:dur="700">
+        <p:fade/>
+      </p:transition>
+    </mc:Choice>
+    <mc:Fallback>
+      <p:transition spd="med">
+        <p:fade/>
+      </p:transition>
+    </mc:Fallback>
+  </mc:AlternateContent>
   <p:timing>
     <p:tnLst>
       <p:par>
@@ -1105,7 +1236,7 @@
           <a:p>
             <a:fld id="{118C39E7-DE90-41C1-AA3B-F993836B02BE}" type="datetime1">
               <a:rPr lang="de-DE" smtClean="0"/>
-              <a:t>19.06.2015</a:t>
+              <a:t>20.06.2015</a:t>
             </a:fld>
             <a:endParaRPr lang="de-DE"/>
           </a:p>
@@ -1163,6 +1294,18 @@
   <p:clrMapOvr>
     <a:masterClrMapping/>
   </p:clrMapOvr>
+  <mc:AlternateContent xmlns:mc="http://schemas.openxmlformats.org/markup-compatibility/2006">
+    <mc:Choice xmlns:p14="http://schemas.microsoft.com/office/powerpoint/2010/main" Requires="p14">
+      <p:transition spd="med" p14:dur="700">
+        <p:fade/>
+      </p:transition>
+    </mc:Choice>
+    <mc:Fallback>
+      <p:transition spd="med">
+        <p:fade/>
+      </p:transition>
+    </mc:Fallback>
+  </mc:AlternateContent>
 </p:sldLayout>
 </file>
 
@@ -1285,7 +1428,7 @@
           <a:p>
             <a:fld id="{B1B93457-8CBC-4CBC-AFA6-88355C5DAFDC}" type="datetime1">
               <a:rPr lang="de-DE" smtClean="0"/>
-              <a:t>19.06.2015</a:t>
+              <a:t>20.06.2015</a:t>
             </a:fld>
             <a:endParaRPr lang="de-DE"/>
           </a:p>
@@ -1343,6 +1486,18 @@
   <p:clrMapOvr>
     <a:masterClrMapping/>
   </p:clrMapOvr>
+  <mc:AlternateContent xmlns:mc="http://schemas.openxmlformats.org/markup-compatibility/2006">
+    <mc:Choice xmlns:p14="http://schemas.microsoft.com/office/powerpoint/2010/main" Requires="p14">
+      <p:transition spd="med" p14:dur="700">
+        <p:fade/>
+      </p:transition>
+    </mc:Choice>
+    <mc:Fallback>
+      <p:transition spd="med">
+        <p:fade/>
+      </p:transition>
+    </mc:Fallback>
+  </mc:AlternateContent>
 </p:sldLayout>
 </file>
 
@@ -1463,7 +1618,7 @@
           <a:p>
             <a:fld id="{296000BE-0612-4D88-A1AC-FF1287139C2E}" type="datetime1">
               <a:rPr lang="de-DE" smtClean="0"/>
-              <a:t>19.06.2015</a:t>
+              <a:t>20.06.2015</a:t>
             </a:fld>
             <a:endParaRPr lang="de-DE" dirty="0"/>
           </a:p>
@@ -1524,6 +1679,18 @@
   <p:clrMapOvr>
     <a:masterClrMapping/>
   </p:clrMapOvr>
+  <mc:AlternateContent xmlns:mc="http://schemas.openxmlformats.org/markup-compatibility/2006">
+    <mc:Choice xmlns:p14="http://schemas.microsoft.com/office/powerpoint/2010/main" Requires="p14">
+      <p:transition spd="med" p14:dur="700">
+        <p:fade/>
+      </p:transition>
+    </mc:Choice>
+    <mc:Fallback>
+      <p:transition spd="med">
+        <p:fade/>
+      </p:transition>
+    </mc:Fallback>
+  </mc:AlternateContent>
   <p:timing>
     <p:tnLst>
       <p:par>
@@ -1719,7 +1886,7 @@
           <a:p>
             <a:fld id="{C80D71F6-99A2-4718-B360-65885A8D0927}" type="datetime1">
               <a:rPr lang="de-DE" smtClean="0"/>
-              <a:t>19.06.2015</a:t>
+              <a:t>20.06.2015</a:t>
             </a:fld>
             <a:endParaRPr lang="de-DE"/>
           </a:p>
@@ -1777,6 +1944,18 @@
   <p:clrMapOvr>
     <a:masterClrMapping/>
   </p:clrMapOvr>
+  <mc:AlternateContent xmlns:mc="http://schemas.openxmlformats.org/markup-compatibility/2006">
+    <mc:Choice xmlns:p14="http://schemas.microsoft.com/office/powerpoint/2010/main" Requires="p14">
+      <p:transition spd="med" p14:dur="700">
+        <p:fade/>
+      </p:transition>
+    </mc:Choice>
+    <mc:Fallback>
+      <p:transition spd="med">
+        <p:fade/>
+      </p:transition>
+    </mc:Fallback>
+  </mc:AlternateContent>
   <p:timing>
     <p:tnLst>
       <p:par>
@@ -2014,7 +2193,7 @@
           <a:p>
             <a:fld id="{29DA34F2-331A-4BAF-BC0B-E5952E369A92}" type="datetime1">
               <a:rPr lang="de-DE" smtClean="0"/>
-              <a:t>19.06.2015</a:t>
+              <a:t>20.06.2015</a:t>
             </a:fld>
             <a:endParaRPr lang="de-DE"/>
           </a:p>
@@ -2072,6 +2251,18 @@
   <p:clrMapOvr>
     <a:masterClrMapping/>
   </p:clrMapOvr>
+  <mc:AlternateContent xmlns:mc="http://schemas.openxmlformats.org/markup-compatibility/2006">
+    <mc:Choice xmlns:p14="http://schemas.microsoft.com/office/powerpoint/2010/main" Requires="p14">
+      <p:transition spd="med" p14:dur="700">
+        <p:fade/>
+      </p:transition>
+    </mc:Choice>
+    <mc:Fallback>
+      <p:transition spd="med">
+        <p:fade/>
+      </p:transition>
+    </mc:Fallback>
+  </mc:AlternateContent>
   <p:timing>
     <p:tnLst>
       <p:par>
@@ -2443,7 +2634,7 @@
           <a:p>
             <a:fld id="{6E10866E-AA72-4753-8ABE-452D5C085871}" type="datetime1">
               <a:rPr lang="de-DE" smtClean="0"/>
-              <a:t>19.06.2015</a:t>
+              <a:t>20.06.2015</a:t>
             </a:fld>
             <a:endParaRPr lang="de-DE"/>
           </a:p>
@@ -2501,6 +2692,18 @@
   <p:clrMapOvr>
     <a:masterClrMapping/>
   </p:clrMapOvr>
+  <mc:AlternateContent xmlns:mc="http://schemas.openxmlformats.org/markup-compatibility/2006">
+    <mc:Choice xmlns:p14="http://schemas.microsoft.com/office/powerpoint/2010/main" Requires="p14">
+      <p:transition spd="med" p14:dur="700">
+        <p:fade/>
+      </p:transition>
+    </mc:Choice>
+    <mc:Fallback>
+      <p:transition spd="med">
+        <p:fade/>
+      </p:transition>
+    </mc:Fallback>
+  </mc:AlternateContent>
   <p:timing>
     <p:tnLst>
       <p:par>
@@ -2568,7 +2771,7 @@
           <a:p>
             <a:fld id="{A782DF66-3609-46AF-9A5C-DF0EDD34A7DB}" type="datetime1">
               <a:rPr lang="de-DE" smtClean="0"/>
-              <a:t>19.06.2015</a:t>
+              <a:t>20.06.2015</a:t>
             </a:fld>
             <a:endParaRPr lang="de-DE"/>
           </a:p>
@@ -2626,6 +2829,18 @@
   <p:clrMapOvr>
     <a:masterClrMapping/>
   </p:clrMapOvr>
+  <mc:AlternateContent xmlns:mc="http://schemas.openxmlformats.org/markup-compatibility/2006">
+    <mc:Choice xmlns:p14="http://schemas.microsoft.com/office/powerpoint/2010/main" Requires="p14">
+      <p:transition spd="med" p14:dur="700">
+        <p:fade/>
+      </p:transition>
+    </mc:Choice>
+    <mc:Fallback>
+      <p:transition spd="med">
+        <p:fade/>
+      </p:transition>
+    </mc:Fallback>
+  </mc:AlternateContent>
 </p:sldLayout>
 </file>
 
@@ -2663,7 +2878,7 @@
           <a:p>
             <a:fld id="{D9A33BE7-191D-4D84-96A8-D32FBF7D1E60}" type="datetime1">
               <a:rPr lang="de-DE" smtClean="0"/>
-              <a:t>19.06.2015</a:t>
+              <a:t>20.06.2015</a:t>
             </a:fld>
             <a:endParaRPr lang="de-DE"/>
           </a:p>
@@ -2721,6 +2936,18 @@
   <p:clrMapOvr>
     <a:masterClrMapping/>
   </p:clrMapOvr>
+  <mc:AlternateContent xmlns:mc="http://schemas.openxmlformats.org/markup-compatibility/2006">
+    <mc:Choice xmlns:p14="http://schemas.microsoft.com/office/powerpoint/2010/main" Requires="p14">
+      <p:transition spd="med" p14:dur="700">
+        <p:fade/>
+      </p:transition>
+    </mc:Choice>
+    <mc:Fallback>
+      <p:transition spd="med">
+        <p:fade/>
+      </p:transition>
+    </mc:Fallback>
+  </mc:AlternateContent>
 </p:sldLayout>
 </file>
 
@@ -2940,7 +3167,7 @@
           <a:p>
             <a:fld id="{B525E46A-CAE0-47F8-9D57-934823E6F137}" type="datetime1">
               <a:rPr lang="de-DE" smtClean="0"/>
-              <a:t>19.06.2015</a:t>
+              <a:t>20.06.2015</a:t>
             </a:fld>
             <a:endParaRPr lang="de-DE"/>
           </a:p>
@@ -2998,6 +3225,18 @@
   <p:clrMapOvr>
     <a:masterClrMapping/>
   </p:clrMapOvr>
+  <mc:AlternateContent xmlns:mc="http://schemas.openxmlformats.org/markup-compatibility/2006">
+    <mc:Choice xmlns:p14="http://schemas.microsoft.com/office/powerpoint/2010/main" Requires="p14">
+      <p:transition spd="med" p14:dur="700">
+        <p:fade/>
+      </p:transition>
+    </mc:Choice>
+    <mc:Fallback>
+      <p:transition spd="med">
+        <p:fade/>
+      </p:transition>
+    </mc:Fallback>
+  </mc:AlternateContent>
 </p:sldLayout>
 </file>
 
@@ -3193,7 +3432,7 @@
           <a:p>
             <a:fld id="{A77F82AC-1FA4-4A3F-9E15-2C049775FF58}" type="datetime1">
               <a:rPr lang="de-DE" smtClean="0"/>
-              <a:t>19.06.2015</a:t>
+              <a:t>20.06.2015</a:t>
             </a:fld>
             <a:endParaRPr lang="de-DE"/>
           </a:p>
@@ -3251,6 +3490,18 @@
   <p:clrMapOvr>
     <a:masterClrMapping/>
   </p:clrMapOvr>
+  <mc:AlternateContent xmlns:mc="http://schemas.openxmlformats.org/markup-compatibility/2006">
+    <mc:Choice xmlns:p14="http://schemas.microsoft.com/office/powerpoint/2010/main" Requires="p14">
+      <p:transition spd="med" p14:dur="700">
+        <p:fade/>
+      </p:transition>
+    </mc:Choice>
+    <mc:Fallback>
+      <p:transition spd="med">
+        <p:fade/>
+      </p:transition>
+    </mc:Fallback>
+  </mc:AlternateContent>
 </p:sldLayout>
 </file>
 
@@ -3406,7 +3657,7 @@
           <a:p>
             <a:fld id="{296000BE-0612-4D88-A1AC-FF1287139C2E}" type="datetime1">
               <a:rPr lang="de-DE" smtClean="0"/>
-              <a:t>19.06.2015</a:t>
+              <a:t>20.06.2015</a:t>
             </a:fld>
             <a:endParaRPr lang="de-DE" dirty="0"/>
           </a:p>
@@ -3539,6 +3790,18 @@
     <p:sldLayoutId id="2147483658" r:id="rId10"/>
     <p:sldLayoutId id="2147483659" r:id="rId11"/>
   </p:sldLayoutIdLst>
+  <mc:AlternateContent xmlns:mc="http://schemas.openxmlformats.org/markup-compatibility/2006">
+    <mc:Choice xmlns:p14="http://schemas.microsoft.com/office/powerpoint/2010/main" Requires="p14">
+      <p:transition spd="med" p14:dur="700">
+        <p:fade/>
+      </p:transition>
+    </mc:Choice>
+    <mc:Fallback>
+      <p:transition spd="med">
+        <p:fade/>
+      </p:transition>
+    </mc:Fallback>
+  </mc:AlternateContent>
   <p:timing>
     <p:tnLst>
       <p:par>
@@ -3889,6 +4152,18 @@
   <p:clrMapOvr>
     <a:masterClrMapping/>
   </p:clrMapOvr>
+  <mc:AlternateContent xmlns:mc="http://schemas.openxmlformats.org/markup-compatibility/2006">
+    <mc:Choice xmlns:p14="http://schemas.microsoft.com/office/powerpoint/2010/main" Requires="p14">
+      <p:transition spd="med" p14:dur="700">
+        <p:fade/>
+      </p:transition>
+    </mc:Choice>
+    <mc:Fallback>
+      <p:transition spd="med">
+        <p:fade/>
+      </p:transition>
+    </mc:Fallback>
+  </mc:AlternateContent>
   <p:timing>
     <p:tnLst>
       <p:par>
@@ -3979,7 +4254,7 @@
           <a:p>
             <a:fld id="{296000BE-0612-4D88-A1AC-FF1287139C2E}" type="datetime1">
               <a:rPr lang="de-DE" smtClean="0"/>
-              <a:t>19.06.2015</a:t>
+              <a:t>20.06.2015</a:t>
             </a:fld>
             <a:endParaRPr lang="de-DE" dirty="0"/>
           </a:p>
@@ -4075,6 +4350,18 @@
   <p:clrMapOvr>
     <a:masterClrMapping/>
   </p:clrMapOvr>
+  <mc:AlternateContent xmlns:mc="http://schemas.openxmlformats.org/markup-compatibility/2006">
+    <mc:Choice xmlns:p14="http://schemas.microsoft.com/office/powerpoint/2010/main" Requires="p14">
+      <p:transition spd="med" p14:dur="700">
+        <p:fade/>
+      </p:transition>
+    </mc:Choice>
+    <mc:Fallback>
+      <p:transition spd="med">
+        <p:fade/>
+      </p:transition>
+    </mc:Fallback>
+  </mc:AlternateContent>
   <p:timing>
     <p:tnLst>
       <p:par>
@@ -4165,7 +4452,7 @@
           <a:p>
             <a:fld id="{296000BE-0612-4D88-A1AC-FF1287139C2E}" type="datetime1">
               <a:rPr lang="de-DE" smtClean="0"/>
-              <a:t>19.06.2015</a:t>
+              <a:t>20.06.2015</a:t>
             </a:fld>
             <a:endParaRPr lang="de-DE" dirty="0"/>
           </a:p>
@@ -4261,6 +4548,18 @@
   <p:clrMapOvr>
     <a:masterClrMapping/>
   </p:clrMapOvr>
+  <mc:AlternateContent xmlns:mc="http://schemas.openxmlformats.org/markup-compatibility/2006">
+    <mc:Choice xmlns:p14="http://schemas.microsoft.com/office/powerpoint/2010/main" Requires="p14">
+      <p:transition spd="med" p14:dur="700">
+        <p:fade/>
+      </p:transition>
+    </mc:Choice>
+    <mc:Fallback>
+      <p:transition spd="med">
+        <p:fade/>
+      </p:transition>
+    </mc:Fallback>
+  </mc:AlternateContent>
   <p:timing>
     <p:tnLst>
       <p:par>
@@ -4351,7 +4650,7 @@
           <a:p>
             <a:fld id="{296000BE-0612-4D88-A1AC-FF1287139C2E}" type="datetime1">
               <a:rPr lang="de-DE" smtClean="0"/>
-              <a:t>19.06.2015</a:t>
+              <a:t>20.06.2015</a:t>
             </a:fld>
             <a:endParaRPr lang="de-DE" dirty="0"/>
           </a:p>
@@ -4447,6 +4746,18 @@
   <p:clrMapOvr>
     <a:masterClrMapping/>
   </p:clrMapOvr>
+  <mc:AlternateContent xmlns:mc="http://schemas.openxmlformats.org/markup-compatibility/2006">
+    <mc:Choice xmlns:p14="http://schemas.microsoft.com/office/powerpoint/2010/main" Requires="p14">
+      <p:transition spd="med" p14:dur="700">
+        <p:fade/>
+      </p:transition>
+    </mc:Choice>
+    <mc:Fallback>
+      <p:transition spd="med">
+        <p:fade/>
+      </p:transition>
+    </mc:Fallback>
+  </mc:AlternateContent>
   <p:timing>
     <p:tnLst>
       <p:par>
@@ -4537,7 +4848,7 @@
           <a:p>
             <a:fld id="{296000BE-0612-4D88-A1AC-FF1287139C2E}" type="datetime1">
               <a:rPr lang="de-DE" smtClean="0"/>
-              <a:t>19.06.2015</a:t>
+              <a:t>20.06.2015</a:t>
             </a:fld>
             <a:endParaRPr lang="de-DE" dirty="0"/>
           </a:p>
@@ -4633,6 +4944,18 @@
   <p:clrMapOvr>
     <a:masterClrMapping/>
   </p:clrMapOvr>
+  <mc:AlternateContent xmlns:mc="http://schemas.openxmlformats.org/markup-compatibility/2006">
+    <mc:Choice xmlns:p14="http://schemas.microsoft.com/office/powerpoint/2010/main" Requires="p14">
+      <p:transition spd="med" p14:dur="700">
+        <p:fade/>
+      </p:transition>
+    </mc:Choice>
+    <mc:Fallback>
+      <p:transition spd="med">
+        <p:fade/>
+      </p:transition>
+    </mc:Fallback>
+  </mc:AlternateContent>
   <p:timing>
     <p:tnLst>
       <p:par>
@@ -4723,7 +5046,7 @@
           <a:p>
             <a:fld id="{296000BE-0612-4D88-A1AC-FF1287139C2E}" type="datetime1">
               <a:rPr lang="de-DE" smtClean="0"/>
-              <a:t>19.06.2015</a:t>
+              <a:t>20.06.2015</a:t>
             </a:fld>
             <a:endParaRPr lang="de-DE" dirty="0"/>
           </a:p>
@@ -4819,6 +5142,18 @@
   <p:clrMapOvr>
     <a:masterClrMapping/>
   </p:clrMapOvr>
+  <mc:AlternateContent xmlns:mc="http://schemas.openxmlformats.org/markup-compatibility/2006">
+    <mc:Choice xmlns:p14="http://schemas.microsoft.com/office/powerpoint/2010/main" Requires="p14">
+      <p:transition spd="med" p14:dur="700">
+        <p:fade/>
+      </p:transition>
+    </mc:Choice>
+    <mc:Fallback>
+      <p:transition spd="med">
+        <p:fade/>
+      </p:transition>
+    </mc:Fallback>
+  </mc:AlternateContent>
   <p:timing>
     <p:tnLst>
       <p:par>
@@ -4909,7 +5244,7 @@
           <a:p>
             <a:fld id="{296000BE-0612-4D88-A1AC-FF1287139C2E}" type="datetime1">
               <a:rPr lang="de-DE" smtClean="0"/>
-              <a:t>19.06.2015</a:t>
+              <a:t>20.06.2015</a:t>
             </a:fld>
             <a:endParaRPr lang="de-DE" dirty="0"/>
           </a:p>
@@ -5005,6 +5340,18 @@
   <p:clrMapOvr>
     <a:masterClrMapping/>
   </p:clrMapOvr>
+  <mc:AlternateContent xmlns:mc="http://schemas.openxmlformats.org/markup-compatibility/2006">
+    <mc:Choice xmlns:p14="http://schemas.microsoft.com/office/powerpoint/2010/main" Requires="p14">
+      <p:transition spd="med" p14:dur="700">
+        <p:fade/>
+      </p:transition>
+    </mc:Choice>
+    <mc:Fallback>
+      <p:transition spd="med">
+        <p:fade/>
+      </p:transition>
+    </mc:Fallback>
+  </mc:AlternateContent>
   <p:timing>
     <p:tnLst>
       <p:par>
@@ -5101,7 +5448,7 @@
           <a:p>
             <a:fld id="{296000BE-0612-4D88-A1AC-FF1287139C2E}" type="datetime1">
               <a:rPr lang="de-DE" smtClean="0"/>
-              <a:t>19.06.2015</a:t>
+              <a:t>20.06.2015</a:t>
             </a:fld>
             <a:endParaRPr lang="de-DE" dirty="0"/>
           </a:p>
@@ -5221,12 +5568,138 @@
   <p:clrMapOvr>
     <a:masterClrMapping/>
   </p:clrMapOvr>
+  <mc:AlternateContent xmlns:mc="http://schemas.openxmlformats.org/markup-compatibility/2006">
+    <mc:Choice xmlns:p14="http://schemas.microsoft.com/office/powerpoint/2010/main" Requires="p14">
+      <p:transition spd="med" p14:dur="700">
+        <p:fade/>
+      </p:transition>
+    </mc:Choice>
+    <mc:Fallback>
+      <p:transition spd="med">
+        <p:fade/>
+      </p:transition>
+    </mc:Fallback>
+  </mc:AlternateContent>
   <p:timing>
     <p:tnLst>
       <p:par>
-        <p:cTn id="1" dur="indefinite" restart="never" nodeType="tmRoot"/>
+        <p:cTn id="1" dur="indefinite" restart="never" nodeType="tmRoot">
+          <p:childTnLst>
+            <p:seq concurrent="1" nextAc="seek">
+              <p:cTn id="2" dur="indefinite" nodeType="mainSeq">
+                <p:childTnLst>
+                  <p:par>
+                    <p:cTn id="3" fill="hold">
+                      <p:stCondLst>
+                        <p:cond delay="indefinite"/>
+                      </p:stCondLst>
+                      <p:childTnLst>
+                        <p:par>
+                          <p:cTn id="4" fill="hold">
+                            <p:stCondLst>
+                              <p:cond delay="0"/>
+                            </p:stCondLst>
+                            <p:childTnLst>
+                              <p:par>
+                                <p:cTn id="5" presetID="10" presetClass="entr" presetSubtype="0" fill="hold" nodeType="clickEffect">
+                                  <p:stCondLst>
+                                    <p:cond delay="0"/>
+                                  </p:stCondLst>
+                                  <p:childTnLst>
+                                    <p:set>
+                                      <p:cBhvr>
+                                        <p:cTn id="6" dur="1" fill="hold">
+                                          <p:stCondLst>
+                                            <p:cond delay="0"/>
+                                          </p:stCondLst>
+                                        </p:cTn>
+                                        <p:tgtEl>
+                                          <p:spTgt spid="7"/>
+                                        </p:tgtEl>
+                                        <p:attrNameLst>
+                                          <p:attrName>style.visibility</p:attrName>
+                                        </p:attrNameLst>
+                                      </p:cBhvr>
+                                      <p:to>
+                                        <p:strVal val="visible"/>
+                                      </p:to>
+                                    </p:set>
+                                    <p:animEffect transition="in" filter="fade">
+                                      <p:cBhvr>
+                                        <p:cTn id="7" dur="500"/>
+                                        <p:tgtEl>
+                                          <p:spTgt spid="7"/>
+                                        </p:tgtEl>
+                                      </p:cBhvr>
+                                    </p:animEffect>
+                                  </p:childTnLst>
+                                </p:cTn>
+                              </p:par>
+                              <p:par>
+                                <p:cTn id="8" presetID="10" presetClass="entr" presetSubtype="0" fill="hold" grpId="0" nodeType="withEffect">
+                                  <p:stCondLst>
+                                    <p:cond delay="0"/>
+                                  </p:stCondLst>
+                                  <p:childTnLst>
+                                    <p:set>
+                                      <p:cBhvr>
+                                        <p:cTn id="9" dur="1" fill="hold">
+                                          <p:stCondLst>
+                                            <p:cond delay="0"/>
+                                          </p:stCondLst>
+                                        </p:cTn>
+                                        <p:tgtEl>
+                                          <p:spTgt spid="8"/>
+                                        </p:tgtEl>
+                                        <p:attrNameLst>
+                                          <p:attrName>style.visibility</p:attrName>
+                                        </p:attrNameLst>
+                                      </p:cBhvr>
+                                      <p:to>
+                                        <p:strVal val="visible"/>
+                                      </p:to>
+                                    </p:set>
+                                    <p:animEffect transition="in" filter="fade">
+                                      <p:cBhvr>
+                                        <p:cTn id="10" dur="500"/>
+                                        <p:tgtEl>
+                                          <p:spTgt spid="8"/>
+                                        </p:tgtEl>
+                                      </p:cBhvr>
+                                    </p:animEffect>
+                                  </p:childTnLst>
+                                </p:cTn>
+                              </p:par>
+                            </p:childTnLst>
+                          </p:cTn>
+                        </p:par>
+                      </p:childTnLst>
+                    </p:cTn>
+                  </p:par>
+                </p:childTnLst>
+              </p:cTn>
+              <p:prevCondLst>
+                <p:cond evt="onPrev" delay="0">
+                  <p:tgtEl>
+                    <p:sldTgt/>
+                  </p:tgtEl>
+                </p:cond>
+              </p:prevCondLst>
+              <p:nextCondLst>
+                <p:cond evt="onNext" delay="0">
+                  <p:tgtEl>
+                    <p:sldTgt/>
+                  </p:tgtEl>
+                </p:cond>
+              </p:nextCondLst>
+            </p:seq>
+          </p:childTnLst>
+        </p:cTn>
       </p:par>
     </p:tnLst>
+    <p:bldLst>
+      <p:bldP spid="8" grpId="0"/>
+    </p:bldLst>
   </p:timing>
 </p:sld>
 </file>
@@ -5311,7 +5784,7 @@
           <a:p>
             <a:fld id="{296000BE-0612-4D88-A1AC-FF1287139C2E}" type="datetime1">
               <a:rPr lang="de-DE" smtClean="0"/>
-              <a:t>19.06.2015</a:t>
+              <a:t>20.06.2015</a:t>
             </a:fld>
             <a:endParaRPr lang="de-DE" dirty="0"/>
           </a:p>
@@ -5377,6 +5850,18 @@
   <p:clrMapOvr>
     <a:masterClrMapping/>
   </p:clrMapOvr>
+  <mc:AlternateContent xmlns:mc="http://schemas.openxmlformats.org/markup-compatibility/2006">
+    <mc:Choice xmlns:p14="http://schemas.microsoft.com/office/powerpoint/2010/main" Requires="p14">
+      <p:transition spd="med" p14:dur="700">
+        <p:fade/>
+      </p:transition>
+    </mc:Choice>
+    <mc:Fallback>
+      <p:transition spd="med">
+        <p:fade/>
+      </p:transition>
+    </mc:Fallback>
+  </mc:AlternateContent>
   <p:timing>
     <p:tnLst>
       <p:par>
@@ -5420,12 +5905,8 @@
           <a:lstStyle/>
           <a:p>
             <a:r>
-              <a:rPr lang="de-DE" dirty="0"/>
-              <a:t>FM-Synthesizer in C</a:t>
-            </a:r>
-            <a:r>
               <a:rPr lang="de-DE" dirty="0" smtClean="0"/>
-              <a:t>++</a:t>
+              <a:t>Hörbeispiele</a:t>
             </a:r>
             <a:endParaRPr lang="en-US" dirty="0"/>
           </a:p>
@@ -5433,25 +5914,6 @@
       </p:sp>
       <p:sp>
         <p:nvSpPr>
-          <p:cNvPr id="2" name="Textplatzhalter 1"/>
-          <p:cNvSpPr>
-            <a:spLocks noGrp="1"/>
-          </p:cNvSpPr>
-          <p:nvPr>
-            <p:ph type="body" idx="1"/>
-          </p:nvPr>
-        </p:nvSpPr>
-        <p:spPr/>
-        <p:txBody>
-          <a:bodyPr/>
-          <a:lstStyle/>
-          <a:p>
-            <a:endParaRPr lang="en-US"/>
-          </a:p>
-        </p:txBody>
-      </p:sp>
-      <p:sp>
-        <p:nvSpPr>
           <p:cNvPr id="4" name="Datumsplatzhalter 3"/>
           <p:cNvSpPr>
             <a:spLocks noGrp="1"/>
@@ -5465,11 +5927,11 @@
           <a:bodyPr/>
           <a:lstStyle/>
           <a:p>
-            <a:fld id="{296000BE-0612-4D88-A1AC-FF1287139C2E}" type="datetime1">
-              <a:rPr lang="de-DE" smtClean="0"/>
-              <a:t>19.06.2015</a:t>
+            <a:fld id="{C80D71F6-99A2-4718-B360-65885A8D0927}" type="datetime1">
+              <a:rPr lang="de-DE" smtClean="0"/>
+              <a:t>20.06.2015</a:t>
             </a:fld>
-            <a:endParaRPr lang="de-DE" dirty="0"/>
+            <a:endParaRPr lang="de-DE"/>
           </a:p>
         </p:txBody>
       </p:sp>
@@ -5492,7 +5954,7 @@
               <a:rPr lang="de-DE" smtClean="0"/>
               <a:t>FM-Synthese</a:t>
             </a:r>
-            <a:endParaRPr lang="de-DE" dirty="0"/>
+            <a:endParaRPr lang="de-DE"/>
           </a:p>
         </p:txBody>
       </p:sp>
@@ -5511,32 +5973,376 @@
           <a:bodyPr/>
           <a:lstStyle/>
           <a:p>
-            <a:fld id="{8740CB20-F870-467D-84CE-AB32061190A1}" type="slidenum">
-              <a:rPr lang="en-US" smtClean="0"/>
+            <a:fld id="{6C6AE60A-B69C-4790-82F7-3882EDF23186}" type="slidenum">
+              <a:rPr lang="de-DE" smtClean="0"/>
+              <a:pPr/>
               <a:t>18</a:t>
             </a:fld>
-            <a:r>
-              <a:rPr lang="de-DE" smtClean="0"/>
-              <a:t>   </a:t>
-            </a:r>
-            <a:endParaRPr lang="de-DE" dirty="0"/>
+            <a:endParaRPr lang="de-DE"/>
+          </a:p>
+        </p:txBody>
+      </p:sp>
+      <p:pic>
+        <p:nvPicPr>
+          <p:cNvPr id="9" name="Flute Sample G5">
+            <a:hlinkClick r:id="" action="ppaction://media"/>
+          </p:cNvPr>
+          <p:cNvPicPr>
+            <a:picLocks noChangeAspect="1"/>
+          </p:cNvPicPr>
+          <p:nvPr>
+            <a:audioFile r:link="rId2"/>
+            <p:extLst>
+              <p:ext uri="{DAA4B4D4-6D71-4841-9C94-3DE7FCFB9230}">
+                <p14:media xmlns:p14="http://schemas.microsoft.com/office/powerpoint/2010/main" r:embed="rId1"/>
+              </p:ext>
+            </p:extLst>
+          </p:nvPr>
+        </p:nvPicPr>
+        <p:blipFill>
+          <a:blip r:embed="rId11"/>
+          <a:stretch>
+            <a:fillRect/>
+          </a:stretch>
+        </p:blipFill>
+        <p:spPr>
+          <a:xfrm>
+            <a:off x="2234992" y="2640398"/>
+            <a:ext cx="609600" cy="609600"/>
+          </a:xfrm>
+          <a:prstGeom prst="rect">
+            <a:avLst/>
+          </a:prstGeom>
+        </p:spPr>
+      </p:pic>
+      <p:sp>
+        <p:nvSpPr>
+          <p:cNvPr id="10" name="Textfeld 9"/>
+          <p:cNvSpPr txBox="1"/>
+          <p:nvPr/>
+        </p:nvSpPr>
+        <p:spPr>
+          <a:xfrm>
+            <a:off x="2246530" y="2189684"/>
+            <a:ext cx="586524" cy="369332"/>
+          </a:xfrm>
+          <a:prstGeom prst="rect">
+            <a:avLst/>
+          </a:prstGeom>
+          <a:noFill/>
+        </p:spPr>
+        <p:txBody>
+          <a:bodyPr wrap="square" rtlCol="0">
+            <a:spAutoFit/>
+          </a:bodyPr>
+          <a:lstStyle/>
+          <a:p>
+            <a:pPr algn="ctr"/>
+            <a:r>
+              <a:rPr lang="de-DE" dirty="0" smtClean="0"/>
+              <a:t>1</a:t>
+            </a:r>
+            <a:endParaRPr lang="en-US" dirty="0"/>
+          </a:p>
+        </p:txBody>
+      </p:sp>
+      <p:pic>
+        <p:nvPicPr>
+          <p:cNvPr id="11" name="Flute FM G5">
+            <a:hlinkClick r:id="" action="ppaction://media"/>
+          </p:cNvPr>
+          <p:cNvPicPr>
+            <a:picLocks noChangeAspect="1"/>
+          </p:cNvPicPr>
+          <p:nvPr>
+            <a:audioFile r:link="rId4"/>
+            <p:extLst>
+              <p:ext uri="{DAA4B4D4-6D71-4841-9C94-3DE7FCFB9230}">
+                <p14:media xmlns:p14="http://schemas.microsoft.com/office/powerpoint/2010/main" r:embed="rId3"/>
+              </p:ext>
+            </p:extLst>
+          </p:nvPr>
+        </p:nvPicPr>
+        <p:blipFill>
+          <a:blip r:embed="rId11"/>
+          <a:stretch>
+            <a:fillRect/>
+          </a:stretch>
+        </p:blipFill>
+        <p:spPr>
+          <a:xfrm>
+            <a:off x="3647924" y="2644945"/>
+            <a:ext cx="609600" cy="609600"/>
+          </a:xfrm>
+          <a:prstGeom prst="rect">
+            <a:avLst/>
+          </a:prstGeom>
+        </p:spPr>
+      </p:pic>
+      <p:sp>
+        <p:nvSpPr>
+          <p:cNvPr id="12" name="Textfeld 11"/>
+          <p:cNvSpPr txBox="1"/>
+          <p:nvPr/>
+        </p:nvSpPr>
+        <p:spPr>
+          <a:xfrm>
+            <a:off x="3825765" y="2189684"/>
+            <a:ext cx="284486" cy="369332"/>
+          </a:xfrm>
+          <a:prstGeom prst="rect">
+            <a:avLst/>
+          </a:prstGeom>
+          <a:noFill/>
+        </p:spPr>
+        <p:txBody>
+          <a:bodyPr wrap="square" rtlCol="0">
+            <a:spAutoFit/>
+          </a:bodyPr>
+          <a:lstStyle/>
+          <a:p>
+            <a:pPr algn="ctr"/>
+            <a:r>
+              <a:rPr lang="de-DE" dirty="0" smtClean="0"/>
+              <a:t>2</a:t>
+            </a:r>
+            <a:endParaRPr lang="en-US" dirty="0"/>
+          </a:p>
+        </p:txBody>
+      </p:sp>
+      <p:pic>
+        <p:nvPicPr>
+          <p:cNvPr id="13" name="Flute Original G5">
+            <a:hlinkClick r:id="" action="ppaction://media"/>
+          </p:cNvPr>
+          <p:cNvPicPr>
+            <a:picLocks noChangeAspect="1"/>
+          </p:cNvPicPr>
+          <p:nvPr>
+            <a:audioFile r:link="rId6"/>
+            <p:extLst>
+              <p:ext uri="{DAA4B4D4-6D71-4841-9C94-3DE7FCFB9230}">
+                <p14:media xmlns:p14="http://schemas.microsoft.com/office/powerpoint/2010/main" r:embed="rId5"/>
+              </p:ext>
+            </p:extLst>
+          </p:nvPr>
+        </p:nvPicPr>
+        <p:blipFill>
+          <a:blip r:embed="rId11"/>
+          <a:stretch>
+            <a:fillRect/>
+          </a:stretch>
+        </p:blipFill>
+        <p:spPr>
+          <a:xfrm>
+            <a:off x="6359468" y="2640398"/>
+            <a:ext cx="609600" cy="609600"/>
+          </a:xfrm>
+          <a:prstGeom prst="rect">
+            <a:avLst/>
+          </a:prstGeom>
+        </p:spPr>
+      </p:pic>
+      <p:sp>
+        <p:nvSpPr>
+          <p:cNvPr id="14" name="Textfeld 13"/>
+          <p:cNvSpPr txBox="1"/>
+          <p:nvPr/>
+        </p:nvSpPr>
+        <p:spPr>
+          <a:xfrm>
+            <a:off x="6522270" y="2189684"/>
+            <a:ext cx="283996" cy="369332"/>
+          </a:xfrm>
+          <a:prstGeom prst="rect">
+            <a:avLst/>
+          </a:prstGeom>
+          <a:noFill/>
+        </p:spPr>
+        <p:txBody>
+          <a:bodyPr wrap="square" rtlCol="0">
+            <a:spAutoFit/>
+          </a:bodyPr>
+          <a:lstStyle/>
+          <a:p>
+            <a:pPr algn="ctr"/>
+            <a:r>
+              <a:rPr lang="de-DE" dirty="0"/>
+              <a:t>4</a:t>
+            </a:r>
+            <a:endParaRPr lang="en-US" dirty="0"/>
+          </a:p>
+        </p:txBody>
+      </p:sp>
+      <p:pic>
+        <p:nvPicPr>
+          <p:cNvPr id="15" name="Flute FM8 G5">
+            <a:hlinkClick r:id="" action="ppaction://media"/>
+          </p:cNvPr>
+          <p:cNvPicPr>
+            <a:picLocks noChangeAspect="1"/>
+          </p:cNvPicPr>
+          <p:nvPr>
+            <a:audioFile r:link="rId8"/>
+            <p:extLst>
+              <p:ext uri="{DAA4B4D4-6D71-4841-9C94-3DE7FCFB9230}">
+                <p14:media xmlns:p14="http://schemas.microsoft.com/office/powerpoint/2010/main" r:embed="rId7"/>
+              </p:ext>
+            </p:extLst>
+          </p:nvPr>
+        </p:nvPicPr>
+        <p:blipFill>
+          <a:blip r:embed="rId11"/>
+          <a:stretch>
+            <a:fillRect/>
+          </a:stretch>
+        </p:blipFill>
+        <p:spPr>
+          <a:xfrm>
+            <a:off x="5052080" y="2647227"/>
+            <a:ext cx="609600" cy="609600"/>
+          </a:xfrm>
+          <a:prstGeom prst="rect">
+            <a:avLst/>
+          </a:prstGeom>
+        </p:spPr>
+      </p:pic>
+      <p:sp>
+        <p:nvSpPr>
+          <p:cNvPr id="16" name="Textfeld 15"/>
+          <p:cNvSpPr txBox="1"/>
+          <p:nvPr/>
+        </p:nvSpPr>
+        <p:spPr>
+          <a:xfrm>
+            <a:off x="5245264" y="2189684"/>
+            <a:ext cx="223232" cy="369332"/>
+          </a:xfrm>
+          <a:prstGeom prst="rect">
+            <a:avLst/>
+          </a:prstGeom>
+          <a:noFill/>
+        </p:spPr>
+        <p:txBody>
+          <a:bodyPr wrap="square" rtlCol="0">
+            <a:spAutoFit/>
+          </a:bodyPr>
+          <a:lstStyle/>
+          <a:p>
+            <a:pPr algn="ctr"/>
+            <a:r>
+              <a:rPr lang="de-DE" dirty="0" smtClean="0"/>
+              <a:t>3</a:t>
+            </a:r>
+            <a:endParaRPr lang="en-US" dirty="0"/>
           </a:p>
         </p:txBody>
       </p:sp>
     </p:spTree>
     <p:extLst>
       <p:ext uri="{BB962C8B-B14F-4D97-AF65-F5344CB8AC3E}">
-        <p14:creationId xmlns:p14="http://schemas.microsoft.com/office/powerpoint/2010/main" val="1166838381"/>
+        <p14:creationId xmlns:p14="http://schemas.microsoft.com/office/powerpoint/2010/main" val="1269451123"/>
       </p:ext>
     </p:extLst>
   </p:cSld>
   <p:clrMapOvr>
     <a:masterClrMapping/>
   </p:clrMapOvr>
+  <mc:AlternateContent xmlns:mc="http://schemas.openxmlformats.org/markup-compatibility/2006">
+    <mc:Choice xmlns:p14="http://schemas.microsoft.com/office/powerpoint/2010/main" Requires="p14">
+      <p:transition spd="med" p14:dur="700">
+        <p:fade/>
+      </p:transition>
+    </mc:Choice>
+    <mc:Fallback>
+      <p:transition spd="med">
+        <p:fade/>
+      </p:transition>
+    </mc:Fallback>
+  </mc:AlternateContent>
   <p:timing>
     <p:tnLst>
       <p:par>
-        <p:cTn id="1" dur="indefinite" restart="never" nodeType="tmRoot"/>
+        <p:cTn id="1" dur="indefinite" restart="never" nodeType="tmRoot">
+          <p:childTnLst>
+            <p:audio>
+              <p:cMediaNode vol="80000">
+                <p:cTn id="2" fill="hold" display="0">
+                  <p:stCondLst>
+                    <p:cond delay="indefinite"/>
+                  </p:stCondLst>
+                  <p:endCondLst>
+                    <p:cond evt="onStopAudio" delay="0">
+                      <p:tgtEl>
+                        <p:sldTgt/>
+                      </p:tgtEl>
+                    </p:cond>
+                  </p:endCondLst>
+                </p:cTn>
+                <p:tgtEl>
+                  <p:spTgt spid="9"/>
+                </p:tgtEl>
+              </p:cMediaNode>
+            </p:audio>
+            <p:audio>
+              <p:cMediaNode vol="80000">
+                <p:cTn id="3" fill="hold" display="0">
+                  <p:stCondLst>
+                    <p:cond delay="indefinite"/>
+                  </p:stCondLst>
+                  <p:endCondLst>
+                    <p:cond evt="onStopAudio" delay="0">
+                      <p:tgtEl>
+                        <p:sldTgt/>
+                      </p:tgtEl>
+                    </p:cond>
+                  </p:endCondLst>
+                </p:cTn>
+                <p:tgtEl>
+                  <p:spTgt spid="11"/>
+                </p:tgtEl>
+              </p:cMediaNode>
+            </p:audio>
+            <p:audio>
+              <p:cMediaNode vol="80000">
+                <p:cTn id="4" fill="hold" display="0">
+                  <p:stCondLst>
+                    <p:cond delay="indefinite"/>
+                  </p:stCondLst>
+                  <p:endCondLst>
+                    <p:cond evt="onStopAudio" delay="0">
+                      <p:tgtEl>
+                        <p:sldTgt/>
+                      </p:tgtEl>
+                    </p:cond>
+                  </p:endCondLst>
+                </p:cTn>
+                <p:tgtEl>
+                  <p:spTgt spid="13"/>
+                </p:tgtEl>
+              </p:cMediaNode>
+            </p:audio>
+            <p:audio>
+              <p:cMediaNode vol="80000">
+                <p:cTn id="5" fill="hold" display="0">
+                  <p:stCondLst>
+                    <p:cond delay="indefinite"/>
+                  </p:stCondLst>
+                  <p:endCondLst>
+                    <p:cond evt="onStopAudio" delay="0">
+                      <p:tgtEl>
+                        <p:sldTgt/>
+                      </p:tgtEl>
+                    </p:cond>
+                  </p:endCondLst>
+                </p:cTn>
+                <p:tgtEl>
+                  <p:spTgt spid="15"/>
+                </p:tgtEl>
+              </p:cMediaNode>
+            </p:audio>
+          </p:childTnLst>
+        </p:cTn>
       </p:par>
     </p:tnLst>
   </p:timing>
@@ -5562,7 +6368,7 @@
       </p:grpSpPr>
       <p:sp>
         <p:nvSpPr>
-          <p:cNvPr id="2" name="Titel 1"/>
+          <p:cNvPr id="7" name="Titel 6"/>
           <p:cNvSpPr>
             <a:spLocks noGrp="1"/>
           </p:cNvSpPr>
@@ -5576,8 +6382,12 @@
           <a:lstStyle/>
           <a:p>
             <a:r>
+              <a:rPr lang="de-DE" dirty="0"/>
+              <a:t>FM-Synthesizer in C</a:t>
+            </a:r>
+            <a:r>
               <a:rPr lang="de-DE" dirty="0" smtClean="0"/>
-              <a:t>Framework</a:t>
+              <a:t>++</a:t>
             </a:r>
             <a:endParaRPr lang="en-US" dirty="0"/>
           </a:p>
@@ -5585,6 +6395,25 @@
       </p:sp>
       <p:sp>
         <p:nvSpPr>
+          <p:cNvPr id="2" name="Textplatzhalter 1"/>
+          <p:cNvSpPr>
+            <a:spLocks noGrp="1"/>
+          </p:cNvSpPr>
+          <p:nvPr>
+            <p:ph type="body" idx="1"/>
+          </p:nvPr>
+        </p:nvSpPr>
+        <p:spPr/>
+        <p:txBody>
+          <a:bodyPr/>
+          <a:lstStyle/>
+          <a:p>
+            <a:endParaRPr lang="en-US"/>
+          </a:p>
+        </p:txBody>
+      </p:sp>
+      <p:sp>
+        <p:nvSpPr>
           <p:cNvPr id="4" name="Datumsplatzhalter 3"/>
           <p:cNvSpPr>
             <a:spLocks noGrp="1"/>
@@ -5600,7 +6429,7 @@
           <a:p>
             <a:fld id="{296000BE-0612-4D88-A1AC-FF1287139C2E}" type="datetime1">
               <a:rPr lang="de-DE" smtClean="0"/>
-              <a:t>19.06.2015</a:t>
+              <a:t>20.06.2015</a:t>
             </a:fld>
             <a:endParaRPr lang="de-DE" dirty="0"/>
           </a:p>
@@ -5656,76 +6485,28 @@
           </a:p>
         </p:txBody>
       </p:sp>
-      <p:pic>
-        <p:nvPicPr>
-          <p:cNvPr id="15" name="Grafik 14"/>
-          <p:cNvPicPr>
-            <a:picLocks noChangeAspect="1"/>
-          </p:cNvPicPr>
-          <p:nvPr/>
-        </p:nvPicPr>
-        <p:blipFill>
-          <a:blip r:embed="rId2">
-            <a:extLst>
-              <a:ext uri="{28A0092B-C50C-407E-A947-70E740481C1C}">
-                <a14:useLocalDpi xmlns:a14="http://schemas.microsoft.com/office/drawing/2010/main" val="0"/>
-              </a:ext>
-            </a:extLst>
-          </a:blip>
-          <a:stretch>
-            <a:fillRect/>
-          </a:stretch>
-        </p:blipFill>
-        <p:spPr>
-          <a:xfrm>
-            <a:off x="1247930" y="1419622"/>
-            <a:ext cx="6648140" cy="2742358"/>
-          </a:xfrm>
-          <a:prstGeom prst="rect">
-            <a:avLst/>
-          </a:prstGeom>
-        </p:spPr>
-      </p:pic>
-      <p:sp>
-        <p:nvSpPr>
-          <p:cNvPr id="17" name="Textfeld 16"/>
-          <p:cNvSpPr txBox="1"/>
-          <p:nvPr/>
-        </p:nvSpPr>
-        <p:spPr>
-          <a:xfrm>
-            <a:off x="6804248" y="4161980"/>
-            <a:ext cx="2304256" cy="276999"/>
-          </a:xfrm>
-          <a:prstGeom prst="rect">
-            <a:avLst/>
-          </a:prstGeom>
-          <a:noFill/>
-        </p:spPr>
-        <p:txBody>
-          <a:bodyPr wrap="square" rtlCol="0">
-            <a:spAutoFit/>
-          </a:bodyPr>
-          <a:lstStyle/>
-          <a:p>
-            <a:r>
-              <a:rPr lang="de-DE" sz="1200" dirty="0" smtClean="0"/>
-              <a:t>Quelle: http://www.juce.com</a:t>
-            </a:r>
-            <a:endParaRPr lang="en-US" sz="1200" dirty="0"/>
-          </a:p>
-        </p:txBody>
-      </p:sp>
     </p:spTree>
     <p:extLst>
       <p:ext uri="{BB962C8B-B14F-4D97-AF65-F5344CB8AC3E}">
-        <p14:creationId xmlns:p14="http://schemas.microsoft.com/office/powerpoint/2010/main" val="671220262"/>
+        <p14:creationId xmlns:p14="http://schemas.microsoft.com/office/powerpoint/2010/main" val="1166838381"/>
       </p:ext>
     </p:extLst>
   </p:cSld>
   <p:clrMapOvr>
     <a:masterClrMapping/>
   </p:clrMapOvr>
+  <mc:AlternateContent xmlns:mc="http://schemas.openxmlformats.org/markup-compatibility/2006">
+    <mc:Choice xmlns:p14="http://schemas.microsoft.com/office/powerpoint/2010/main" Requires="p14">
+      <p:transition spd="med" p14:dur="700">
+        <p:fade/>
+      </p:transition>
+    </mc:Choice>
+    <mc:Fallback>
+      <p:transition spd="med">
+        <p:fade/>
+      </p:transition>
+    </mc:Fallback>
+  </mc:AlternateContent>
   <p:timing>
     <p:tnLst>
       <p:par>
@@ -5965,11 +6746,6 @@
               </a:rPr>
               <a:t>Tonnachbildung Theorie</a:t>
             </a:r>
-            <a:endParaRPr lang="de-DE" dirty="0" smtClean="0">
-              <a:solidFill>
-                <a:schemeClr val="tx1"/>
-              </a:solidFill>
-            </a:endParaRPr>
           </a:p>
           <a:p>
             <a:pPr marL="457200" indent="-457200" algn="l">
@@ -6001,15 +6777,7 @@
                   <a:schemeClr val="tx1"/>
                 </a:solidFill>
               </a:rPr>
-              <a:t>FM-Synthesizer </a:t>
-            </a:r>
-            <a:r>
-              <a:rPr lang="de-DE" dirty="0" smtClean="0">
-                <a:solidFill>
-                  <a:schemeClr val="tx1"/>
-                </a:solidFill>
-              </a:rPr>
-              <a:t>in C++</a:t>
+              <a:t>FM-Synthesizer in C++</a:t>
             </a:r>
             <a:endParaRPr lang="de-DE" dirty="0">
               <a:solidFill>
@@ -6036,7 +6804,7 @@
           <a:p>
             <a:fld id="{54A5E96F-7890-4333-8D04-AF19E98716D9}" type="datetime1">
               <a:rPr lang="de-DE" smtClean="0"/>
-              <a:t>19.06.2015</a:t>
+              <a:t>20.06.2015</a:t>
             </a:fld>
             <a:endParaRPr lang="de-DE" dirty="0"/>
           </a:p>
@@ -6097,6 +6865,18 @@
   <p:clrMapOvr>
     <a:masterClrMapping/>
   </p:clrMapOvr>
+  <mc:AlternateContent xmlns:mc="http://schemas.openxmlformats.org/markup-compatibility/2006">
+    <mc:Choice xmlns:p14="http://schemas.microsoft.com/office/powerpoint/2010/main" Requires="p14">
+      <p:transition spd="med" p14:dur="700">
+        <p:fade/>
+      </p:transition>
+    </mc:Choice>
+    <mc:Fallback>
+      <p:transition spd="med">
+        <p:fade/>
+      </p:transition>
+    </mc:Fallback>
+  </mc:AlternateContent>
   <p:timing>
     <p:tnLst>
       <p:par>
@@ -6141,7 +6921,7 @@
           <a:p>
             <a:r>
               <a:rPr lang="de-DE" dirty="0" smtClean="0"/>
-              <a:t>Fazit</a:t>
+              <a:t>Framework</a:t>
             </a:r>
             <a:endParaRPr lang="en-US" dirty="0"/>
           </a:p>
@@ -6149,45 +6929,6 @@
       </p:sp>
       <p:sp>
         <p:nvSpPr>
-          <p:cNvPr id="3" name="Inhaltsplatzhalter 2"/>
-          <p:cNvSpPr>
-            <a:spLocks noGrp="1"/>
-          </p:cNvSpPr>
-          <p:nvPr>
-            <p:ph idx="1"/>
-          </p:nvPr>
-        </p:nvSpPr>
-        <p:spPr/>
-        <p:txBody>
-          <a:bodyPr/>
-          <a:lstStyle/>
-          <a:p>
-            <a:r>
-              <a:rPr lang="de-DE" dirty="0" smtClean="0"/>
-              <a:t>Instrumententon generieren ist schwierig</a:t>
-            </a:r>
-          </a:p>
-          <a:p>
-            <a:r>
-              <a:rPr lang="de-DE" dirty="0" smtClean="0"/>
-              <a:t>Generierter Instrumententon hat große Ähnlichkeit zum Original</a:t>
-            </a:r>
-          </a:p>
-          <a:p>
-            <a:r>
-              <a:rPr lang="de-DE" dirty="0" smtClean="0"/>
-              <a:t>FM-Synthesizer Programm </a:t>
-            </a:r>
-            <a:r>
-              <a:rPr lang="de-DE" dirty="0" smtClean="0"/>
-              <a:t>einfacher Einstieg</a:t>
-            </a:r>
-            <a:endParaRPr lang="en-US" dirty="0"/>
-          </a:p>
-        </p:txBody>
-      </p:sp>
-      <p:sp>
-        <p:nvSpPr>
           <p:cNvPr id="4" name="Datumsplatzhalter 3"/>
           <p:cNvSpPr>
             <a:spLocks noGrp="1"/>
@@ -6203,7 +6944,7 @@
           <a:p>
             <a:fld id="{296000BE-0612-4D88-A1AC-FF1287139C2E}" type="datetime1">
               <a:rPr lang="de-DE" smtClean="0"/>
-              <a:t>19.06.2015</a:t>
+              <a:t>20.06.2015</a:t>
             </a:fld>
             <a:endParaRPr lang="de-DE" dirty="0"/>
           </a:p>
@@ -6259,16 +7000,88 @@
           </a:p>
         </p:txBody>
       </p:sp>
+      <p:pic>
+        <p:nvPicPr>
+          <p:cNvPr id="15" name="Grafik 14"/>
+          <p:cNvPicPr>
+            <a:picLocks noChangeAspect="1"/>
+          </p:cNvPicPr>
+          <p:nvPr/>
+        </p:nvPicPr>
+        <p:blipFill>
+          <a:blip r:embed="rId2">
+            <a:extLst>
+              <a:ext uri="{28A0092B-C50C-407E-A947-70E740481C1C}">
+                <a14:useLocalDpi xmlns:a14="http://schemas.microsoft.com/office/drawing/2010/main" val="0"/>
+              </a:ext>
+            </a:extLst>
+          </a:blip>
+          <a:stretch>
+            <a:fillRect/>
+          </a:stretch>
+        </p:blipFill>
+        <p:spPr>
+          <a:xfrm>
+            <a:off x="1247930" y="1419622"/>
+            <a:ext cx="6648140" cy="2742358"/>
+          </a:xfrm>
+          <a:prstGeom prst="rect">
+            <a:avLst/>
+          </a:prstGeom>
+        </p:spPr>
+      </p:pic>
+      <p:sp>
+        <p:nvSpPr>
+          <p:cNvPr id="17" name="Textfeld 16"/>
+          <p:cNvSpPr txBox="1"/>
+          <p:nvPr/>
+        </p:nvSpPr>
+        <p:spPr>
+          <a:xfrm>
+            <a:off x="6804248" y="4161980"/>
+            <a:ext cx="2304256" cy="276999"/>
+          </a:xfrm>
+          <a:prstGeom prst="rect">
+            <a:avLst/>
+          </a:prstGeom>
+          <a:noFill/>
+        </p:spPr>
+        <p:txBody>
+          <a:bodyPr wrap="square" rtlCol="0">
+            <a:spAutoFit/>
+          </a:bodyPr>
+          <a:lstStyle/>
+          <a:p>
+            <a:r>
+              <a:rPr lang="de-DE" sz="1200" dirty="0" smtClean="0"/>
+              <a:t>Quelle: http://www.juce.com</a:t>
+            </a:r>
+            <a:endParaRPr lang="en-US" sz="1200" dirty="0"/>
+          </a:p>
+        </p:txBody>
+      </p:sp>
     </p:spTree>
     <p:extLst>
       <p:ext uri="{BB962C8B-B14F-4D97-AF65-F5344CB8AC3E}">
-        <p14:creationId xmlns:p14="http://schemas.microsoft.com/office/powerpoint/2010/main" val="223964149"/>
+        <p14:creationId xmlns:p14="http://schemas.microsoft.com/office/powerpoint/2010/main" val="671220262"/>
       </p:ext>
     </p:extLst>
   </p:cSld>
   <p:clrMapOvr>
     <a:masterClrMapping/>
   </p:clrMapOvr>
+  <mc:AlternateContent xmlns:mc="http://schemas.openxmlformats.org/markup-compatibility/2006">
+    <mc:Choice xmlns:p14="http://schemas.microsoft.com/office/powerpoint/2010/main" Requires="p14">
+      <p:transition spd="med" p14:dur="700">
+        <p:fade/>
+      </p:transition>
+    </mc:Choice>
+    <mc:Fallback>
+      <p:transition spd="med">
+        <p:fade/>
+      </p:transition>
+    </mc:Fallback>
+  </mc:AlternateContent>
   <p:timing>
     <p:tnLst>
       <p:par>
@@ -6298,26 +7111,7 @@
       </p:grpSpPr>
       <p:sp>
         <p:nvSpPr>
-          <p:cNvPr id="8" name="Untertitel 7"/>
-          <p:cNvSpPr>
-            <a:spLocks noGrp="1"/>
-          </p:cNvSpPr>
-          <p:nvPr>
-            <p:ph type="subTitle" idx="1"/>
-          </p:nvPr>
-        </p:nvSpPr>
-        <p:spPr/>
-        <p:txBody>
-          <a:bodyPr/>
-          <a:lstStyle/>
-          <a:p>
-            <a:endParaRPr lang="en-US"/>
-          </a:p>
-        </p:txBody>
-      </p:sp>
-      <p:sp>
-        <p:nvSpPr>
-          <p:cNvPr id="7" name="Titel 6"/>
+          <p:cNvPr id="2" name="Titel 1"/>
           <p:cNvSpPr>
             <a:spLocks noGrp="1"/>
           </p:cNvSpPr>
@@ -6332,18 +7126,67 @@
           <a:p>
             <a:r>
               <a:rPr lang="de-DE" dirty="0" smtClean="0"/>
-              <a:t>Vielen Dank für ihre </a:t>
-            </a:r>
+              <a:t>Fazit</a:t>
+            </a:r>
+            <a:endParaRPr lang="en-US" dirty="0"/>
+          </a:p>
+        </p:txBody>
+      </p:sp>
+      <p:sp>
+        <p:nvSpPr>
+          <p:cNvPr id="3" name="Inhaltsplatzhalter 2"/>
+          <p:cNvSpPr>
+            <a:spLocks noGrp="1"/>
+          </p:cNvSpPr>
+          <p:nvPr>
+            <p:ph idx="1"/>
+          </p:nvPr>
+        </p:nvSpPr>
+        <p:spPr/>
+        <p:txBody>
+          <a:bodyPr/>
+          <a:lstStyle/>
+          <a:p>
             <a:r>
               <a:rPr lang="de-DE" dirty="0" smtClean="0"/>
-              <a:t/>
-            </a:r>
-            <a:br>
+              <a:t>Instrumententon </a:t>
+            </a:r>
+            <a:r>
               <a:rPr lang="de-DE" dirty="0" smtClean="0"/>
-            </a:br>
+              <a:t>nachbilden </a:t>
+            </a:r>
             <a:r>
               <a:rPr lang="de-DE" dirty="0" smtClean="0"/>
-              <a:t>Aufmerksamkeit</a:t>
+              <a:t>ist schwer</a:t>
+            </a:r>
+            <a:endParaRPr lang="de-DE" dirty="0" smtClean="0"/>
+          </a:p>
+          <a:p>
+            <a:r>
+              <a:rPr lang="de-DE" dirty="0" smtClean="0"/>
+              <a:t>Nachbildung </a:t>
+            </a:r>
+            <a:r>
+              <a:rPr lang="de-DE" dirty="0" smtClean="0"/>
+              <a:t>hat </a:t>
+            </a:r>
+            <a:r>
+              <a:rPr lang="de-DE" dirty="0" smtClean="0"/>
+              <a:t>große Ähnlichkeit zum Original</a:t>
+            </a:r>
+          </a:p>
+          <a:p>
+            <a:r>
+              <a:rPr lang="de-DE" dirty="0" smtClean="0"/>
+              <a:t>FM-Synthesizer Programm </a:t>
+            </a:r>
+            <a:r>
+              <a:rPr lang="de-DE" dirty="0" smtClean="0"/>
+              <a:t>bietet einfachen </a:t>
+            </a:r>
+            <a:r>
+              <a:rPr lang="de-DE" dirty="0" smtClean="0"/>
+              <a:t>Einstieg</a:t>
             </a:r>
             <a:endParaRPr lang="en-US" dirty="0"/>
           </a:p>
@@ -6366,7 +7209,7 @@
           <a:p>
             <a:fld id="{296000BE-0612-4D88-A1AC-FF1287139C2E}" type="datetime1">
               <a:rPr lang="de-DE" smtClean="0"/>
-              <a:t>19.06.2015</a:t>
+              <a:t>20.06.2015</a:t>
             </a:fld>
             <a:endParaRPr lang="de-DE" dirty="0"/>
           </a:p>
@@ -6425,13 +7268,25 @@
     </p:spTree>
     <p:extLst>
       <p:ext uri="{BB962C8B-B14F-4D97-AF65-F5344CB8AC3E}">
-        <p14:creationId xmlns:p14="http://schemas.microsoft.com/office/powerpoint/2010/main" val="3741543770"/>
+        <p14:creationId xmlns:p14="http://schemas.microsoft.com/office/powerpoint/2010/main" val="223964149"/>
       </p:ext>
     </p:extLst>
   </p:cSld>
   <p:clrMapOvr>
     <a:masterClrMapping/>
   </p:clrMapOvr>
+  <mc:AlternateContent xmlns:mc="http://schemas.openxmlformats.org/markup-compatibility/2006">
+    <mc:Choice xmlns:p14="http://schemas.microsoft.com/office/powerpoint/2010/main" Requires="p14">
+      <p:transition spd="med" p14:dur="700">
+        <p:fade/>
+      </p:transition>
+    </mc:Choice>
+    <mc:Fallback>
+      <p:transition spd="med">
+        <p:fade/>
+      </p:transition>
+    </mc:Fallback>
+  </mc:AlternateContent>
   <p:timing>
     <p:tnLst>
       <p:par>
@@ -6461,7 +7316,26 @@
       </p:grpSpPr>
       <p:sp>
         <p:nvSpPr>
-          <p:cNvPr id="2" name="Titel 1"/>
+          <p:cNvPr id="8" name="Untertitel 7"/>
+          <p:cNvSpPr>
+            <a:spLocks noGrp="1"/>
+          </p:cNvSpPr>
+          <p:nvPr>
+            <p:ph type="subTitle" idx="1"/>
+          </p:nvPr>
+        </p:nvSpPr>
+        <p:spPr/>
+        <p:txBody>
+          <a:bodyPr/>
+          <a:lstStyle/>
+          <a:p>
+            <a:endParaRPr lang="en-US"/>
+          </a:p>
+        </p:txBody>
+      </p:sp>
+      <p:sp>
+        <p:nvSpPr>
+          <p:cNvPr id="7" name="Titel 6"/>
           <p:cNvSpPr>
             <a:spLocks noGrp="1"/>
           </p:cNvSpPr>
@@ -6476,7 +7350,14 @@
           <a:p>
             <a:r>
               <a:rPr lang="de-DE" dirty="0" smtClean="0"/>
-              <a:t>Quellen</a:t>
+              <a:t>Vielen Dank für ihre </a:t>
+            </a:r>
+            <a:br>
+              <a:rPr lang="de-DE" dirty="0" smtClean="0"/>
+            </a:br>
+            <a:r>
+              <a:rPr lang="de-DE" dirty="0" smtClean="0"/>
+              <a:t>Aufmerksamkeit</a:t>
             </a:r>
             <a:endParaRPr lang="en-US" dirty="0"/>
           </a:p>
@@ -6499,7 +7380,7 @@
           <a:p>
             <a:fld id="{296000BE-0612-4D88-A1AC-FF1287139C2E}" type="datetime1">
               <a:rPr lang="de-DE" smtClean="0"/>
-              <a:t>19.06.2015</a:t>
+              <a:t>20.06.2015</a:t>
             </a:fld>
             <a:endParaRPr lang="de-DE" dirty="0"/>
           </a:p>
@@ -6546,6 +7427,151 @@
             <a:fld id="{8740CB20-F870-467D-84CE-AB32061190A1}" type="slidenum">
               <a:rPr lang="en-US" smtClean="0"/>
               <a:t>22</a:t>
+            </a:fld>
+            <a:r>
+              <a:rPr lang="de-DE" smtClean="0"/>
+              <a:t>   </a:t>
+            </a:r>
+            <a:endParaRPr lang="de-DE" dirty="0"/>
+          </a:p>
+        </p:txBody>
+      </p:sp>
+    </p:spTree>
+    <p:extLst>
+      <p:ext uri="{BB962C8B-B14F-4D97-AF65-F5344CB8AC3E}">
+        <p14:creationId xmlns:p14="http://schemas.microsoft.com/office/powerpoint/2010/main" val="3741543770"/>
+      </p:ext>
+    </p:extLst>
+  </p:cSld>
+  <p:clrMapOvr>
+    <a:masterClrMapping/>
+  </p:clrMapOvr>
+  <mc:AlternateContent xmlns:mc="http://schemas.openxmlformats.org/markup-compatibility/2006">
+    <mc:Choice xmlns:p14="http://schemas.microsoft.com/office/powerpoint/2010/main" Requires="p14">
+      <p:transition spd="med" p14:dur="700">
+        <p:fade/>
+      </p:transition>
+    </mc:Choice>
+    <mc:Fallback>
+      <p:transition spd="med">
+        <p:fade/>
+      </p:transition>
+    </mc:Fallback>
+  </mc:AlternateContent>
+  <p:timing>
+    <p:tnLst>
+      <p:par>
+        <p:cTn id="1" dur="indefinite" restart="never" nodeType="tmRoot"/>
+      </p:par>
+    </p:tnLst>
+  </p:timing>
+</p:sld>
+</file>
+
+<file path=ppt/slides/slide23.xml><?xml version="1.0" encoding="utf-8"?>
+<p:sld xmlns:a="http://schemas.openxmlformats.org/drawingml/2006/main" xmlns:r="http://schemas.openxmlformats.org/officeDocument/2006/relationships" xmlns:p="http://schemas.openxmlformats.org/presentationml/2006/main">
+  <p:cSld>
+    <p:spTree>
+      <p:nvGrpSpPr>
+        <p:cNvPr id="1" name=""/>
+        <p:cNvGrpSpPr/>
+        <p:nvPr/>
+      </p:nvGrpSpPr>
+      <p:grpSpPr>
+        <a:xfrm>
+          <a:off x="0" y="0"/>
+          <a:ext cx="0" cy="0"/>
+          <a:chOff x="0" y="0"/>
+          <a:chExt cx="0" cy="0"/>
+        </a:xfrm>
+      </p:grpSpPr>
+      <p:sp>
+        <p:nvSpPr>
+          <p:cNvPr id="2" name="Titel 1"/>
+          <p:cNvSpPr>
+            <a:spLocks noGrp="1"/>
+          </p:cNvSpPr>
+          <p:nvPr>
+            <p:ph type="title"/>
+          </p:nvPr>
+        </p:nvSpPr>
+        <p:spPr/>
+        <p:txBody>
+          <a:bodyPr/>
+          <a:lstStyle/>
+          <a:p>
+            <a:r>
+              <a:rPr lang="de-DE" dirty="0" smtClean="0"/>
+              <a:t>Quellen</a:t>
+            </a:r>
+            <a:endParaRPr lang="en-US" dirty="0"/>
+          </a:p>
+        </p:txBody>
+      </p:sp>
+      <p:sp>
+        <p:nvSpPr>
+          <p:cNvPr id="4" name="Datumsplatzhalter 3"/>
+          <p:cNvSpPr>
+            <a:spLocks noGrp="1"/>
+          </p:cNvSpPr>
+          <p:nvPr>
+            <p:ph type="dt" sz="half" idx="10"/>
+          </p:nvPr>
+        </p:nvSpPr>
+        <p:spPr/>
+        <p:txBody>
+          <a:bodyPr/>
+          <a:lstStyle/>
+          <a:p>
+            <a:fld id="{296000BE-0612-4D88-A1AC-FF1287139C2E}" type="datetime1">
+              <a:rPr lang="de-DE" smtClean="0"/>
+              <a:t>20.06.2015</a:t>
+            </a:fld>
+            <a:endParaRPr lang="de-DE" dirty="0"/>
+          </a:p>
+        </p:txBody>
+      </p:sp>
+      <p:sp>
+        <p:nvSpPr>
+          <p:cNvPr id="5" name="Fußzeilenplatzhalter 4"/>
+          <p:cNvSpPr>
+            <a:spLocks noGrp="1"/>
+          </p:cNvSpPr>
+          <p:nvPr>
+            <p:ph type="ftr" sz="quarter" idx="11"/>
+          </p:nvPr>
+        </p:nvSpPr>
+        <p:spPr/>
+        <p:txBody>
+          <a:bodyPr/>
+          <a:lstStyle/>
+          <a:p>
+            <a:r>
+              <a:rPr lang="de-DE" smtClean="0"/>
+              <a:t>FM-Synthese</a:t>
+            </a:r>
+            <a:endParaRPr lang="de-DE" dirty="0"/>
+          </a:p>
+        </p:txBody>
+      </p:sp>
+      <p:sp>
+        <p:nvSpPr>
+          <p:cNvPr id="6" name="Foliennummernplatzhalter 5"/>
+          <p:cNvSpPr>
+            <a:spLocks noGrp="1"/>
+          </p:cNvSpPr>
+          <p:nvPr>
+            <p:ph type="sldNum" sz="quarter" idx="12"/>
+          </p:nvPr>
+        </p:nvSpPr>
+        <p:spPr/>
+        <p:txBody>
+          <a:bodyPr/>
+          <a:lstStyle/>
+          <a:p>
+            <a:fld id="{8740CB20-F870-467D-84CE-AB32061190A1}" type="slidenum">
+              <a:rPr lang="en-US" smtClean="0"/>
+              <a:t>23</a:t>
             </a:fld>
             <a:r>
               <a:rPr lang="de-DE" smtClean="0"/>
@@ -6700,6 +7726,18 @@
   <p:clrMapOvr>
     <a:masterClrMapping/>
   </p:clrMapOvr>
+  <mc:AlternateContent xmlns:mc="http://schemas.openxmlformats.org/markup-compatibility/2006">
+    <mc:Choice xmlns:p14="http://schemas.microsoft.com/office/powerpoint/2010/main" Requires="p14">
+      <p:transition spd="med" p14:dur="700">
+        <p:fade/>
+      </p:transition>
+    </mc:Choice>
+    <mc:Fallback>
+      <p:transition spd="med">
+        <p:fade/>
+      </p:transition>
+    </mc:Fallback>
+  </mc:AlternateContent>
   <p:timing>
     <p:tnLst>
       <p:par>
@@ -6786,7 +7824,7 @@
           <a:p>
             <a:fld id="{D63A8337-BE16-45CB-AB94-830A8AFD22E2}" type="datetime1">
               <a:rPr lang="de-DE" smtClean="0"/>
-              <a:t>19.06.2015</a:t>
+              <a:t>20.06.2015</a:t>
             </a:fld>
             <a:endParaRPr lang="de-DE"/>
           </a:p>
@@ -6849,6 +7887,18 @@
   <p:clrMapOvr>
     <a:masterClrMapping/>
   </p:clrMapOvr>
+  <mc:AlternateContent xmlns:mc="http://schemas.openxmlformats.org/markup-compatibility/2006">
+    <mc:Choice xmlns:p14="http://schemas.microsoft.com/office/powerpoint/2010/main" Requires="p14">
+      <p:transition spd="med" p14:dur="700">
+        <p:fade/>
+      </p:transition>
+    </mc:Choice>
+    <mc:Fallback>
+      <p:transition spd="med">
+        <p:fade/>
+      </p:transition>
+    </mc:Fallback>
+  </mc:AlternateContent>
   <p:timing>
     <p:tnLst>
       <p:par>
@@ -6975,7 +8025,7 @@
           <a:p>
             <a:fld id="{296000BE-0612-4D88-A1AC-FF1287139C2E}" type="datetime1">
               <a:rPr lang="de-DE" smtClean="0"/>
-              <a:t>19.06.2015</a:t>
+              <a:t>20.06.2015</a:t>
             </a:fld>
             <a:endParaRPr lang="de-DE" dirty="0"/>
           </a:p>
@@ -7033,7 +8083,7 @@
       </p:sp>
       <p:pic>
         <p:nvPicPr>
-          <p:cNvPr id="22" name="Grafik 21"/>
+          <p:cNvPr id="7" name="Grafik 6"/>
           <p:cNvPicPr>
             <a:picLocks noChangeAspect="1"/>
           </p:cNvPicPr>
@@ -7058,7 +8108,7 @@
         <p:spPr>
           <a:xfrm>
             <a:off x="748850" y="1458569"/>
-            <a:ext cx="7782049" cy="464182"/>
+            <a:ext cx="7670196" cy="464182"/>
           </a:xfrm>
           <a:prstGeom prst="rect">
             <a:avLst/>
@@ -7297,12 +8347,337 @@
   <p:clrMapOvr>
     <a:masterClrMapping/>
   </p:clrMapOvr>
+  <mc:AlternateContent xmlns:mc="http://schemas.openxmlformats.org/markup-compatibility/2006">
+    <mc:Choice xmlns:p14="http://schemas.microsoft.com/office/powerpoint/2010/main" Requires="p14">
+      <p:transition spd="med" p14:dur="700">
+        <p:fade/>
+      </p:transition>
+    </mc:Choice>
+    <mc:Fallback>
+      <p:transition spd="med">
+        <p:fade/>
+      </p:transition>
+    </mc:Fallback>
+  </mc:AlternateContent>
   <p:timing>
     <p:tnLst>
       <p:par>
-        <p:cTn id="1" dur="indefinite" restart="never" nodeType="tmRoot"/>
+        <p:cTn id="1" dur="indefinite" restart="never" nodeType="tmRoot">
+          <p:childTnLst>
+            <p:seq concurrent="1" nextAc="seek">
+              <p:cTn id="2" dur="indefinite" nodeType="mainSeq">
+                <p:childTnLst>
+                  <p:par>
+                    <p:cTn id="3" fill="hold">
+                      <p:stCondLst>
+                        <p:cond delay="indefinite"/>
+                      </p:stCondLst>
+                      <p:childTnLst>
+                        <p:par>
+                          <p:cTn id="4" fill="hold">
+                            <p:stCondLst>
+                              <p:cond delay="0"/>
+                            </p:stCondLst>
+                            <p:childTnLst>
+                              <p:par>
+                                <p:cTn id="5" presetID="10" presetClass="entr" presetSubtype="0" fill="hold" nodeType="clickEffect">
+                                  <p:stCondLst>
+                                    <p:cond delay="0"/>
+                                  </p:stCondLst>
+                                  <p:childTnLst>
+                                    <p:set>
+                                      <p:cBhvr>
+                                        <p:cTn id="6" dur="1" fill="hold">
+                                          <p:stCondLst>
+                                            <p:cond delay="0"/>
+                                          </p:stCondLst>
+                                        </p:cTn>
+                                        <p:tgtEl>
+                                          <p:spTgt spid="23"/>
+                                        </p:tgtEl>
+                                        <p:attrNameLst>
+                                          <p:attrName>style.visibility</p:attrName>
+                                        </p:attrNameLst>
+                                      </p:cBhvr>
+                                      <p:to>
+                                        <p:strVal val="visible"/>
+                                      </p:to>
+                                    </p:set>
+                                    <p:animEffect transition="in" filter="fade">
+                                      <p:cBhvr>
+                                        <p:cTn id="7" dur="500"/>
+                                        <p:tgtEl>
+                                          <p:spTgt spid="23"/>
+                                        </p:tgtEl>
+                                      </p:cBhvr>
+                                    </p:animEffect>
+                                  </p:childTnLst>
+                                </p:cTn>
+                              </p:par>
+                              <p:par>
+                                <p:cTn id="8" presetID="10" presetClass="entr" presetSubtype="0" fill="hold" nodeType="withEffect">
+                                  <p:stCondLst>
+                                    <p:cond delay="0"/>
+                                  </p:stCondLst>
+                                  <p:childTnLst>
+                                    <p:set>
+                                      <p:cBhvr>
+                                        <p:cTn id="9" dur="1" fill="hold">
+                                          <p:stCondLst>
+                                            <p:cond delay="0"/>
+                                          </p:stCondLst>
+                                        </p:cTn>
+                                        <p:tgtEl>
+                                          <p:spTgt spid="31"/>
+                                        </p:tgtEl>
+                                        <p:attrNameLst>
+                                          <p:attrName>style.visibility</p:attrName>
+                                        </p:attrNameLst>
+                                      </p:cBhvr>
+                                      <p:to>
+                                        <p:strVal val="visible"/>
+                                      </p:to>
+                                    </p:set>
+                                    <p:animEffect transition="in" filter="fade">
+                                      <p:cBhvr>
+                                        <p:cTn id="10" dur="500"/>
+                                        <p:tgtEl>
+                                          <p:spTgt spid="31"/>
+                                        </p:tgtEl>
+                                      </p:cBhvr>
+                                    </p:animEffect>
+                                  </p:childTnLst>
+                                </p:cTn>
+                              </p:par>
+                              <p:par>
+                                <p:cTn id="11" presetID="10" presetClass="entr" presetSubtype="0" fill="hold" nodeType="withEffect">
+                                  <p:stCondLst>
+                                    <p:cond delay="0"/>
+                                  </p:stCondLst>
+                                  <p:childTnLst>
+                                    <p:set>
+                                      <p:cBhvr>
+                                        <p:cTn id="12" dur="1" fill="hold">
+                                          <p:stCondLst>
+                                            <p:cond delay="0"/>
+                                          </p:stCondLst>
+                                        </p:cTn>
+                                        <p:tgtEl>
+                                          <p:spTgt spid="34"/>
+                                        </p:tgtEl>
+                                        <p:attrNameLst>
+                                          <p:attrName>style.visibility</p:attrName>
+                                        </p:attrNameLst>
+                                      </p:cBhvr>
+                                      <p:to>
+                                        <p:strVal val="visible"/>
+                                      </p:to>
+                                    </p:set>
+                                    <p:animEffect transition="in" filter="fade">
+                                      <p:cBhvr>
+                                        <p:cTn id="13" dur="500"/>
+                                        <p:tgtEl>
+                                          <p:spTgt spid="34"/>
+                                        </p:tgtEl>
+                                      </p:cBhvr>
+                                    </p:animEffect>
+                                  </p:childTnLst>
+                                </p:cTn>
+                              </p:par>
+                              <p:par>
+                                <p:cTn id="14" presetID="10" presetClass="entr" presetSubtype="0" fill="hold" nodeType="withEffect">
+                                  <p:stCondLst>
+                                    <p:cond delay="0"/>
+                                  </p:stCondLst>
+                                  <p:childTnLst>
+                                    <p:set>
+                                      <p:cBhvr>
+                                        <p:cTn id="15" dur="1" fill="hold">
+                                          <p:stCondLst>
+                                            <p:cond delay="0"/>
+                                          </p:stCondLst>
+                                        </p:cTn>
+                                        <p:tgtEl>
+                                          <p:spTgt spid="37"/>
+                                        </p:tgtEl>
+                                        <p:attrNameLst>
+                                          <p:attrName>style.visibility</p:attrName>
+                                        </p:attrNameLst>
+                                      </p:cBhvr>
+                                      <p:to>
+                                        <p:strVal val="visible"/>
+                                      </p:to>
+                                    </p:set>
+                                    <p:animEffect transition="in" filter="fade">
+                                      <p:cBhvr>
+                                        <p:cTn id="16" dur="500"/>
+                                        <p:tgtEl>
+                                          <p:spTgt spid="37"/>
+                                        </p:tgtEl>
+                                      </p:cBhvr>
+                                    </p:animEffect>
+                                  </p:childTnLst>
+                                </p:cTn>
+                              </p:par>
+                              <p:par>
+                                <p:cTn id="17" presetID="10" presetClass="entr" presetSubtype="0" fill="hold" grpId="0" nodeType="withEffect">
+                                  <p:stCondLst>
+                                    <p:cond delay="0"/>
+                                  </p:stCondLst>
+                                  <p:childTnLst>
+                                    <p:set>
+                                      <p:cBhvr>
+                                        <p:cTn id="18" dur="1" fill="hold">
+                                          <p:stCondLst>
+                                            <p:cond delay="0"/>
+                                          </p:stCondLst>
+                                        </p:cTn>
+                                        <p:tgtEl>
+                                          <p:spTgt spid="3">
+                                            <p:txEl>
+                                              <p:pRg st="2" end="2"/>
+                                            </p:txEl>
+                                          </p:spTgt>
+                                        </p:tgtEl>
+                                        <p:attrNameLst>
+                                          <p:attrName>style.visibility</p:attrName>
+                                        </p:attrNameLst>
+                                      </p:cBhvr>
+                                      <p:to>
+                                        <p:strVal val="visible"/>
+                                      </p:to>
+                                    </p:set>
+                                    <p:animEffect transition="in" filter="fade">
+                                      <p:cBhvr>
+                                        <p:cTn id="19" dur="500"/>
+                                        <p:tgtEl>
+                                          <p:spTgt spid="3">
+                                            <p:txEl>
+                                              <p:pRg st="2" end="2"/>
+                                            </p:txEl>
+                                          </p:spTgt>
+                                        </p:tgtEl>
+                                      </p:cBhvr>
+                                    </p:animEffect>
+                                  </p:childTnLst>
+                                </p:cTn>
+                              </p:par>
+                              <p:par>
+                                <p:cTn id="20" presetID="10" presetClass="entr" presetSubtype="0" fill="hold" grpId="0" nodeType="withEffect">
+                                  <p:stCondLst>
+                                    <p:cond delay="0"/>
+                                  </p:stCondLst>
+                                  <p:childTnLst>
+                                    <p:set>
+                                      <p:cBhvr>
+                                        <p:cTn id="21" dur="1" fill="hold">
+                                          <p:stCondLst>
+                                            <p:cond delay="0"/>
+                                          </p:stCondLst>
+                                        </p:cTn>
+                                        <p:tgtEl>
+                                          <p:spTgt spid="3">
+                                            <p:txEl>
+                                              <p:pRg st="3" end="3"/>
+                                            </p:txEl>
+                                          </p:spTgt>
+                                        </p:tgtEl>
+                                        <p:attrNameLst>
+                                          <p:attrName>style.visibility</p:attrName>
+                                        </p:attrNameLst>
+                                      </p:cBhvr>
+                                      <p:to>
+                                        <p:strVal val="visible"/>
+                                      </p:to>
+                                    </p:set>
+                                    <p:animEffect transition="in" filter="fade">
+                                      <p:cBhvr>
+                                        <p:cTn id="22" dur="500"/>
+                                        <p:tgtEl>
+                                          <p:spTgt spid="3">
+                                            <p:txEl>
+                                              <p:pRg st="3" end="3"/>
+                                            </p:txEl>
+                                          </p:spTgt>
+                                        </p:tgtEl>
+                                      </p:cBhvr>
+                                    </p:animEffect>
+                                  </p:childTnLst>
+                                </p:cTn>
+                              </p:par>
+                              <p:par>
+                                <p:cTn id="23" presetID="10" presetClass="entr" presetSubtype="0" fill="hold" grpId="0" nodeType="withEffect">
+                                  <p:stCondLst>
+                                    <p:cond delay="0"/>
+                                  </p:stCondLst>
+                                  <p:childTnLst>
+                                    <p:set>
+                                      <p:cBhvr>
+                                        <p:cTn id="24" dur="1" fill="hold">
+                                          <p:stCondLst>
+                                            <p:cond delay="0"/>
+                                          </p:stCondLst>
+                                        </p:cTn>
+                                        <p:tgtEl>
+                                          <p:spTgt spid="3">
+                                            <p:txEl>
+                                              <p:pRg st="4" end="4"/>
+                                            </p:txEl>
+                                          </p:spTgt>
+                                        </p:tgtEl>
+                                        <p:attrNameLst>
+                                          <p:attrName>style.visibility</p:attrName>
+                                        </p:attrNameLst>
+                                      </p:cBhvr>
+                                      <p:to>
+                                        <p:strVal val="visible"/>
+                                      </p:to>
+                                    </p:set>
+                                    <p:animEffect transition="in" filter="fade">
+                                      <p:cBhvr>
+                                        <p:cTn id="25" dur="500"/>
+                                        <p:tgtEl>
+                                          <p:spTgt spid="3">
+                                            <p:txEl>
+                                              <p:pRg st="4" end="4"/>
+                                            </p:txEl>
+                                          </p:spTgt>
+                                        </p:tgtEl>
+                                      </p:cBhvr>
+                                    </p:animEffect>
+                                  </p:childTnLst>
+                                </p:cTn>
+                              </p:par>
+                            </p:childTnLst>
+                          </p:cTn>
+                        </p:par>
+                      </p:childTnLst>
+                    </p:cTn>
+                  </p:par>
+                </p:childTnLst>
+              </p:cTn>
+              <p:prevCondLst>
+                <p:cond evt="onPrev" delay="0">
+                  <p:tgtEl>
+                    <p:sldTgt/>
+                  </p:tgtEl>
+                </p:cond>
+              </p:prevCondLst>
+              <p:nextCondLst>
+                <p:cond evt="onNext" delay="0">
+                  <p:tgtEl>
+                    <p:sldTgt/>
+                  </p:tgtEl>
+                </p:cond>
+              </p:nextCondLst>
+            </p:seq>
+          </p:childTnLst>
+        </p:cTn>
       </p:par>
     </p:tnLst>
+    <p:bldLst>
+      <p:bldP spid="3" grpId="0" uiExpand="1" build="p"/>
+    </p:bldLst>
   </p:timing>
 </p:sld>
 </file>
@@ -7334,7 +8709,7 @@
             <p:ph idx="1"/>
             <p:extLst>
               <p:ext uri="{D42A27DB-BD31-4B8C-83A1-F6EECF244321}">
-                <p14:modId xmlns:p14="http://schemas.microsoft.com/office/powerpoint/2010/main" val="271589209"/>
+                <p14:modId xmlns:p14="http://schemas.microsoft.com/office/powerpoint/2010/main" val="1321948484"/>
               </p:ext>
             </p:extLst>
           </p:nvPr>
@@ -7392,7 +8767,7 @@
                     <a:p>
                       <a:r>
                         <a:rPr lang="de-DE" dirty="0" smtClean="0"/>
-                        <a:t>Komplex Modulatoren in Reihe</a:t>
+                        <a:t>Parallelschaltung</a:t>
                       </a:r>
                       <a:endParaRPr lang="en-US" dirty="0"/>
                     </a:p>
@@ -7454,15 +8829,7 @@
                       </a:pPr>
                       <a:r>
                         <a:rPr lang="de-DE" dirty="0" smtClean="0"/>
-                        <a:t>Komplex Modulatoren</a:t>
-                      </a:r>
-                      <a:r>
-                        <a:rPr lang="de-DE" baseline="0" dirty="0" smtClean="0"/>
-                        <a:t> </a:t>
-                      </a:r>
-                      <a:r>
-                        <a:rPr lang="de-DE" dirty="0" smtClean="0"/>
-                        <a:t>geschachtelt</a:t>
+                        <a:t>Kaskadenschaltung</a:t>
                       </a:r>
                       <a:endParaRPr lang="en-US" dirty="0" smtClean="0"/>
                     </a:p>
@@ -7507,8 +8874,9 @@
                       </a:pPr>
                       <a:r>
                         <a:rPr lang="de-DE" dirty="0" smtClean="0"/>
-                        <a:t>Komplex Feedback</a:t>
+                        <a:t>Feedback</a:t>
                       </a:r>
+                      <a:endParaRPr lang="de-DE" dirty="0" smtClean="0"/>
                     </a:p>
                   </a:txBody>
                   <a:tcPr/>
@@ -7547,157 +8915,6 @@
           </a:graphicData>
         </a:graphic>
       </p:graphicFrame>
-      <p:grpSp>
-        <p:nvGrpSpPr>
-          <p:cNvPr id="16" name="Gruppieren 15"/>
-          <p:cNvGrpSpPr/>
-          <p:nvPr/>
-        </p:nvGrpSpPr>
-        <p:grpSpPr>
-          <a:xfrm>
-            <a:off x="680953" y="1628558"/>
-            <a:ext cx="6843375" cy="2476071"/>
-            <a:chOff x="680953" y="1628558"/>
-            <a:chExt cx="6843375" cy="2476071"/>
-          </a:xfrm>
-        </p:grpSpPr>
-        <p:pic>
-          <p:nvPicPr>
-            <p:cNvPr id="8" name="Grafik 7"/>
-            <p:cNvPicPr>
-              <a:picLocks noChangeAspect="1"/>
-            </p:cNvPicPr>
-            <p:nvPr>
-              <p:custDataLst>
-                <p:tags r:id="rId1"/>
-              </p:custDataLst>
-            </p:nvPr>
-          </p:nvPicPr>
-          <p:blipFill>
-            <a:blip r:embed="rId6" cstate="print">
-              <a:extLst>
-                <a:ext uri="{28A0092B-C50C-407E-A947-70E740481C1C}">
-                  <a14:useLocalDpi xmlns:a14="http://schemas.microsoft.com/office/drawing/2010/main" val="0"/>
-                </a:ext>
-              </a:extLst>
-            </a:blip>
-            <a:stretch>
-              <a:fillRect/>
-            </a:stretch>
-          </p:blipFill>
-          <p:spPr>
-            <a:xfrm>
-              <a:off x="683568" y="1628558"/>
-              <a:ext cx="4241884" cy="253019"/>
-            </a:xfrm>
-            <a:prstGeom prst="rect">
-              <a:avLst/>
-            </a:prstGeom>
-          </p:spPr>
-        </p:pic>
-        <p:pic>
-          <p:nvPicPr>
-            <p:cNvPr id="13" name="Grafik 12"/>
-            <p:cNvPicPr>
-              <a:picLocks noChangeAspect="1"/>
-            </p:cNvPicPr>
-            <p:nvPr>
-              <p:custDataLst>
-                <p:tags r:id="rId2"/>
-              </p:custDataLst>
-            </p:nvPr>
-          </p:nvPicPr>
-          <p:blipFill>
-            <a:blip r:embed="rId7" cstate="print">
-              <a:extLst>
-                <a:ext uri="{28A0092B-C50C-407E-A947-70E740481C1C}">
-                  <a14:useLocalDpi xmlns:a14="http://schemas.microsoft.com/office/drawing/2010/main" val="0"/>
-                </a:ext>
-              </a:extLst>
-            </a:blip>
-            <a:stretch>
-              <a:fillRect/>
-            </a:stretch>
-          </p:blipFill>
-          <p:spPr>
-            <a:xfrm>
-              <a:off x="683568" y="3110392"/>
-              <a:ext cx="6840760" cy="259320"/>
-            </a:xfrm>
-            <a:prstGeom prst="rect">
-              <a:avLst/>
-            </a:prstGeom>
-          </p:spPr>
-        </p:pic>
-        <p:pic>
-          <p:nvPicPr>
-            <p:cNvPr id="14" name="Grafik 13"/>
-            <p:cNvPicPr>
-              <a:picLocks noChangeAspect="1"/>
-            </p:cNvPicPr>
-            <p:nvPr>
-              <p:custDataLst>
-                <p:tags r:id="rId3"/>
-              </p:custDataLst>
-            </p:nvPr>
-          </p:nvPicPr>
-          <p:blipFill>
-            <a:blip r:embed="rId8" cstate="print">
-              <a:extLst>
-                <a:ext uri="{28A0092B-C50C-407E-A947-70E740481C1C}">
-                  <a14:useLocalDpi xmlns:a14="http://schemas.microsoft.com/office/drawing/2010/main" val="0"/>
-                </a:ext>
-              </a:extLst>
-            </a:blip>
-            <a:stretch>
-              <a:fillRect/>
-            </a:stretch>
-          </p:blipFill>
-          <p:spPr>
-            <a:xfrm>
-              <a:off x="683568" y="2381704"/>
-              <a:ext cx="6674525" cy="253019"/>
-            </a:xfrm>
-            <a:prstGeom prst="rect">
-              <a:avLst/>
-            </a:prstGeom>
-          </p:spPr>
-        </p:pic>
-        <p:pic>
-          <p:nvPicPr>
-            <p:cNvPr id="15" name="Grafik 14"/>
-            <p:cNvPicPr>
-              <a:picLocks noChangeAspect="1"/>
-            </p:cNvPicPr>
-            <p:nvPr>
-              <p:custDataLst>
-                <p:tags r:id="rId4"/>
-              </p:custDataLst>
-            </p:nvPr>
-          </p:nvPicPr>
-          <p:blipFill>
-            <a:blip r:embed="rId9" cstate="print">
-              <a:extLst>
-                <a:ext uri="{28A0092B-C50C-407E-A947-70E740481C1C}">
-                  <a14:useLocalDpi xmlns:a14="http://schemas.microsoft.com/office/drawing/2010/main" val="0"/>
-                </a:ext>
-              </a:extLst>
-            </a:blip>
-            <a:stretch>
-              <a:fillRect/>
-            </a:stretch>
-          </p:blipFill>
-          <p:spPr>
-            <a:xfrm>
-              <a:off x="680953" y="3845309"/>
-              <a:ext cx="4147574" cy="259320"/>
-            </a:xfrm>
-            <a:prstGeom prst="rect">
-              <a:avLst/>
-            </a:prstGeom>
-          </p:spPr>
-        </p:pic>
-      </p:grpSp>
       <p:sp>
         <p:nvSpPr>
           <p:cNvPr id="2" name="Titel 1"/>
@@ -7746,7 +8963,7 @@
           <a:p>
             <a:fld id="{296000BE-0612-4D88-A1AC-FF1287139C2E}" type="datetime1">
               <a:rPr lang="de-DE" smtClean="0"/>
-              <a:t>19.06.2015</a:t>
+              <a:t>20.06.2015</a:t>
             </a:fld>
             <a:endParaRPr lang="de-DE" dirty="0"/>
           </a:p>
@@ -7802,6 +9019,142 @@
           </a:p>
         </p:txBody>
       </p:sp>
+      <p:pic>
+        <p:nvPicPr>
+          <p:cNvPr id="12" name="Grafik 11"/>
+          <p:cNvPicPr>
+            <a:picLocks noChangeAspect="1"/>
+          </p:cNvPicPr>
+          <p:nvPr>
+            <p:custDataLst>
+              <p:tags r:id="rId1"/>
+            </p:custDataLst>
+          </p:nvPr>
+        </p:nvPicPr>
+        <p:blipFill>
+          <a:blip r:embed="rId6" cstate="print">
+            <a:extLst>
+              <a:ext uri="{28A0092B-C50C-407E-A947-70E740481C1C}">
+                <a14:useLocalDpi xmlns:a14="http://schemas.microsoft.com/office/drawing/2010/main" val="0"/>
+              </a:ext>
+            </a:extLst>
+          </a:blip>
+          <a:stretch>
+            <a:fillRect/>
+          </a:stretch>
+        </p:blipFill>
+        <p:spPr>
+          <a:xfrm>
+            <a:off x="680953" y="3114682"/>
+            <a:ext cx="6843375" cy="257948"/>
+          </a:xfrm>
+          <a:prstGeom prst="rect">
+            <a:avLst/>
+          </a:prstGeom>
+        </p:spPr>
+      </p:pic>
+      <p:pic>
+        <p:nvPicPr>
+          <p:cNvPr id="17" name="Grafik 16"/>
+          <p:cNvPicPr>
+            <a:picLocks noChangeAspect="1"/>
+          </p:cNvPicPr>
+          <p:nvPr>
+            <p:custDataLst>
+              <p:tags r:id="rId2"/>
+            </p:custDataLst>
+          </p:nvPr>
+        </p:nvPicPr>
+        <p:blipFill>
+          <a:blip r:embed="rId7" cstate="print">
+            <a:extLst>
+              <a:ext uri="{28A0092B-C50C-407E-A947-70E740481C1C}">
+                <a14:useLocalDpi xmlns:a14="http://schemas.microsoft.com/office/drawing/2010/main" val="0"/>
+              </a:ext>
+            </a:extLst>
+          </a:blip>
+          <a:stretch>
+            <a:fillRect/>
+          </a:stretch>
+        </p:blipFill>
+        <p:spPr>
+          <a:xfrm>
+            <a:off x="683568" y="2381704"/>
+            <a:ext cx="6613558" cy="253019"/>
+          </a:xfrm>
+          <a:prstGeom prst="rect">
+            <a:avLst/>
+          </a:prstGeom>
+        </p:spPr>
+      </p:pic>
+      <p:pic>
+        <p:nvPicPr>
+          <p:cNvPr id="18" name="Grafik 17"/>
+          <p:cNvPicPr>
+            <a:picLocks noChangeAspect="1"/>
+          </p:cNvPicPr>
+          <p:nvPr>
+            <p:custDataLst>
+              <p:tags r:id="rId3"/>
+            </p:custDataLst>
+          </p:nvPr>
+        </p:nvPicPr>
+        <p:blipFill>
+          <a:blip r:embed="rId8" cstate="print">
+            <a:extLst>
+              <a:ext uri="{28A0092B-C50C-407E-A947-70E740481C1C}">
+                <a14:useLocalDpi xmlns:a14="http://schemas.microsoft.com/office/drawing/2010/main" val="0"/>
+              </a:ext>
+            </a:extLst>
+          </a:blip>
+          <a:stretch>
+            <a:fillRect/>
+          </a:stretch>
+        </p:blipFill>
+        <p:spPr>
+          <a:xfrm>
+            <a:off x="680954" y="3845309"/>
+            <a:ext cx="4153823" cy="259320"/>
+          </a:xfrm>
+          <a:prstGeom prst="rect">
+            <a:avLst/>
+          </a:prstGeom>
+        </p:spPr>
+      </p:pic>
+      <p:pic>
+        <p:nvPicPr>
+          <p:cNvPr id="19" name="Grafik 18"/>
+          <p:cNvPicPr>
+            <a:picLocks noChangeAspect="1"/>
+          </p:cNvPicPr>
+          <p:nvPr>
+            <p:custDataLst>
+              <p:tags r:id="rId4"/>
+            </p:custDataLst>
+          </p:nvPr>
+        </p:nvPicPr>
+        <p:blipFill>
+          <a:blip r:embed="rId9" cstate="print">
+            <a:extLst>
+              <a:ext uri="{28A0092B-C50C-407E-A947-70E740481C1C}">
+                <a14:useLocalDpi xmlns:a14="http://schemas.microsoft.com/office/drawing/2010/main" val="0"/>
+              </a:ext>
+            </a:extLst>
+          </a:blip>
+          <a:stretch>
+            <a:fillRect/>
+          </a:stretch>
+        </p:blipFill>
+        <p:spPr>
+          <a:xfrm>
+            <a:off x="683568" y="1628558"/>
+            <a:ext cx="4180914" cy="253019"/>
+          </a:xfrm>
+          <a:prstGeom prst="rect">
+            <a:avLst/>
+          </a:prstGeom>
+        </p:spPr>
+      </p:pic>
     </p:spTree>
     <p:extLst>
       <p:ext uri="{BB962C8B-B14F-4D97-AF65-F5344CB8AC3E}">
@@ -7812,10 +9165,204 @@
   <p:clrMapOvr>
     <a:masterClrMapping/>
   </p:clrMapOvr>
+  <mc:AlternateContent xmlns:mc="http://schemas.openxmlformats.org/markup-compatibility/2006">
+    <mc:Choice xmlns:p14="http://schemas.microsoft.com/office/powerpoint/2010/main" Requires="p14">
+      <p:transition spd="med" p14:dur="700">
+        <p:fade/>
+      </p:transition>
+    </mc:Choice>
+    <mc:Fallback>
+      <p:transition spd="med">
+        <p:fade/>
+      </p:transition>
+    </mc:Fallback>
+  </mc:AlternateContent>
   <p:timing>
     <p:tnLst>
       <p:par>
-        <p:cTn id="1" dur="indefinite" restart="never" nodeType="tmRoot"/>
+        <p:cTn id="1" dur="indefinite" restart="never" nodeType="tmRoot">
+          <p:childTnLst>
+            <p:seq concurrent="1" nextAc="seek">
+              <p:cTn id="2" dur="indefinite" nodeType="mainSeq">
+                <p:childTnLst>
+                  <p:par>
+                    <p:cTn id="3" fill="hold">
+                      <p:stCondLst>
+                        <p:cond delay="indefinite"/>
+                      </p:stCondLst>
+                      <p:childTnLst>
+                        <p:par>
+                          <p:cTn id="4" fill="hold">
+                            <p:stCondLst>
+                              <p:cond delay="0"/>
+                            </p:stCondLst>
+                            <p:childTnLst>
+                              <p:par>
+                                <p:cTn id="5" presetID="10" presetClass="entr" presetSubtype="0" fill="hold" nodeType="clickEffect">
+                                  <p:stCondLst>
+                                    <p:cond delay="0"/>
+                                  </p:stCondLst>
+                                  <p:childTnLst>
+                                    <p:set>
+                                      <p:cBhvr>
+                                        <p:cTn id="6" dur="1" fill="hold">
+                                          <p:stCondLst>
+                                            <p:cond delay="0"/>
+                                          </p:stCondLst>
+                                        </p:cTn>
+                                        <p:tgtEl>
+                                          <p:spTgt spid="17"/>
+                                        </p:tgtEl>
+                                        <p:attrNameLst>
+                                          <p:attrName>style.visibility</p:attrName>
+                                        </p:attrNameLst>
+                                      </p:cBhvr>
+                                      <p:to>
+                                        <p:strVal val="visible"/>
+                                      </p:to>
+                                    </p:set>
+                                    <p:animEffect transition="in" filter="fade">
+                                      <p:cBhvr>
+                                        <p:cTn id="7" dur="500"/>
+                                        <p:tgtEl>
+                                          <p:spTgt spid="17"/>
+                                        </p:tgtEl>
+                                      </p:cBhvr>
+                                    </p:animEffect>
+                                  </p:childTnLst>
+                                </p:cTn>
+                              </p:par>
+                            </p:childTnLst>
+                          </p:cTn>
+                        </p:par>
+                      </p:childTnLst>
+                    </p:cTn>
+                  </p:par>
+                  <p:par>
+                    <p:cTn id="8" fill="hold">
+                      <p:stCondLst>
+                        <p:cond delay="indefinite"/>
+                      </p:stCondLst>
+                      <p:childTnLst>
+                        <p:par>
+                          <p:cTn id="9" fill="hold">
+                            <p:stCondLst>
+                              <p:cond delay="0"/>
+                            </p:stCondLst>
+                            <p:childTnLst>
+                              <p:par>
+                                <p:cTn id="10" presetID="10" presetClass="entr" presetSubtype="0" fill="hold" nodeType="clickEffect">
+                                  <p:stCondLst>
+                                    <p:cond delay="0"/>
+                                  </p:stCondLst>
+                                  <p:childTnLst>
+                                    <p:set>
+                                      <p:cBhvr>
+                                        <p:cTn id="11" dur="1" fill="hold">
+                                          <p:stCondLst>
+                                            <p:cond delay="0"/>
+                                          </p:stCondLst>
+                                        </p:cTn>
+                                        <p:tgtEl>
+                                          <p:spTgt spid="12"/>
+                                        </p:tgtEl>
+                                        <p:attrNameLst>
+                                          <p:attrName>style.visibility</p:attrName>
+                                        </p:attrNameLst>
+                                      </p:cBhvr>
+                                      <p:to>
+                                        <p:strVal val="visible"/>
+                                      </p:to>
+                                    </p:set>
+                                    <p:animEffect transition="in" filter="fade">
+                                      <p:cBhvr>
+                                        <p:cTn id="12" dur="500"/>
+                                        <p:tgtEl>
+                                          <p:spTgt spid="12"/>
+                                        </p:tgtEl>
+                                      </p:cBhvr>
+                                    </p:animEffect>
+                                  </p:childTnLst>
+                                </p:cTn>
+                              </p:par>
+                            </p:childTnLst>
+                          </p:cTn>
+                        </p:par>
+                      </p:childTnLst>
+                    </p:cTn>
+                  </p:par>
+                  <p:par>
+                    <p:cTn id="13" fill="hold">
+                      <p:stCondLst>
+                        <p:cond delay="indefinite"/>
+                      </p:stCondLst>
+                      <p:childTnLst>
+                        <p:par>
+                          <p:cTn id="14" fill="hold">
+                            <p:stCondLst>
+                              <p:cond delay="0"/>
+                            </p:stCondLst>
+                            <p:childTnLst>
+                              <p:par>
+                                <p:cTn id="15" presetID="10" presetClass="entr" presetSubtype="0" fill="hold" nodeType="clickEffect">
+                                  <p:stCondLst>
+                                    <p:cond delay="0"/>
+                                  </p:stCondLst>
+                                  <p:childTnLst>
+                                    <p:set>
+                                      <p:cBhvr>
+                                        <p:cTn id="16" dur="1" fill="hold">
+                                          <p:stCondLst>
+                                            <p:cond delay="0"/>
+                                          </p:stCondLst>
+                                        </p:cTn>
+                                        <p:tgtEl>
+                                          <p:spTgt spid="18"/>
+                                        </p:tgtEl>
+                                        <p:attrNameLst>
+                                          <p:attrName>style.visibility</p:attrName>
+                                        </p:attrNameLst>
+                                      </p:cBhvr>
+                                      <p:to>
+                                        <p:strVal val="visible"/>
+                                      </p:to>
+                                    </p:set>
+                                    <p:animEffect transition="in" filter="fade">
+                                      <p:cBhvr>
+                                        <p:cTn id="17" dur="500"/>
+                                        <p:tgtEl>
+                                          <p:spTgt spid="18"/>
+                                        </p:tgtEl>
+                                      </p:cBhvr>
+                                    </p:animEffect>
+                                  </p:childTnLst>
+                                </p:cTn>
+                              </p:par>
+                            </p:childTnLst>
+                          </p:cTn>
+                        </p:par>
+                      </p:childTnLst>
+                    </p:cTn>
+                  </p:par>
+                </p:childTnLst>
+              </p:cTn>
+              <p:prevCondLst>
+                <p:cond evt="onPrev" delay="0">
+                  <p:tgtEl>
+                    <p:sldTgt/>
+                  </p:tgtEl>
+                </p:cond>
+              </p:prevCondLst>
+              <p:nextCondLst>
+                <p:cond evt="onNext" delay="0">
+                  <p:tgtEl>
+                    <p:sldTgt/>
+                  </p:tgtEl>
+                </p:cond>
+              </p:nextCondLst>
+            </p:seq>
+          </p:childTnLst>
+        </p:cTn>
       </p:par>
     </p:tnLst>
   </p:timing>
@@ -7879,7 +9426,7 @@
           <a:p>
             <a:fld id="{296000BE-0612-4D88-A1AC-FF1287139C2E}" type="datetime1">
               <a:rPr lang="de-DE" smtClean="0"/>
-              <a:t>19.06.2015</a:t>
+              <a:t>20.06.2015</a:t>
             </a:fld>
             <a:endParaRPr lang="de-DE" dirty="0"/>
           </a:p>
@@ -7951,13 +9498,13 @@
               </a:ext>
             </a:extLst>
           </a:blip>
-          <a:srcRect l="10262" r="6809"/>
+          <a:srcRect l="9759" r="7743"/>
           <a:stretch/>
         </p:blipFill>
         <p:spPr>
           <a:xfrm>
-            <a:off x="431534" y="1779662"/>
-            <a:ext cx="8368108" cy="2522654"/>
+            <a:off x="395536" y="1707654"/>
+            <a:ext cx="8344227" cy="2528588"/>
           </a:xfrm>
           <a:prstGeom prst="rect">
             <a:avLst/>
@@ -7966,7 +9513,7 @@
       </p:pic>
       <p:pic>
         <p:nvPicPr>
-          <p:cNvPr id="14" name="Grafik 13"/>
+          <p:cNvPr id="17" name="Grafik 16"/>
           <p:cNvPicPr>
             <a:picLocks noChangeAspect="1"/>
           </p:cNvPicPr>
@@ -7990,8 +9537,8 @@
         </p:blipFill>
         <p:spPr>
           <a:xfrm>
-            <a:off x="3055408" y="1347614"/>
-            <a:ext cx="3033183" cy="230156"/>
+            <a:off x="3185950" y="1345698"/>
+            <a:ext cx="2763398" cy="230156"/>
           </a:xfrm>
           <a:prstGeom prst="rect">
             <a:avLst/>
@@ -8000,7 +9547,7 @@
       </p:pic>
       <p:pic>
         <p:nvPicPr>
-          <p:cNvPr id="10" name="einfache">
+          <p:cNvPr id="7" name="einfache">
             <a:hlinkClick r:id="" action="ppaction://media"/>
           </p:cNvPr>
           <p:cNvPicPr>
@@ -8023,7 +9570,7 @@
         </p:blipFill>
         <p:spPr>
           <a:xfrm>
-            <a:off x="1259632" y="4253511"/>
+            <a:off x="1193798" y="4232962"/>
             <a:ext cx="609600" cy="609600"/>
           </a:xfrm>
           <a:prstGeom prst="rect">
@@ -8033,7 +9580,7 @@
       </p:pic>
       <p:pic>
         <p:nvPicPr>
-          <p:cNvPr id="11" name="geschachtelt">
+          <p:cNvPr id="8" name="Parallelschaltung">
             <a:hlinkClick r:id="" action="ppaction://media"/>
           </p:cNvPr>
           <p:cNvPicPr>
@@ -8056,7 +9603,7 @@
         </p:blipFill>
         <p:spPr>
           <a:xfrm>
-            <a:off x="3323149" y="4251324"/>
+            <a:off x="3305819" y="4232962"/>
             <a:ext cx="609600" cy="609600"/>
           </a:xfrm>
           <a:prstGeom prst="rect">
@@ -8066,7 +9613,7 @@
       </p:pic>
       <p:pic>
         <p:nvPicPr>
-          <p:cNvPr id="13" name="inReihe">
+          <p:cNvPr id="9" name="kaskadenschaltung">
             <a:hlinkClick r:id="" action="ppaction://media"/>
           </p:cNvPr>
           <p:cNvPicPr>
@@ -8089,7 +9636,7 @@
         </p:blipFill>
         <p:spPr>
           <a:xfrm>
-            <a:off x="5386666" y="4251324"/>
+            <a:off x="5417840" y="4232962"/>
             <a:ext cx="609600" cy="609600"/>
           </a:xfrm>
           <a:prstGeom prst="rect">
@@ -8099,7 +9646,7 @@
       </p:pic>
       <p:pic>
         <p:nvPicPr>
-          <p:cNvPr id="15" name="feedback">
+          <p:cNvPr id="16" name="feedback">
             <a:hlinkClick r:id="" action="ppaction://media"/>
           </p:cNvPr>
           <p:cNvPicPr>
@@ -8109,9 +9656,7 @@
             <a:audioFile r:link="rId9"/>
             <p:extLst>
               <p:ext uri="{DAA4B4D4-6D71-4841-9C94-3DE7FCFB9230}">
-                <p14:media xmlns:p14="http://schemas.microsoft.com/office/powerpoint/2010/main" r:embed="rId8">
-                  <p14:fade in="100" out="100"/>
-                </p14:media>
+                <p14:media xmlns:p14="http://schemas.microsoft.com/office/powerpoint/2010/main" r:embed="rId8"/>
               </p:ext>
             </p:extLst>
           </p:nvPr>
@@ -8124,7 +9669,7 @@
         </p:blipFill>
         <p:spPr>
           <a:xfrm>
-            <a:off x="7450183" y="4251324"/>
+            <a:off x="7529861" y="4232962"/>
             <a:ext cx="609600" cy="609600"/>
           </a:xfrm>
           <a:prstGeom prst="rect">
@@ -8142,6 +9687,18 @@
   <p:clrMapOvr>
     <a:masterClrMapping/>
   </p:clrMapOvr>
+  <mc:AlternateContent xmlns:mc="http://schemas.openxmlformats.org/markup-compatibility/2006">
+    <mc:Choice xmlns:p14="http://schemas.microsoft.com/office/powerpoint/2010/main" Requires="p14">
+      <p:transition spd="med" p14:dur="700">
+        <p:fade/>
+      </p:transition>
+    </mc:Choice>
+    <mc:Fallback>
+      <p:transition spd="med">
+        <p:fade/>
+      </p:transition>
+    </mc:Fallback>
+  </mc:AlternateContent>
   <p:timing>
     <p:tnLst>
       <p:par>
@@ -8152,7 +9709,7 @@
                 <p:stCondLst>
                   <p:cond evt="onClick" delay="0">
                     <p:tgtEl>
-                      <p:spTgt spid="10"/>
+                      <p:spTgt spid="7"/>
                     </p:tgtEl>
                   </p:cond>
                 </p:stCondLst>
@@ -8182,7 +9739,7 @@
                                       <p:cBhvr>
                                         <p:cTn id="6" dur="2037" fill="hold"/>
                                         <p:tgtEl>
-                                          <p:spTgt spid="10"/>
+                                          <p:spTgt spid="7"/>
                                         </p:tgtEl>
                                       </p:cBhvr>
                                     </p:cmd>
@@ -8200,7 +9757,7 @@
               <p:nextCondLst>
                 <p:cond evt="onClick" delay="0">
                   <p:tgtEl>
-                    <p:spTgt spid="10"/>
+                    <p:spTgt spid="7"/>
                   </p:tgtEl>
                 </p:cond>
               </p:nextCondLst>
@@ -8220,7 +9777,7 @@
                   </p:endCondLst>
                 </p:cTn>
                 <p:tgtEl>
-                  <p:spTgt spid="10"/>
+                  <p:spTgt spid="7"/>
                 </p:tgtEl>
               </p:cMediaNode>
             </p:audio>
@@ -8229,7 +9786,7 @@
                 <p:stCondLst>
                   <p:cond evt="onClick" delay="0">
                     <p:tgtEl>
-                      <p:spTgt spid="11"/>
+                      <p:spTgt spid="8"/>
                     </p:tgtEl>
                   </p:cond>
                 </p:stCondLst>
@@ -8259,7 +9816,7 @@
                                       <p:cBhvr>
                                         <p:cTn id="12" dur="2037" fill="hold"/>
                                         <p:tgtEl>
-                                          <p:spTgt spid="11"/>
+                                          <p:spTgt spid="8"/>
                                         </p:tgtEl>
                                       </p:cBhvr>
                                     </p:cmd>
@@ -8277,7 +9834,7 @@
               <p:nextCondLst>
                 <p:cond evt="onClick" delay="0">
                   <p:tgtEl>
-                    <p:spTgt spid="11"/>
+                    <p:spTgt spid="8"/>
                   </p:tgtEl>
                 </p:cond>
               </p:nextCondLst>
@@ -8297,7 +9854,7 @@
                   </p:endCondLst>
                 </p:cTn>
                 <p:tgtEl>
-                  <p:spTgt spid="11"/>
+                  <p:spTgt spid="8"/>
                 </p:tgtEl>
               </p:cMediaNode>
             </p:audio>
@@ -8306,7 +9863,7 @@
                 <p:stCondLst>
                   <p:cond evt="onClick" delay="0">
                     <p:tgtEl>
-                      <p:spTgt spid="13"/>
+                      <p:spTgt spid="9"/>
                     </p:tgtEl>
                   </p:cond>
                 </p:stCondLst>
@@ -8336,7 +9893,7 @@
                                       <p:cBhvr>
                                         <p:cTn id="18" dur="2037" fill="hold"/>
                                         <p:tgtEl>
-                                          <p:spTgt spid="13"/>
+                                          <p:spTgt spid="9"/>
                                         </p:tgtEl>
                                       </p:cBhvr>
                                     </p:cmd>
@@ -8354,7 +9911,7 @@
               <p:nextCondLst>
                 <p:cond evt="onClick" delay="0">
                   <p:tgtEl>
-                    <p:spTgt spid="13"/>
+                    <p:spTgt spid="9"/>
                   </p:tgtEl>
                 </p:cond>
               </p:nextCondLst>
@@ -8374,7 +9931,7 @@
                   </p:endCondLst>
                 </p:cTn>
                 <p:tgtEl>
-                  <p:spTgt spid="13"/>
+                  <p:spTgt spid="9"/>
                 </p:tgtEl>
               </p:cMediaNode>
             </p:audio>
@@ -8383,7 +9940,7 @@
                 <p:stCondLst>
                   <p:cond evt="onClick" delay="0">
                     <p:tgtEl>
-                      <p:spTgt spid="15"/>
+                      <p:spTgt spid="16"/>
                     </p:tgtEl>
                   </p:cond>
                 </p:stCondLst>
@@ -8413,7 +9970,7 @@
                                       <p:cBhvr>
                                         <p:cTn id="24" dur="2037" fill="hold"/>
                                         <p:tgtEl>
-                                          <p:spTgt spid="15"/>
+                                          <p:spTgt spid="16"/>
                                         </p:tgtEl>
                                       </p:cBhvr>
                                     </p:cmd>
@@ -8431,7 +9988,7 @@
               <p:nextCondLst>
                 <p:cond evt="onClick" delay="0">
                   <p:tgtEl>
-                    <p:spTgt spid="15"/>
+                    <p:spTgt spid="16"/>
                   </p:tgtEl>
                 </p:cond>
               </p:nextCondLst>
@@ -8451,7 +10008,7 @@
                   </p:endCondLst>
                 </p:cTn>
                 <p:tgtEl>
-                  <p:spTgt spid="15"/>
+                  <p:spTgt spid="16"/>
                 </p:tgtEl>
               </p:cMediaNode>
             </p:audio>
@@ -8575,7 +10132,7 @@
           <a:p>
             <a:fld id="{296000BE-0612-4D88-A1AC-FF1287139C2E}" type="datetime1">
               <a:rPr lang="de-DE" smtClean="0"/>
-              <a:t>19.06.2015</a:t>
+              <a:t>20.06.2015</a:t>
             </a:fld>
             <a:endParaRPr lang="de-DE" dirty="0"/>
           </a:p>
@@ -8671,6 +10228,18 @@
   <p:clrMapOvr>
     <a:masterClrMapping/>
   </p:clrMapOvr>
+  <mc:AlternateContent xmlns:mc="http://schemas.openxmlformats.org/markup-compatibility/2006">
+    <mc:Choice xmlns:p14="http://schemas.microsoft.com/office/powerpoint/2010/main" Requires="p14">
+      <p:transition spd="med" p14:dur="700">
+        <p:fade/>
+      </p:transition>
+    </mc:Choice>
+    <mc:Fallback>
+      <p:transition spd="med">
+        <p:fade/>
+      </p:transition>
+    </mc:Fallback>
+  </mc:AlternateContent>
   <p:timing>
     <p:tnLst>
       <p:par>
@@ -8748,7 +10317,7 @@
           <a:p>
             <a:r>
               <a:rPr lang="de-DE" dirty="0" smtClean="0"/>
-              <a:t>Nehmen während </a:t>
+              <a:t>während </a:t>
             </a:r>
             <a:r>
               <a:rPr lang="de-DE" dirty="0" err="1" smtClean="0"/>
@@ -8756,14 +10325,28 @@
             </a:r>
             <a:r>
               <a:rPr lang="de-DE" dirty="0" smtClean="0"/>
-              <a:t> zu</a:t>
-            </a:r>
-          </a:p>
-          <a:p>
+              <a:t> </a:t>
+            </a:r>
             <a:r>
               <a:rPr lang="de-DE" dirty="0" smtClean="0"/>
-              <a:t>Nehmen während Release ab</a:t>
-            </a:r>
+              <a:t>zunehmend</a:t>
+            </a:r>
+            <a:endParaRPr lang="de-DE" dirty="0" smtClean="0"/>
+          </a:p>
+          <a:p>
+            <a:r>
+              <a:rPr lang="de-DE" dirty="0" smtClean="0"/>
+              <a:t>während </a:t>
+            </a:r>
+            <a:r>
+              <a:rPr lang="de-DE" dirty="0" smtClean="0"/>
+              <a:t>Release </a:t>
+            </a:r>
+            <a:r>
+              <a:rPr lang="de-DE" dirty="0" smtClean="0"/>
+              <a:t>abnehmend</a:t>
+            </a:r>
+            <a:endParaRPr lang="de-DE" dirty="0" smtClean="0"/>
           </a:p>
           <a:p>
             <a:pPr marL="0" indent="0">
@@ -8785,19 +10368,7 @@
             </a:r>
             <a:r>
               <a:rPr lang="de-DE" dirty="0" smtClean="0"/>
-              <a:t> Modulationsindex </a:t>
-            </a:r>
-            <a:r>
-              <a:rPr lang="de-DE" dirty="0" smtClean="0"/>
-              <a:t>mit </a:t>
-            </a:r>
-            <a:r>
-              <a:rPr lang="de-DE" dirty="0" smtClean="0"/>
-              <a:t>Hüllkurve </a:t>
-            </a:r>
-            <a:r>
-              <a:rPr lang="de-DE" dirty="0" smtClean="0"/>
-              <a:t>modulieren</a:t>
+              <a:t> Modulationsindex mit Hüllkurve modulieren</a:t>
             </a:r>
             <a:endParaRPr lang="en-US" dirty="0"/>
           </a:p>
@@ -8820,7 +10391,7 @@
           <a:p>
             <a:fld id="{296000BE-0612-4D88-A1AC-FF1287139C2E}" type="datetime1">
               <a:rPr lang="de-DE" smtClean="0"/>
-              <a:t>19.06.2015</a:t>
+              <a:t>20.06.2015</a:t>
             </a:fld>
             <a:endParaRPr lang="de-DE" dirty="0"/>
           </a:p>
@@ -8886,6 +10457,18 @@
   <p:clrMapOvr>
     <a:masterClrMapping/>
   </p:clrMapOvr>
+  <mc:AlternateContent xmlns:mc="http://schemas.openxmlformats.org/markup-compatibility/2006">
+    <mc:Choice xmlns:p14="http://schemas.microsoft.com/office/powerpoint/2010/main" Requires="p14">
+      <p:transition spd="med" p14:dur="700">
+        <p:fade/>
+      </p:transition>
+    </mc:Choice>
+    <mc:Fallback>
+      <p:transition spd="med">
+        <p:fade/>
+      </p:transition>
+    </mc:Fallback>
+  </mc:AlternateContent>
   <p:timing>
     <p:tnLst>
       <p:par>
@@ -9019,7 +10602,7 @@
           <a:p>
             <a:fld id="{296000BE-0612-4D88-A1AC-FF1287139C2E}" type="datetime1">
               <a:rPr lang="de-DE" smtClean="0"/>
-              <a:t>19.06.2015</a:t>
+              <a:t>20.06.2015</a:t>
             </a:fld>
             <a:endParaRPr lang="de-DE" dirty="0"/>
           </a:p>
@@ -9115,12 +10698,304 @@
   <p:clrMapOvr>
     <a:masterClrMapping/>
   </p:clrMapOvr>
+  <mc:AlternateContent xmlns:mc="http://schemas.openxmlformats.org/markup-compatibility/2006">
+    <mc:Choice xmlns:p14="http://schemas.microsoft.com/office/powerpoint/2010/main" Requires="p14">
+      <p:transition spd="med" p14:dur="700">
+        <p:fade/>
+      </p:transition>
+    </mc:Choice>
+    <mc:Fallback>
+      <p:transition spd="med">
+        <p:fade/>
+      </p:transition>
+    </mc:Fallback>
+  </mc:AlternateContent>
   <p:timing>
     <p:tnLst>
       <p:par>
-        <p:cTn id="1" dur="indefinite" restart="never" nodeType="tmRoot"/>
+        <p:cTn id="1" dur="indefinite" restart="never" nodeType="tmRoot">
+          <p:childTnLst>
+            <p:seq concurrent="1" nextAc="seek">
+              <p:cTn id="2" dur="indefinite" nodeType="mainSeq">
+                <p:childTnLst>
+                  <p:par>
+                    <p:cTn id="3" fill="hold">
+                      <p:stCondLst>
+                        <p:cond delay="indefinite"/>
+                        <p:cond evt="onBegin" delay="0">
+                          <p:tn val="2"/>
+                        </p:cond>
+                      </p:stCondLst>
+                      <p:childTnLst>
+                        <p:par>
+                          <p:cTn id="4" fill="hold">
+                            <p:stCondLst>
+                              <p:cond delay="0"/>
+                            </p:stCondLst>
+                            <p:childTnLst>
+                              <p:par>
+                                <p:cTn id="5" presetID="10" presetClass="entr" presetSubtype="0" fill="hold" grpId="0" nodeType="withEffect">
+                                  <p:stCondLst>
+                                    <p:cond delay="0"/>
+                                  </p:stCondLst>
+                                  <p:childTnLst>
+                                    <p:set>
+                                      <p:cBhvr>
+                                        <p:cTn id="6" dur="1" fill="hold">
+                                          <p:stCondLst>
+                                            <p:cond delay="0"/>
+                                          </p:stCondLst>
+                                        </p:cTn>
+                                        <p:tgtEl>
+                                          <p:spTgt spid="3">
+                                            <p:txEl>
+                                              <p:pRg st="0" end="0"/>
+                                            </p:txEl>
+                                          </p:spTgt>
+                                        </p:tgtEl>
+                                        <p:attrNameLst>
+                                          <p:attrName>style.visibility</p:attrName>
+                                        </p:attrNameLst>
+                                      </p:cBhvr>
+                                      <p:to>
+                                        <p:strVal val="visible"/>
+                                      </p:to>
+                                    </p:set>
+                                    <p:animEffect transition="in" filter="fade">
+                                      <p:cBhvr>
+                                        <p:cTn id="7" dur="500"/>
+                                        <p:tgtEl>
+                                          <p:spTgt spid="3">
+                                            <p:txEl>
+                                              <p:pRg st="0" end="0"/>
+                                            </p:txEl>
+                                          </p:spTgt>
+                                        </p:tgtEl>
+                                      </p:cBhvr>
+                                    </p:animEffect>
+                                  </p:childTnLst>
+                                </p:cTn>
+                              </p:par>
+                              <p:par>
+                                <p:cTn id="8" presetID="10" presetClass="entr" presetSubtype="0" fill="hold" grpId="0" nodeType="withEffect">
+                                  <p:stCondLst>
+                                    <p:cond delay="0"/>
+                                  </p:stCondLst>
+                                  <p:childTnLst>
+                                    <p:set>
+                                      <p:cBhvr>
+                                        <p:cTn id="9" dur="1" fill="hold">
+                                          <p:stCondLst>
+                                            <p:cond delay="0"/>
+                                          </p:stCondLst>
+                                        </p:cTn>
+                                        <p:tgtEl>
+                                          <p:spTgt spid="3">
+                                            <p:txEl>
+                                              <p:pRg st="1" end="1"/>
+                                            </p:txEl>
+                                          </p:spTgt>
+                                        </p:tgtEl>
+                                        <p:attrNameLst>
+                                          <p:attrName>style.visibility</p:attrName>
+                                        </p:attrNameLst>
+                                      </p:cBhvr>
+                                      <p:to>
+                                        <p:strVal val="visible"/>
+                                      </p:to>
+                                    </p:set>
+                                    <p:animEffect transition="in" filter="fade">
+                                      <p:cBhvr>
+                                        <p:cTn id="10" dur="500"/>
+                                        <p:tgtEl>
+                                          <p:spTgt spid="3">
+                                            <p:txEl>
+                                              <p:pRg st="1" end="1"/>
+                                            </p:txEl>
+                                          </p:spTgt>
+                                        </p:tgtEl>
+                                      </p:cBhvr>
+                                    </p:animEffect>
+                                  </p:childTnLst>
+                                </p:cTn>
+                              </p:par>
+                              <p:par>
+                                <p:cTn id="11" presetID="10" presetClass="entr" presetSubtype="0" fill="hold" grpId="0" nodeType="withEffect">
+                                  <p:stCondLst>
+                                    <p:cond delay="0"/>
+                                  </p:stCondLst>
+                                  <p:childTnLst>
+                                    <p:set>
+                                      <p:cBhvr>
+                                        <p:cTn id="12" dur="1" fill="hold">
+                                          <p:stCondLst>
+                                            <p:cond delay="0"/>
+                                          </p:stCondLst>
+                                        </p:cTn>
+                                        <p:tgtEl>
+                                          <p:spTgt spid="3">
+                                            <p:txEl>
+                                              <p:pRg st="2" end="2"/>
+                                            </p:txEl>
+                                          </p:spTgt>
+                                        </p:tgtEl>
+                                        <p:attrNameLst>
+                                          <p:attrName>style.visibility</p:attrName>
+                                        </p:attrNameLst>
+                                      </p:cBhvr>
+                                      <p:to>
+                                        <p:strVal val="visible"/>
+                                      </p:to>
+                                    </p:set>
+                                    <p:animEffect transition="in" filter="fade">
+                                      <p:cBhvr>
+                                        <p:cTn id="13" dur="500"/>
+                                        <p:tgtEl>
+                                          <p:spTgt spid="3">
+                                            <p:txEl>
+                                              <p:pRg st="2" end="2"/>
+                                            </p:txEl>
+                                          </p:spTgt>
+                                        </p:tgtEl>
+                                      </p:cBhvr>
+                                    </p:animEffect>
+                                  </p:childTnLst>
+                                </p:cTn>
+                              </p:par>
+                              <p:par>
+                                <p:cTn id="14" presetID="10" presetClass="entr" presetSubtype="0" fill="hold" grpId="0" nodeType="withEffect">
+                                  <p:stCondLst>
+                                    <p:cond delay="0"/>
+                                  </p:stCondLst>
+                                  <p:childTnLst>
+                                    <p:set>
+                                      <p:cBhvr>
+                                        <p:cTn id="15" dur="1" fill="hold">
+                                          <p:stCondLst>
+                                            <p:cond delay="0"/>
+                                          </p:stCondLst>
+                                        </p:cTn>
+                                        <p:tgtEl>
+                                          <p:spTgt spid="3">
+                                            <p:txEl>
+                                              <p:pRg st="3" end="3"/>
+                                            </p:txEl>
+                                          </p:spTgt>
+                                        </p:tgtEl>
+                                        <p:attrNameLst>
+                                          <p:attrName>style.visibility</p:attrName>
+                                        </p:attrNameLst>
+                                      </p:cBhvr>
+                                      <p:to>
+                                        <p:strVal val="visible"/>
+                                      </p:to>
+                                    </p:set>
+                                    <p:animEffect transition="in" filter="fade">
+                                      <p:cBhvr>
+                                        <p:cTn id="16" dur="500"/>
+                                        <p:tgtEl>
+                                          <p:spTgt spid="3">
+                                            <p:txEl>
+                                              <p:pRg st="3" end="3"/>
+                                            </p:txEl>
+                                          </p:spTgt>
+                                        </p:tgtEl>
+                                      </p:cBhvr>
+                                    </p:animEffect>
+                                  </p:childTnLst>
+                                </p:cTn>
+                              </p:par>
+                            </p:childTnLst>
+                          </p:cTn>
+                        </p:par>
+                      </p:childTnLst>
+                    </p:cTn>
+                  </p:par>
+                  <p:par>
+                    <p:cTn id="17" fill="hold">
+                      <p:stCondLst>
+                        <p:cond delay="indefinite"/>
+                      </p:stCondLst>
+                      <p:childTnLst>
+                        <p:par>
+                          <p:cTn id="18" fill="hold">
+                            <p:stCondLst>
+                              <p:cond delay="0"/>
+                            </p:stCondLst>
+                            <p:childTnLst>
+                              <p:par>
+                                <p:cTn id="19" presetID="10" presetClass="entr" presetSubtype="0" fill="hold" grpId="0" nodeType="clickEffect">
+                                  <p:stCondLst>
+                                    <p:cond delay="0"/>
+                                  </p:stCondLst>
+                                  <p:childTnLst>
+                                    <p:set>
+                                      <p:cBhvr>
+                                        <p:cTn id="20" dur="1" fill="hold">
+                                          <p:stCondLst>
+                                            <p:cond delay="0"/>
+                                          </p:stCondLst>
+                                        </p:cTn>
+                                        <p:tgtEl>
+                                          <p:spTgt spid="3">
+                                            <p:txEl>
+                                              <p:pRg st="4" end="4"/>
+                                            </p:txEl>
+                                          </p:spTgt>
+                                        </p:tgtEl>
+                                        <p:attrNameLst>
+                                          <p:attrName>style.visibility</p:attrName>
+                                        </p:attrNameLst>
+                                      </p:cBhvr>
+                                      <p:to>
+                                        <p:strVal val="visible"/>
+                                      </p:to>
+                                    </p:set>
+                                    <p:animEffect transition="in" filter="fade">
+                                      <p:cBhvr>
+                                        <p:cTn id="21" dur="500"/>
+                                        <p:tgtEl>
+                                          <p:spTgt spid="3">
+                                            <p:txEl>
+                                              <p:pRg st="4" end="4"/>
+                                            </p:txEl>
+                                          </p:spTgt>
+                                        </p:tgtEl>
+                                      </p:cBhvr>
+                                    </p:animEffect>
+                                  </p:childTnLst>
+                                </p:cTn>
+                              </p:par>
+                            </p:childTnLst>
+                          </p:cTn>
+                        </p:par>
+                      </p:childTnLst>
+                    </p:cTn>
+                  </p:par>
+                </p:childTnLst>
+              </p:cTn>
+              <p:prevCondLst>
+                <p:cond evt="onPrev" delay="0">
+                  <p:tgtEl>
+                    <p:sldTgt/>
+                  </p:tgtEl>
+                </p:cond>
+              </p:prevCondLst>
+              <p:nextCondLst>
+                <p:cond evt="onNext" delay="0">
+                  <p:tgtEl>
+                    <p:sldTgt/>
+                  </p:tgtEl>
+                </p:cond>
+              </p:nextCondLst>
+            </p:seq>
+          </p:childTnLst>
+        </p:cTn>
       </p:par>
     </p:tnLst>
+    <p:bldLst>
+      <p:bldP spid="3" grpId="0" uiExpand="1" build="p"/>
+    </p:bldLst>
   </p:timing>
 </p:sld>
 </file>
@@ -9128,10 +11003,10 @@
 <file path=ppt/tags/tag1.xml><?xml version="1.0" encoding="utf-8"?>
 <p:tagLst xmlns:a="http://schemas.openxmlformats.org/drawingml/2006/main" xmlns:r="http://schemas.openxmlformats.org/officeDocument/2006/relationships" xmlns:p="http://schemas.openxmlformats.org/presentationml/2006/main">
   <p:tag name="ORIGINALHEIGHT" val="124.5174"/>
-  <p:tag name="ORIGINALWIDTH" val="2087.542"/>
-  <p:tag name="LATEXADDIN" val="\documentclass{article}&#10;\usepackage{amsmath}&#10;\pagestyle{empty}&#10;\begin{document}&#10;&#10;$y(t) = \sin(2\pi \cdot t \cdot f_c + I \sin(2\pi \cdot t \cdot f_m ))$&#10;&#10;&#10;\end{document}"/>
+  <p:tag name="ORIGINALWIDTH" val="2057.537"/>
+  <p:tag name="LATEXADDIN" val="\documentclass{article}&#10;\usepackage{amsmath}&#10;\pagestyle{empty}&#10;\begin{document}&#10;&#10;$y(t) = \sin[2\pi \cdot t \cdot f_c + I \sin(2\pi \cdot t \cdot f_m )]$&#10;&#10;&#10;\end{document}"/>
   <p:tag name="IGUANATEXSIZE" val="20"/>
-  <p:tag name="IGUANATEXCURSOR" val="138"/>
+  <p:tag name="IGUANATEXCURSOR" val="151"/>
   <p:tag name="TRANSPARENCY" val="Wahr"/>
   <p:tag name="FILENAME" val=""/>
   <p:tag name="INPUTTYPE" val="0"/>
@@ -9187,11 +11062,11 @@
 
 <file path=ppt/tags/tag5.xml><?xml version="1.0" encoding="utf-8"?>
 <p:tagLst xmlns:a="http://schemas.openxmlformats.org/drawingml/2006/main" xmlns:r="http://schemas.openxmlformats.org/officeDocument/2006/relationships" xmlns:p="http://schemas.openxmlformats.org/presentationml/2006/main">
-  <p:tag name="ORIGINALHEIGHT" val="124.5174"/>
-  <p:tag name="ORIGINALWIDTH" val="2087.542"/>
-  <p:tag name="LATEXADDIN" val="\documentclass{article}&#10;\usepackage{amsmath}&#10;\pagestyle{empty}&#10;\begin{document}&#10;&#10;$y(t) = \sin(2\pi \cdot t \cdot f_c + I \sin(2\pi \cdot t \cdot f_m ))$&#10;&#10;&#10;\end{document}"/>
+  <p:tag name="ORIGINALHEIGHT" val="27.16496"/>
+  <p:tag name="ORIGINALWIDTH" val="720.6893"/>
+  <p:tag name="LATEXADDIN" val="\documentclass{article}&#10;\usepackage{amsmath}&#10;\pagestyle{empty}&#10;\begin{document}&#10;&#10;$y(t) = \sin\{2\pi \cdot t \cdot f_c + I_1 \sin[2\pi \cdot t \cdot f_{m1} + I_2 \sin(2\pi \cdot t \cdot f_{m2} )]\}$&#10;&#10;&#10;\end{document}"/>
   <p:tag name="IGUANATEXSIZE" val="20"/>
-  <p:tag name="IGUANATEXCURSOR" val="138"/>
+  <p:tag name="IGUANATEXCURSOR" val="195"/>
   <p:tag name="TRANSPARENCY" val="Wahr"/>
   <p:tag name="FILENAME" val=""/>
   <p:tag name="INPUTTYPE" val="0"/>
@@ -9203,10 +11078,10 @@
 <file path=ppt/tags/tag6.xml><?xml version="1.0" encoding="utf-8"?>
 <p:tagLst xmlns:a="http://schemas.openxmlformats.org/drawingml/2006/main" xmlns:r="http://schemas.openxmlformats.org/officeDocument/2006/relationships" xmlns:p="http://schemas.openxmlformats.org/presentationml/2006/main">
   <p:tag name="ORIGINALHEIGHT" val="124.5174"/>
-  <p:tag name="ORIGINALWIDTH" val="3284.708"/>
-  <p:tag name="LATEXADDIN" val="\documentclass{article}&#10;\usepackage{amsmath}&#10;\pagestyle{empty}&#10;\begin{document}&#10;&#10;$y(t) = \sin(2\pi \cdot t \cdot f_c + I_1 \sin(2\pi \cdot t \cdot f_{m1} + I_2 \sin(2\pi \cdot t \cdot f_{m2} )))$&#10;&#10;&#10;\end{document}"/>
+  <p:tag name="ORIGINALWIDTH" val="3254.704"/>
+  <p:tag name="LATEXADDIN" val="\documentclass{article}&#10;\usepackage{amsmath}&#10;\pagestyle{empty}&#10;\begin{document}&#10;&#10;$y(t) = \sin[2\pi \cdot t \cdot f_c + I_1 \sin(2\pi \cdot t \cdot f_{m1} ) + I_2 \sin(2\pi \cdot t \cdot f_{m2} )]$&#10;&#10;&#10;\end{document}"/>
   <p:tag name="IGUANATEXSIZE" val="20"/>
-  <p:tag name="IGUANATEXCURSOR" val="121"/>
+  <p:tag name="IGUANATEXCURSOR" val="195"/>
   <p:tag name="TRANSPARENCY" val="Wahr"/>
   <p:tag name="FILENAME" val=""/>
   <p:tag name="INPUTTYPE" val="0"/>
@@ -9218,10 +11093,10 @@
 <file path=ppt/tags/tag7.xml><?xml version="1.0" encoding="utf-8"?>
 <p:tagLst xmlns:a="http://schemas.openxmlformats.org/drawingml/2006/main" xmlns:r="http://schemas.openxmlformats.org/officeDocument/2006/relationships" xmlns:p="http://schemas.openxmlformats.org/presentationml/2006/main">
   <p:tag name="ORIGINALHEIGHT" val="124.5174"/>
-  <p:tag name="ORIGINALWIDTH" val="3284.708"/>
-  <p:tag name="LATEXADDIN" val="\documentclass{article}&#10;\usepackage{amsmath}&#10;\pagestyle{empty}&#10;\begin{document}&#10;&#10;$y(t) = \sin(2\pi \cdot t \cdot f_c + I_1 \sin(2\pi \cdot t \cdot f_{m1} ) + I_2 \sin(2\pi \cdot t \cdot f_{m2} ))$&#10;&#10;&#10;\end{document}"/>
+  <p:tag name="ORIGINALWIDTH" val="1994.528"/>
+  <p:tag name="LATEXADDIN" val="\documentclass{article}&#10;\usepackage{amsmath}&#10;\pagestyle{empty}&#10;\begin{document}&#10;&#10;$y(t) = \sin\{2\pi \cdot t \cdot f_c + I \sin[y(t-1)]\}$&#10;&#10;&#10;\end{document}"/>
   <p:tag name="IGUANATEXSIZE" val="20"/>
-  <p:tag name="IGUANATEXCURSOR" val="121"/>
+  <p:tag name="IGUANATEXCURSOR" val="135"/>
   <p:tag name="TRANSPARENCY" val="Wahr"/>
   <p:tag name="FILENAME" val=""/>
   <p:tag name="INPUTTYPE" val="0"/>
@@ -9233,10 +11108,10 @@
 <file path=ppt/tags/tag8.xml><?xml version="1.0" encoding="utf-8"?>
 <p:tagLst xmlns:a="http://schemas.openxmlformats.org/drawingml/2006/main" xmlns:r="http://schemas.openxmlformats.org/officeDocument/2006/relationships" xmlns:p="http://schemas.openxmlformats.org/presentationml/2006/main">
   <p:tag name="ORIGINALHEIGHT" val="124.5174"/>
-  <p:tag name="ORIGINALWIDTH" val="1991.528"/>
-  <p:tag name="LATEXADDIN" val="\documentclass{article}&#10;\usepackage{amsmath}&#10;\pagestyle{empty}&#10;\begin{document}&#10;&#10;$y(t) = \sin(2\pi \cdot t \cdot f_c + I \sin(y(t-1)))$&#10;&#10;&#10;\end{document}"/>
+  <p:tag name="ORIGINALWIDTH" val="2057.537"/>
+  <p:tag name="LATEXADDIN" val="\documentclass{article}&#10;\usepackage{amsmath}&#10;\pagestyle{empty}&#10;\begin{document}&#10;&#10;$y(t) = \sin[2\pi \cdot t \cdot f_c + I \sin(2\pi \cdot t \cdot f_m )]$&#10;&#10;&#10;\end{document}"/>
   <p:tag name="IGUANATEXSIZE" val="20"/>
-  <p:tag name="IGUANATEXCURSOR" val="120"/>
+  <p:tag name="IGUANATEXCURSOR" val="151"/>
   <p:tag name="TRANSPARENCY" val="Wahr"/>
   <p:tag name="FILENAME" val=""/>
   <p:tag name="INPUTTYPE" val="0"/>
@@ -9248,10 +11123,10 @@
 <file path=ppt/tags/tag9.xml><?xml version="1.0" encoding="utf-8"?>
 <p:tagLst xmlns:a="http://schemas.openxmlformats.org/drawingml/2006/main" xmlns:r="http://schemas.openxmlformats.org/officeDocument/2006/relationships" xmlns:p="http://schemas.openxmlformats.org/presentationml/2006/main">
   <p:tag name="ORIGINALHEIGHT" val="113.2658"/>
-  <p:tag name="ORIGINALWIDTH" val="1492.708"/>
-  <p:tag name="LATEXADDIN" val="\documentclass{article}&#10;\usepackage{amsmath}&#10;\pagestyle{empty}&#10;\begin{document}&#10;&#10;$I = 1, f_c = 1000, f_m = 1000$&#10;&#10;&#10;\end{document}"/>
+  <p:tag name="ORIGINALWIDTH" val="1359.94"/>
+  <p:tag name="LATEXADDIN" val="\documentclass{article}&#10;\usepackage{amsmath}&#10;\pagestyle{empty}&#10;\begin{document}&#10;&#10;$f_c = 500, f_m = 500, I = 1$&#10;&#10;&#10;\end{document}"/>
   <p:tag name="IGUANATEXSIZE" val="20"/>
-  <p:tag name="IGUANATEXCURSOR" val="112"/>
+  <p:tag name="IGUANATEXCURSOR" val="102"/>
   <p:tag name="TRANSPARENCY" val="Wahr"/>
   <p:tag name="FILENAME" val=""/>
   <p:tag name="INPUTTYPE" val="0"/>

</xml_diff>

<commit_message>
Matze verbesserungen & Präsi kürzer
</commit_message>
<xml_diff>
--- a/Praesentation/FMSynthese-Gary.pptx
+++ b/Praesentation/FMSynthese-Gary.pptx
@@ -5,7 +5,7 @@
     <p:sldMasterId id="2147483648" r:id="rId1"/>
   </p:sldMasterIdLst>
   <p:notesMasterIdLst>
-    <p:notesMasterId r:id="rId26"/>
+    <p:notesMasterId r:id="rId21"/>
   </p:notesMasterIdLst>
   <p:sldIdLst>
     <p:sldId id="259" r:id="rId2"/>
@@ -18,20 +18,15 @@
     <p:sldId id="262" r:id="rId9"/>
     <p:sldId id="263" r:id="rId10"/>
     <p:sldId id="271" r:id="rId11"/>
-    <p:sldId id="264" r:id="rId12"/>
-    <p:sldId id="266" r:id="rId13"/>
-    <p:sldId id="267" r:id="rId14"/>
-    <p:sldId id="268" r:id="rId15"/>
-    <p:sldId id="269" r:id="rId16"/>
-    <p:sldId id="270" r:id="rId17"/>
-    <p:sldId id="274" r:id="rId18"/>
-    <p:sldId id="273" r:id="rId19"/>
-    <p:sldId id="280" r:id="rId20"/>
-    <p:sldId id="275" r:id="rId21"/>
-    <p:sldId id="276" r:id="rId22"/>
-    <p:sldId id="279" r:id="rId23"/>
-    <p:sldId id="277" r:id="rId24"/>
-    <p:sldId id="278" r:id="rId25"/>
+    <p:sldId id="282" r:id="rId12"/>
+    <p:sldId id="273" r:id="rId13"/>
+    <p:sldId id="280" r:id="rId14"/>
+    <p:sldId id="275" r:id="rId15"/>
+    <p:sldId id="276" r:id="rId16"/>
+    <p:sldId id="279" r:id="rId17"/>
+    <p:sldId id="277" r:id="rId18"/>
+    <p:sldId id="278" r:id="rId19"/>
+    <p:sldId id="274" r:id="rId20"/>
   </p:sldIdLst>
   <p:sldSz cx="9144000" cy="5143500" type="screen16x9"/>
   <p:notesSz cx="6858000" cy="9144000"/>
@@ -272,7 +267,7 @@
             <a:fld id="{364A5697-ABCF-455C-8519-931EFDD64AAA}" type="datetimeFigureOut">
               <a:rPr lang="de-DE" smtClean="0"/>
               <a:pPr/>
-              <a:t>20.06.2015</a:t>
+              <a:t>21.06.2015</a:t>
             </a:fld>
             <a:endParaRPr lang="de-DE"/>
           </a:p>
@@ -921,7 +916,7 @@
             <a:fld id="{B162E40F-E87F-4C0D-9DAF-92DD7B84B6D5}" type="slidenum">
               <a:rPr lang="de-DE" smtClean="0"/>
               <a:pPr/>
-              <a:t>19</a:t>
+              <a:t>13</a:t>
             </a:fld>
             <a:endParaRPr lang="de-DE"/>
           </a:p>
@@ -1151,10 +1146,10 @@
           <a:bodyPr/>
           <a:lstStyle/>
           <a:p>
-            <a:fld id="{296000BE-0612-4D88-A1AC-FF1287139C2E}" type="datetime1">
+            <a:r>
               <a:rPr lang="de-DE" smtClean="0"/>
-              <a:t>20.06.2015</a:t>
-            </a:fld>
+              <a:t>23.06.2015</a:t>
+            </a:r>
             <a:endParaRPr lang="de-DE" dirty="0"/>
           </a:p>
         </p:txBody>
@@ -1344,10 +1339,10 @@
           <a:bodyPr/>
           <a:lstStyle/>
           <a:p>
-            <a:fld id="{118C39E7-DE90-41C1-AA3B-F993836B02BE}" type="datetime1">
+            <a:r>
               <a:rPr lang="de-DE" smtClean="0"/>
-              <a:t>20.06.2015</a:t>
-            </a:fld>
+              <a:t>23.06.2015</a:t>
+            </a:r>
             <a:endParaRPr lang="de-DE"/>
           </a:p>
         </p:txBody>
@@ -1536,10 +1531,10 @@
           <a:bodyPr/>
           <a:lstStyle/>
           <a:p>
-            <a:fld id="{B1B93457-8CBC-4CBC-AFA6-88355C5DAFDC}" type="datetime1">
+            <a:r>
               <a:rPr lang="de-DE" smtClean="0"/>
-              <a:t>20.06.2015</a:t>
-            </a:fld>
+              <a:t>23.06.2015</a:t>
+            </a:r>
             <a:endParaRPr lang="de-DE"/>
           </a:p>
         </p:txBody>
@@ -1705,7 +1700,11 @@
             <a:pPr lvl="4"/>
             <a:r>
               <a:rPr lang="de-DE" dirty="0" smtClean="0"/>
-              <a:t>Fünfte Ebene</a:t>
+              <a:t>Fünfte </a:t>
+            </a:r>
+            <a:r>
+              <a:rPr lang="de-DE" dirty="0" smtClean="0"/>
+              <a:t>Ebene</a:t>
             </a:r>
             <a:endParaRPr lang="de-DE" dirty="0"/>
           </a:p>
@@ -1726,10 +1725,10 @@
           <a:bodyPr/>
           <a:lstStyle/>
           <a:p>
-            <a:fld id="{296000BE-0612-4D88-A1AC-FF1287139C2E}" type="datetime1">
+            <a:r>
               <a:rPr lang="de-DE" smtClean="0"/>
-              <a:t>20.06.2015</a:t>
-            </a:fld>
+              <a:t>23.06.2015</a:t>
+            </a:r>
             <a:endParaRPr lang="de-DE" dirty="0"/>
           </a:p>
         </p:txBody>
@@ -1994,10 +1993,10 @@
           <a:bodyPr/>
           <a:lstStyle/>
           <a:p>
-            <a:fld id="{C80D71F6-99A2-4718-B360-65885A8D0927}" type="datetime1">
+            <a:r>
               <a:rPr lang="de-DE" smtClean="0"/>
-              <a:t>20.06.2015</a:t>
-            </a:fld>
+              <a:t>23.06.2015</a:t>
+            </a:r>
             <a:endParaRPr lang="de-DE"/>
           </a:p>
         </p:txBody>
@@ -2301,10 +2300,10 @@
           <a:bodyPr/>
           <a:lstStyle/>
           <a:p>
-            <a:fld id="{29DA34F2-331A-4BAF-BC0B-E5952E369A92}" type="datetime1">
+            <a:r>
               <a:rPr lang="de-DE" smtClean="0"/>
-              <a:t>20.06.2015</a:t>
-            </a:fld>
+              <a:t>23.06.2015</a:t>
+            </a:r>
             <a:endParaRPr lang="de-DE"/>
           </a:p>
         </p:txBody>
@@ -2742,10 +2741,10 @@
           <a:bodyPr/>
           <a:lstStyle/>
           <a:p>
-            <a:fld id="{6E10866E-AA72-4753-8ABE-452D5C085871}" type="datetime1">
+            <a:r>
               <a:rPr lang="de-DE" smtClean="0"/>
-              <a:t>20.06.2015</a:t>
-            </a:fld>
+              <a:t>23.06.2015</a:t>
+            </a:r>
             <a:endParaRPr lang="de-DE"/>
           </a:p>
         </p:txBody>
@@ -2879,10 +2878,10 @@
           <a:bodyPr/>
           <a:lstStyle/>
           <a:p>
-            <a:fld id="{A782DF66-3609-46AF-9A5C-DF0EDD34A7DB}" type="datetime1">
+            <a:r>
               <a:rPr lang="de-DE" smtClean="0"/>
-              <a:t>20.06.2015</a:t>
-            </a:fld>
+              <a:t>23.06.2015</a:t>
+            </a:r>
             <a:endParaRPr lang="de-DE"/>
           </a:p>
         </p:txBody>
@@ -2986,10 +2985,10 @@
           <a:bodyPr/>
           <a:lstStyle/>
           <a:p>
-            <a:fld id="{D9A33BE7-191D-4D84-96A8-D32FBF7D1E60}" type="datetime1">
+            <a:r>
               <a:rPr lang="de-DE" smtClean="0"/>
-              <a:t>20.06.2015</a:t>
-            </a:fld>
+              <a:t>23.06.2015</a:t>
+            </a:r>
             <a:endParaRPr lang="de-DE"/>
           </a:p>
         </p:txBody>
@@ -3275,10 +3274,10 @@
           <a:bodyPr/>
           <a:lstStyle/>
           <a:p>
-            <a:fld id="{B525E46A-CAE0-47F8-9D57-934823E6F137}" type="datetime1">
+            <a:r>
               <a:rPr lang="de-DE" smtClean="0"/>
-              <a:t>20.06.2015</a:t>
-            </a:fld>
+              <a:t>23.06.2015</a:t>
+            </a:r>
             <a:endParaRPr lang="de-DE"/>
           </a:p>
         </p:txBody>
@@ -3540,10 +3539,10 @@
           <a:bodyPr/>
           <a:lstStyle/>
           <a:p>
-            <a:fld id="{A77F82AC-1FA4-4A3F-9E15-2C049775FF58}" type="datetime1">
+            <a:r>
               <a:rPr lang="de-DE" smtClean="0"/>
-              <a:t>20.06.2015</a:t>
-            </a:fld>
+              <a:t>23.06.2015</a:t>
+            </a:r>
             <a:endParaRPr lang="de-DE"/>
           </a:p>
         </p:txBody>
@@ -3765,10 +3764,10 @@
             </a:lvl1pPr>
           </a:lstStyle>
           <a:p>
-            <a:fld id="{296000BE-0612-4D88-A1AC-FF1287139C2E}" type="datetime1">
+            <a:r>
               <a:rPr lang="de-DE" smtClean="0"/>
-              <a:t>20.06.2015</a:t>
-            </a:fld>
+              <a:t>23.06.2015</a:t>
+            </a:r>
             <a:endParaRPr lang="de-DE" dirty="0"/>
           </a:p>
         </p:txBody>
@@ -4405,10 +4404,10 @@
           <a:bodyPr/>
           <a:lstStyle/>
           <a:p>
-            <a:fld id="{296000BE-0612-4D88-A1AC-FF1287139C2E}" type="datetime1">
+            <a:r>
               <a:rPr lang="de-DE" smtClean="0"/>
-              <a:t>20.06.2015</a:t>
-            </a:fld>
+              <a:t>23.06.2015</a:t>
+            </a:r>
             <a:endParaRPr lang="de-DE" dirty="0"/>
           </a:p>
         </p:txBody>
@@ -4485,7 +4484,7 @@
         </p:blipFill>
         <p:spPr>
           <a:xfrm>
-            <a:off x="5961517" y="1059582"/>
+            <a:off x="5961518" y="1200151"/>
             <a:ext cx="2760306" cy="3312368"/>
           </a:xfrm>
           <a:prstGeom prst="rect">
@@ -4847,29 +4846,6 @@
       </p:sp>
       <p:sp>
         <p:nvSpPr>
-          <p:cNvPr id="3" name="Inhaltsplatzhalter 2"/>
-          <p:cNvSpPr>
-            <a:spLocks noGrp="1"/>
-          </p:cNvSpPr>
-          <p:nvPr>
-            <p:ph idx="1"/>
-          </p:nvPr>
-        </p:nvSpPr>
-        <p:spPr/>
-        <p:txBody>
-          <a:bodyPr/>
-          <a:lstStyle/>
-          <a:p>
-            <a:r>
-              <a:rPr lang="de-DE" dirty="0" err="1" smtClean="0"/>
-              <a:t>Hochpass</a:t>
-            </a:r>
-            <a:endParaRPr lang="de-DE" dirty="0"/>
-          </a:p>
-        </p:txBody>
-      </p:sp>
-      <p:sp>
-        <p:nvSpPr>
           <p:cNvPr id="4" name="Datumsplatzhalter 3"/>
           <p:cNvSpPr>
             <a:spLocks noGrp="1"/>
@@ -4883,10 +4859,10 @@
           <a:bodyPr/>
           <a:lstStyle/>
           <a:p>
-            <a:fld id="{296000BE-0612-4D88-A1AC-FF1287139C2E}" type="datetime1">
+            <a:r>
               <a:rPr lang="de-DE" smtClean="0"/>
-              <a:t>20.06.2015</a:t>
-            </a:fld>
+              <a:t>23.06.2015</a:t>
+            </a:r>
             <a:endParaRPr lang="de-DE" dirty="0"/>
           </a:p>
         </p:txBody>
@@ -4941,53 +4917,154 @@
           </a:p>
         </p:txBody>
       </p:sp>
-      <p:pic>
-        <p:nvPicPr>
-          <p:cNvPr id="7" name="Grafik 6"/>
-          <p:cNvPicPr>
-            <a:picLocks noChangeAspect="1"/>
-          </p:cNvPicPr>
+      <p:grpSp>
+        <p:nvGrpSpPr>
+          <p:cNvPr id="11" name="Gruppieren 10"/>
+          <p:cNvGrpSpPr/>
           <p:nvPr/>
-        </p:nvPicPr>
-        <p:blipFill>
-          <a:blip r:embed="rId2">
-            <a:extLst>
-              <a:ext uri="{28A0092B-C50C-407E-A947-70E740481C1C}">
-                <a14:useLocalDpi xmlns:a14="http://schemas.microsoft.com/office/drawing/2010/main" val="0"/>
-              </a:ext>
-            </a:extLst>
-          </a:blip>
-          <a:stretch>
-            <a:fillRect/>
-          </a:stretch>
-        </p:blipFill>
-        <p:spPr>
+        </p:nvGrpSpPr>
+        <p:grpSpPr>
           <a:xfrm>
-            <a:off x="650362" y="1923678"/>
-            <a:ext cx="7843275" cy="2376263"/>
+            <a:off x="139225" y="1026043"/>
+            <a:ext cx="8801109" cy="3345907"/>
+            <a:chOff x="139225" y="876902"/>
+            <a:chExt cx="8801109" cy="3345907"/>
           </a:xfrm>
-          <a:prstGeom prst="rect">
-            <a:avLst/>
-          </a:prstGeom>
-        </p:spPr>
-      </p:pic>
+        </p:grpSpPr>
+        <p:pic>
+          <p:nvPicPr>
+            <p:cNvPr id="7" name="Grafik 6"/>
+            <p:cNvPicPr>
+              <a:picLocks noChangeAspect="1"/>
+            </p:cNvPicPr>
+            <p:nvPr/>
+          </p:nvPicPr>
+          <p:blipFill rotWithShape="1">
+            <a:blip r:embed="rId2">
+              <a:extLst>
+                <a:ext uri="{28A0092B-C50C-407E-A947-70E740481C1C}">
+                  <a14:useLocalDpi xmlns:a14="http://schemas.microsoft.com/office/drawing/2010/main" val="0"/>
+                </a:ext>
+              </a:extLst>
+            </a:blip>
+            <a:srcRect l="7768" r="11441"/>
+            <a:stretch/>
+          </p:blipFill>
+          <p:spPr>
+            <a:xfrm>
+              <a:off x="139225" y="876902"/>
+              <a:ext cx="4392488" cy="1647182"/>
+            </a:xfrm>
+            <a:prstGeom prst="rect">
+              <a:avLst/>
+            </a:prstGeom>
+          </p:spPr>
+        </p:pic>
+        <p:pic>
+          <p:nvPicPr>
+            <p:cNvPr id="8" name="Grafik 7"/>
+            <p:cNvPicPr>
+              <a:picLocks noChangeAspect="1"/>
+            </p:cNvPicPr>
+            <p:nvPr/>
+          </p:nvPicPr>
+          <p:blipFill rotWithShape="1">
+            <a:blip r:embed="rId3">
+              <a:extLst>
+                <a:ext uri="{28A0092B-C50C-407E-A947-70E740481C1C}">
+                  <a14:useLocalDpi xmlns:a14="http://schemas.microsoft.com/office/drawing/2010/main" val="0"/>
+                </a:ext>
+              </a:extLst>
+            </a:blip>
+            <a:srcRect l="7768" r="11441"/>
+            <a:stretch/>
+          </p:blipFill>
+          <p:spPr>
+            <a:xfrm>
+              <a:off x="4531713" y="876902"/>
+              <a:ext cx="4402825" cy="1651059"/>
+            </a:xfrm>
+            <a:prstGeom prst="rect">
+              <a:avLst/>
+            </a:prstGeom>
+          </p:spPr>
+        </p:pic>
+        <p:pic>
+          <p:nvPicPr>
+            <p:cNvPr id="9" name="Grafik 8"/>
+            <p:cNvPicPr>
+              <a:picLocks noChangeAspect="1"/>
+            </p:cNvPicPr>
+            <p:nvPr/>
+          </p:nvPicPr>
+          <p:blipFill rotWithShape="1">
+            <a:blip r:embed="rId4">
+              <a:extLst>
+                <a:ext uri="{28A0092B-C50C-407E-A947-70E740481C1C}">
+                  <a14:useLocalDpi xmlns:a14="http://schemas.microsoft.com/office/drawing/2010/main" val="0"/>
+                </a:ext>
+              </a:extLst>
+            </a:blip>
+            <a:srcRect l="7768" r="11441"/>
+            <a:stretch/>
+          </p:blipFill>
+          <p:spPr>
+            <a:xfrm>
+              <a:off x="139225" y="2571749"/>
+              <a:ext cx="4392488" cy="1647183"/>
+            </a:xfrm>
+            <a:prstGeom prst="rect">
+              <a:avLst/>
+            </a:prstGeom>
+          </p:spPr>
+        </p:pic>
+        <p:pic>
+          <p:nvPicPr>
+            <p:cNvPr id="10" name="Grafik 9"/>
+            <p:cNvPicPr>
+              <a:picLocks noChangeAspect="1"/>
+            </p:cNvPicPr>
+            <p:nvPr/>
+          </p:nvPicPr>
+          <p:blipFill rotWithShape="1">
+            <a:blip r:embed="rId5">
+              <a:extLst>
+                <a:ext uri="{28A0092B-C50C-407E-A947-70E740481C1C}">
+                  <a14:useLocalDpi xmlns:a14="http://schemas.microsoft.com/office/drawing/2010/main" val="0"/>
+                </a:ext>
+              </a:extLst>
+            </a:blip>
+            <a:srcRect l="7768" r="11441"/>
+            <a:stretch/>
+          </p:blipFill>
+          <p:spPr>
+            <a:xfrm>
+              <a:off x="4537502" y="2571749"/>
+              <a:ext cx="4402832" cy="1651060"/>
+            </a:xfrm>
+            <a:prstGeom prst="rect">
+              <a:avLst/>
+            </a:prstGeom>
+          </p:spPr>
+        </p:pic>
+      </p:grpSp>
     </p:spTree>
     <p:extLst>
       <p:ext uri="{BB962C8B-B14F-4D97-AF65-F5344CB8AC3E}">
-        <p14:creationId xmlns:p14="http://schemas.microsoft.com/office/powerpoint/2010/main" val="3406687946"/>
+        <p14:creationId xmlns:p14="http://schemas.microsoft.com/office/powerpoint/2010/main" val="2084024516"/>
       </p:ext>
     </p:extLst>
   </p:cSld>
   <p:clrMapOvr>
     <a:masterClrMapping/>
   </p:clrMapOvr>
-  <mc:AlternateContent xmlns:mc="http://schemas.openxmlformats.org/markup-compatibility/2006" xmlns:p14="http://schemas.microsoft.com/office/powerpoint/2010/main">
-    <mc:Choice Requires="p14">
+  <mc:AlternateContent xmlns:mc="http://schemas.openxmlformats.org/markup-compatibility/2006">
+    <mc:Choice xmlns:p14="http://schemas.microsoft.com/office/powerpoint/2010/main" Requires="p14">
       <p:transition spd="med" p14:dur="700">
         <p:fade/>
       </p:transition>
     </mc:Choice>
-    <mc:Fallback xmlns="">
+    <mc:Fallback>
       <p:transition spd="med">
         <p:fade/>
       </p:transition>
@@ -5022,7 +5099,7 @@
       </p:grpSpPr>
       <p:sp>
         <p:nvSpPr>
-          <p:cNvPr id="2" name="Titel 1"/>
+          <p:cNvPr id="7" name="Titel 6"/>
           <p:cNvSpPr>
             <a:spLocks noGrp="1"/>
           </p:cNvSpPr>
@@ -5037,7 +5114,11 @@
           <a:p>
             <a:r>
               <a:rPr lang="de-DE" dirty="0" smtClean="0"/>
-              <a:t>Filter</a:t>
+              <a:t>Tonnachbildung </a:t>
+            </a:r>
+            <a:r>
+              <a:rPr lang="de-DE" dirty="0" err="1" smtClean="0"/>
+              <a:t>praxis</a:t>
             </a:r>
             <a:endParaRPr lang="en-US" dirty="0"/>
           </a:p>
@@ -5045,24 +5126,20 @@
       </p:sp>
       <p:sp>
         <p:nvSpPr>
-          <p:cNvPr id="3" name="Inhaltsplatzhalter 2"/>
-          <p:cNvSpPr>
-            <a:spLocks noGrp="1"/>
-          </p:cNvSpPr>
-          <p:nvPr>
-            <p:ph idx="1"/>
-          </p:nvPr>
-        </p:nvSpPr>
-        <p:spPr/>
-        <p:txBody>
-          <a:bodyPr/>
-          <a:lstStyle/>
-          <a:p>
-            <a:r>
-              <a:rPr lang="de-DE" dirty="0" smtClean="0"/>
-              <a:t>Tiefpass</a:t>
-            </a:r>
-            <a:endParaRPr lang="de-DE" dirty="0"/>
+          <p:cNvPr id="2" name="Textplatzhalter 1"/>
+          <p:cNvSpPr>
+            <a:spLocks noGrp="1"/>
+          </p:cNvSpPr>
+          <p:nvPr>
+            <p:ph type="body" idx="1"/>
+          </p:nvPr>
+        </p:nvSpPr>
+        <p:spPr/>
+        <p:txBody>
+          <a:bodyPr/>
+          <a:lstStyle/>
+          <a:p>
+            <a:endParaRPr lang="en-US"/>
           </a:p>
         </p:txBody>
       </p:sp>
@@ -5081,10 +5158,10 @@
           <a:bodyPr/>
           <a:lstStyle/>
           <a:p>
-            <a:fld id="{296000BE-0612-4D88-A1AC-FF1287139C2E}" type="datetime1">
+            <a:r>
               <a:rPr lang="de-DE" smtClean="0"/>
-              <a:t>20.06.2015</a:t>
-            </a:fld>
+              <a:t>23.06.2015</a:t>
+            </a:r>
             <a:endParaRPr lang="de-DE" dirty="0"/>
           </a:p>
         </p:txBody>
@@ -5139,40 +5216,10 @@
           </a:p>
         </p:txBody>
       </p:sp>
-      <p:pic>
-        <p:nvPicPr>
-          <p:cNvPr id="7" name="Grafik 6"/>
-          <p:cNvPicPr>
-            <a:picLocks noChangeAspect="1"/>
-          </p:cNvPicPr>
-          <p:nvPr/>
-        </p:nvPicPr>
-        <p:blipFill>
-          <a:blip r:embed="rId2">
-            <a:extLst>
-              <a:ext uri="{28A0092B-C50C-407E-A947-70E740481C1C}">
-                <a14:useLocalDpi xmlns:a14="http://schemas.microsoft.com/office/drawing/2010/main" val="0"/>
-              </a:ext>
-            </a:extLst>
-          </a:blip>
-          <a:stretch>
-            <a:fillRect/>
-          </a:stretch>
-        </p:blipFill>
-        <p:spPr>
-          <a:xfrm>
-            <a:off x="650362" y="1923678"/>
-            <a:ext cx="7843275" cy="2376263"/>
-          </a:xfrm>
-          <a:prstGeom prst="rect">
-            <a:avLst/>
-          </a:prstGeom>
-        </p:spPr>
-      </p:pic>
     </p:spTree>
     <p:extLst>
       <p:ext uri="{BB962C8B-B14F-4D97-AF65-F5344CB8AC3E}">
-        <p14:creationId xmlns:p14="http://schemas.microsoft.com/office/powerpoint/2010/main" val="3536602094"/>
+        <p14:creationId xmlns:p14="http://schemas.microsoft.com/office/powerpoint/2010/main" val="4117715782"/>
       </p:ext>
     </p:extLst>
   </p:cSld>
@@ -5220,1308 +5267,6 @@
       </p:grpSpPr>
       <p:sp>
         <p:nvSpPr>
-          <p:cNvPr id="2" name="Titel 1"/>
-          <p:cNvSpPr>
-            <a:spLocks noGrp="1"/>
-          </p:cNvSpPr>
-          <p:nvPr>
-            <p:ph type="title"/>
-          </p:nvPr>
-        </p:nvSpPr>
-        <p:spPr/>
-        <p:txBody>
-          <a:bodyPr/>
-          <a:lstStyle/>
-          <a:p>
-            <a:r>
-              <a:rPr lang="de-DE" dirty="0" smtClean="0"/>
-              <a:t>Filter</a:t>
-            </a:r>
-            <a:endParaRPr lang="en-US" dirty="0"/>
-          </a:p>
-        </p:txBody>
-      </p:sp>
-      <p:sp>
-        <p:nvSpPr>
-          <p:cNvPr id="3" name="Inhaltsplatzhalter 2"/>
-          <p:cNvSpPr>
-            <a:spLocks noGrp="1"/>
-          </p:cNvSpPr>
-          <p:nvPr>
-            <p:ph idx="1"/>
-          </p:nvPr>
-        </p:nvSpPr>
-        <p:spPr/>
-        <p:txBody>
-          <a:bodyPr/>
-          <a:lstStyle/>
-          <a:p>
-            <a:r>
-              <a:rPr lang="de-DE" dirty="0" smtClean="0"/>
-              <a:t>Bandpass</a:t>
-            </a:r>
-            <a:endParaRPr lang="de-DE" dirty="0"/>
-          </a:p>
-        </p:txBody>
-      </p:sp>
-      <p:sp>
-        <p:nvSpPr>
-          <p:cNvPr id="4" name="Datumsplatzhalter 3"/>
-          <p:cNvSpPr>
-            <a:spLocks noGrp="1"/>
-          </p:cNvSpPr>
-          <p:nvPr>
-            <p:ph type="dt" sz="half" idx="10"/>
-          </p:nvPr>
-        </p:nvSpPr>
-        <p:spPr/>
-        <p:txBody>
-          <a:bodyPr/>
-          <a:lstStyle/>
-          <a:p>
-            <a:fld id="{296000BE-0612-4D88-A1AC-FF1287139C2E}" type="datetime1">
-              <a:rPr lang="de-DE" smtClean="0"/>
-              <a:t>20.06.2015</a:t>
-            </a:fld>
-            <a:endParaRPr lang="de-DE" dirty="0"/>
-          </a:p>
-        </p:txBody>
-      </p:sp>
-      <p:sp>
-        <p:nvSpPr>
-          <p:cNvPr id="5" name="Fußzeilenplatzhalter 4"/>
-          <p:cNvSpPr>
-            <a:spLocks noGrp="1"/>
-          </p:cNvSpPr>
-          <p:nvPr>
-            <p:ph type="ftr" sz="quarter" idx="11"/>
-          </p:nvPr>
-        </p:nvSpPr>
-        <p:spPr/>
-        <p:txBody>
-          <a:bodyPr/>
-          <a:lstStyle/>
-          <a:p>
-            <a:r>
-              <a:rPr lang="de-DE" smtClean="0"/>
-              <a:t>FM-Synthese</a:t>
-            </a:r>
-            <a:endParaRPr lang="de-DE" dirty="0"/>
-          </a:p>
-        </p:txBody>
-      </p:sp>
-      <p:sp>
-        <p:nvSpPr>
-          <p:cNvPr id="6" name="Foliennummernplatzhalter 5"/>
-          <p:cNvSpPr>
-            <a:spLocks noGrp="1"/>
-          </p:cNvSpPr>
-          <p:nvPr>
-            <p:ph type="sldNum" sz="quarter" idx="12"/>
-          </p:nvPr>
-        </p:nvSpPr>
-        <p:spPr/>
-        <p:txBody>
-          <a:bodyPr/>
-          <a:lstStyle/>
-          <a:p>
-            <a:fld id="{8740CB20-F870-467D-84CE-AB32061190A1}" type="slidenum">
-              <a:rPr lang="en-US" smtClean="0"/>
-              <a:t>13</a:t>
-            </a:fld>
-            <a:r>
-              <a:rPr lang="de-DE" smtClean="0"/>
-              <a:t>   </a:t>
-            </a:r>
-            <a:endParaRPr lang="de-DE" dirty="0"/>
-          </a:p>
-        </p:txBody>
-      </p:sp>
-      <p:pic>
-        <p:nvPicPr>
-          <p:cNvPr id="7" name="Grafik 6"/>
-          <p:cNvPicPr>
-            <a:picLocks noChangeAspect="1"/>
-          </p:cNvPicPr>
-          <p:nvPr/>
-        </p:nvPicPr>
-        <p:blipFill>
-          <a:blip r:embed="rId2">
-            <a:extLst>
-              <a:ext uri="{28A0092B-C50C-407E-A947-70E740481C1C}">
-                <a14:useLocalDpi xmlns:a14="http://schemas.microsoft.com/office/drawing/2010/main" val="0"/>
-              </a:ext>
-            </a:extLst>
-          </a:blip>
-          <a:stretch>
-            <a:fillRect/>
-          </a:stretch>
-        </p:blipFill>
-        <p:spPr>
-          <a:xfrm>
-            <a:off x="650363" y="1923678"/>
-            <a:ext cx="7843272" cy="2376263"/>
-          </a:xfrm>
-          <a:prstGeom prst="rect">
-            <a:avLst/>
-          </a:prstGeom>
-        </p:spPr>
-      </p:pic>
-    </p:spTree>
-    <p:extLst>
-      <p:ext uri="{BB962C8B-B14F-4D97-AF65-F5344CB8AC3E}">
-        <p14:creationId xmlns:p14="http://schemas.microsoft.com/office/powerpoint/2010/main" val="2121110781"/>
-      </p:ext>
-    </p:extLst>
-  </p:cSld>
-  <p:clrMapOvr>
-    <a:masterClrMapping/>
-  </p:clrMapOvr>
-  <mc:AlternateContent xmlns:mc="http://schemas.openxmlformats.org/markup-compatibility/2006" xmlns:p14="http://schemas.microsoft.com/office/powerpoint/2010/main">
-    <mc:Choice Requires="p14">
-      <p:transition spd="med" p14:dur="700">
-        <p:fade/>
-      </p:transition>
-    </mc:Choice>
-    <mc:Fallback xmlns="">
-      <p:transition spd="med">
-        <p:fade/>
-      </p:transition>
-    </mc:Fallback>
-  </mc:AlternateContent>
-  <p:timing>
-    <p:tnLst>
-      <p:par>
-        <p:cTn id="1" dur="indefinite" restart="never" nodeType="tmRoot"/>
-      </p:par>
-    </p:tnLst>
-  </p:timing>
-</p:sld>
-</file>
-
-<file path=ppt/slides/slide14.xml><?xml version="1.0" encoding="utf-8"?>
-<p:sld xmlns:a="http://schemas.openxmlformats.org/drawingml/2006/main" xmlns:r="http://schemas.openxmlformats.org/officeDocument/2006/relationships" xmlns:p="http://schemas.openxmlformats.org/presentationml/2006/main">
-  <p:cSld>
-    <p:spTree>
-      <p:nvGrpSpPr>
-        <p:cNvPr id="1" name=""/>
-        <p:cNvGrpSpPr/>
-        <p:nvPr/>
-      </p:nvGrpSpPr>
-      <p:grpSpPr>
-        <a:xfrm>
-          <a:off x="0" y="0"/>
-          <a:ext cx="0" cy="0"/>
-          <a:chOff x="0" y="0"/>
-          <a:chExt cx="0" cy="0"/>
-        </a:xfrm>
-      </p:grpSpPr>
-      <p:sp>
-        <p:nvSpPr>
-          <p:cNvPr id="2" name="Titel 1"/>
-          <p:cNvSpPr>
-            <a:spLocks noGrp="1"/>
-          </p:cNvSpPr>
-          <p:nvPr>
-            <p:ph type="title"/>
-          </p:nvPr>
-        </p:nvSpPr>
-        <p:spPr/>
-        <p:txBody>
-          <a:bodyPr/>
-          <a:lstStyle/>
-          <a:p>
-            <a:r>
-              <a:rPr lang="de-DE" dirty="0" smtClean="0"/>
-              <a:t>Filter</a:t>
-            </a:r>
-            <a:endParaRPr lang="en-US" dirty="0"/>
-          </a:p>
-        </p:txBody>
-      </p:sp>
-      <p:sp>
-        <p:nvSpPr>
-          <p:cNvPr id="3" name="Inhaltsplatzhalter 2"/>
-          <p:cNvSpPr>
-            <a:spLocks noGrp="1"/>
-          </p:cNvSpPr>
-          <p:nvPr>
-            <p:ph idx="1"/>
-          </p:nvPr>
-        </p:nvSpPr>
-        <p:spPr/>
-        <p:txBody>
-          <a:bodyPr/>
-          <a:lstStyle/>
-          <a:p>
-            <a:r>
-              <a:rPr lang="de-DE" dirty="0" smtClean="0"/>
-              <a:t>Bandsperre</a:t>
-            </a:r>
-            <a:endParaRPr lang="de-DE" dirty="0"/>
-          </a:p>
-        </p:txBody>
-      </p:sp>
-      <p:sp>
-        <p:nvSpPr>
-          <p:cNvPr id="4" name="Datumsplatzhalter 3"/>
-          <p:cNvSpPr>
-            <a:spLocks noGrp="1"/>
-          </p:cNvSpPr>
-          <p:nvPr>
-            <p:ph type="dt" sz="half" idx="10"/>
-          </p:nvPr>
-        </p:nvSpPr>
-        <p:spPr/>
-        <p:txBody>
-          <a:bodyPr/>
-          <a:lstStyle/>
-          <a:p>
-            <a:fld id="{296000BE-0612-4D88-A1AC-FF1287139C2E}" type="datetime1">
-              <a:rPr lang="de-DE" smtClean="0"/>
-              <a:t>20.06.2015</a:t>
-            </a:fld>
-            <a:endParaRPr lang="de-DE" dirty="0"/>
-          </a:p>
-        </p:txBody>
-      </p:sp>
-      <p:sp>
-        <p:nvSpPr>
-          <p:cNvPr id="5" name="Fußzeilenplatzhalter 4"/>
-          <p:cNvSpPr>
-            <a:spLocks noGrp="1"/>
-          </p:cNvSpPr>
-          <p:nvPr>
-            <p:ph type="ftr" sz="quarter" idx="11"/>
-          </p:nvPr>
-        </p:nvSpPr>
-        <p:spPr/>
-        <p:txBody>
-          <a:bodyPr/>
-          <a:lstStyle/>
-          <a:p>
-            <a:r>
-              <a:rPr lang="de-DE" smtClean="0"/>
-              <a:t>FM-Synthese</a:t>
-            </a:r>
-            <a:endParaRPr lang="de-DE" dirty="0"/>
-          </a:p>
-        </p:txBody>
-      </p:sp>
-      <p:sp>
-        <p:nvSpPr>
-          <p:cNvPr id="6" name="Foliennummernplatzhalter 5"/>
-          <p:cNvSpPr>
-            <a:spLocks noGrp="1"/>
-          </p:cNvSpPr>
-          <p:nvPr>
-            <p:ph type="sldNum" sz="quarter" idx="12"/>
-          </p:nvPr>
-        </p:nvSpPr>
-        <p:spPr/>
-        <p:txBody>
-          <a:bodyPr/>
-          <a:lstStyle/>
-          <a:p>
-            <a:fld id="{8740CB20-F870-467D-84CE-AB32061190A1}" type="slidenum">
-              <a:rPr lang="en-US" smtClean="0"/>
-              <a:t>14</a:t>
-            </a:fld>
-            <a:r>
-              <a:rPr lang="de-DE" smtClean="0"/>
-              <a:t>   </a:t>
-            </a:r>
-            <a:endParaRPr lang="de-DE" dirty="0"/>
-          </a:p>
-        </p:txBody>
-      </p:sp>
-      <p:pic>
-        <p:nvPicPr>
-          <p:cNvPr id="7" name="Grafik 6"/>
-          <p:cNvPicPr>
-            <a:picLocks noChangeAspect="1"/>
-          </p:cNvPicPr>
-          <p:nvPr/>
-        </p:nvPicPr>
-        <p:blipFill>
-          <a:blip r:embed="rId2">
-            <a:extLst>
-              <a:ext uri="{28A0092B-C50C-407E-A947-70E740481C1C}">
-                <a14:useLocalDpi xmlns:a14="http://schemas.microsoft.com/office/drawing/2010/main" val="0"/>
-              </a:ext>
-            </a:extLst>
-          </a:blip>
-          <a:stretch>
-            <a:fillRect/>
-          </a:stretch>
-        </p:blipFill>
-        <p:spPr>
-          <a:xfrm>
-            <a:off x="650363" y="1923678"/>
-            <a:ext cx="7843272" cy="2376262"/>
-          </a:xfrm>
-          <a:prstGeom prst="rect">
-            <a:avLst/>
-          </a:prstGeom>
-        </p:spPr>
-      </p:pic>
-    </p:spTree>
-    <p:extLst>
-      <p:ext uri="{BB962C8B-B14F-4D97-AF65-F5344CB8AC3E}">
-        <p14:creationId xmlns:p14="http://schemas.microsoft.com/office/powerpoint/2010/main" val="3803697138"/>
-      </p:ext>
-    </p:extLst>
-  </p:cSld>
-  <p:clrMapOvr>
-    <a:masterClrMapping/>
-  </p:clrMapOvr>
-  <mc:AlternateContent xmlns:mc="http://schemas.openxmlformats.org/markup-compatibility/2006" xmlns:p14="http://schemas.microsoft.com/office/powerpoint/2010/main">
-    <mc:Choice Requires="p14">
-      <p:transition spd="med" p14:dur="700">
-        <p:fade/>
-      </p:transition>
-    </mc:Choice>
-    <mc:Fallback xmlns="">
-      <p:transition spd="med">
-        <p:fade/>
-      </p:transition>
-    </mc:Fallback>
-  </mc:AlternateContent>
-  <p:timing>
-    <p:tnLst>
-      <p:par>
-        <p:cTn id="1" dur="indefinite" restart="never" nodeType="tmRoot"/>
-      </p:par>
-    </p:tnLst>
-  </p:timing>
-</p:sld>
-</file>
-
-<file path=ppt/slides/slide15.xml><?xml version="1.0" encoding="utf-8"?>
-<p:sld xmlns:a="http://schemas.openxmlformats.org/drawingml/2006/main" xmlns:r="http://schemas.openxmlformats.org/officeDocument/2006/relationships" xmlns:p="http://schemas.openxmlformats.org/presentationml/2006/main">
-  <p:cSld>
-    <p:spTree>
-      <p:nvGrpSpPr>
-        <p:cNvPr id="1" name=""/>
-        <p:cNvGrpSpPr/>
-        <p:nvPr/>
-      </p:nvGrpSpPr>
-      <p:grpSpPr>
-        <a:xfrm>
-          <a:off x="0" y="0"/>
-          <a:ext cx="0" cy="0"/>
-          <a:chOff x="0" y="0"/>
-          <a:chExt cx="0" cy="0"/>
-        </a:xfrm>
-      </p:grpSpPr>
-      <p:sp>
-        <p:nvSpPr>
-          <p:cNvPr id="2" name="Titel 1"/>
-          <p:cNvSpPr>
-            <a:spLocks noGrp="1"/>
-          </p:cNvSpPr>
-          <p:nvPr>
-            <p:ph type="title"/>
-          </p:nvPr>
-        </p:nvSpPr>
-        <p:spPr/>
-        <p:txBody>
-          <a:bodyPr/>
-          <a:lstStyle/>
-          <a:p>
-            <a:r>
-              <a:rPr lang="de-DE" dirty="0" smtClean="0"/>
-              <a:t>Filter</a:t>
-            </a:r>
-            <a:endParaRPr lang="en-US" dirty="0"/>
-          </a:p>
-        </p:txBody>
-      </p:sp>
-      <p:sp>
-        <p:nvSpPr>
-          <p:cNvPr id="3" name="Inhaltsplatzhalter 2"/>
-          <p:cNvSpPr>
-            <a:spLocks noGrp="1"/>
-          </p:cNvSpPr>
-          <p:nvPr>
-            <p:ph idx="1"/>
-          </p:nvPr>
-        </p:nvSpPr>
-        <p:spPr/>
-        <p:txBody>
-          <a:bodyPr/>
-          <a:lstStyle/>
-          <a:p>
-            <a:r>
-              <a:rPr lang="de-DE" dirty="0" smtClean="0"/>
-              <a:t>Multibandpass</a:t>
-            </a:r>
-            <a:endParaRPr lang="de-DE" dirty="0"/>
-          </a:p>
-        </p:txBody>
-      </p:sp>
-      <p:sp>
-        <p:nvSpPr>
-          <p:cNvPr id="4" name="Datumsplatzhalter 3"/>
-          <p:cNvSpPr>
-            <a:spLocks noGrp="1"/>
-          </p:cNvSpPr>
-          <p:nvPr>
-            <p:ph type="dt" sz="half" idx="10"/>
-          </p:nvPr>
-        </p:nvSpPr>
-        <p:spPr/>
-        <p:txBody>
-          <a:bodyPr/>
-          <a:lstStyle/>
-          <a:p>
-            <a:fld id="{296000BE-0612-4D88-A1AC-FF1287139C2E}" type="datetime1">
-              <a:rPr lang="de-DE" smtClean="0"/>
-              <a:t>20.06.2015</a:t>
-            </a:fld>
-            <a:endParaRPr lang="de-DE" dirty="0"/>
-          </a:p>
-        </p:txBody>
-      </p:sp>
-      <p:sp>
-        <p:nvSpPr>
-          <p:cNvPr id="5" name="Fußzeilenplatzhalter 4"/>
-          <p:cNvSpPr>
-            <a:spLocks noGrp="1"/>
-          </p:cNvSpPr>
-          <p:nvPr>
-            <p:ph type="ftr" sz="quarter" idx="11"/>
-          </p:nvPr>
-        </p:nvSpPr>
-        <p:spPr/>
-        <p:txBody>
-          <a:bodyPr/>
-          <a:lstStyle/>
-          <a:p>
-            <a:r>
-              <a:rPr lang="de-DE" smtClean="0"/>
-              <a:t>FM-Synthese</a:t>
-            </a:r>
-            <a:endParaRPr lang="de-DE" dirty="0"/>
-          </a:p>
-        </p:txBody>
-      </p:sp>
-      <p:sp>
-        <p:nvSpPr>
-          <p:cNvPr id="6" name="Foliennummernplatzhalter 5"/>
-          <p:cNvSpPr>
-            <a:spLocks noGrp="1"/>
-          </p:cNvSpPr>
-          <p:nvPr>
-            <p:ph type="sldNum" sz="quarter" idx="12"/>
-          </p:nvPr>
-        </p:nvSpPr>
-        <p:spPr/>
-        <p:txBody>
-          <a:bodyPr/>
-          <a:lstStyle/>
-          <a:p>
-            <a:fld id="{8740CB20-F870-467D-84CE-AB32061190A1}" type="slidenum">
-              <a:rPr lang="en-US" smtClean="0"/>
-              <a:t>15</a:t>
-            </a:fld>
-            <a:r>
-              <a:rPr lang="de-DE" smtClean="0"/>
-              <a:t>   </a:t>
-            </a:r>
-            <a:endParaRPr lang="de-DE" dirty="0"/>
-          </a:p>
-        </p:txBody>
-      </p:sp>
-      <p:pic>
-        <p:nvPicPr>
-          <p:cNvPr id="7" name="Grafik 6"/>
-          <p:cNvPicPr>
-            <a:picLocks noChangeAspect="1"/>
-          </p:cNvPicPr>
-          <p:nvPr/>
-        </p:nvPicPr>
-        <p:blipFill>
-          <a:blip r:embed="rId2">
-            <a:extLst>
-              <a:ext uri="{28A0092B-C50C-407E-A947-70E740481C1C}">
-                <a14:useLocalDpi xmlns:a14="http://schemas.microsoft.com/office/drawing/2010/main" val="0"/>
-              </a:ext>
-            </a:extLst>
-          </a:blip>
-          <a:stretch>
-            <a:fillRect/>
-          </a:stretch>
-        </p:blipFill>
-        <p:spPr>
-          <a:xfrm>
-            <a:off x="650365" y="1923678"/>
-            <a:ext cx="7843268" cy="2376262"/>
-          </a:xfrm>
-          <a:prstGeom prst="rect">
-            <a:avLst/>
-          </a:prstGeom>
-        </p:spPr>
-      </p:pic>
-    </p:spTree>
-    <p:extLst>
-      <p:ext uri="{BB962C8B-B14F-4D97-AF65-F5344CB8AC3E}">
-        <p14:creationId xmlns:p14="http://schemas.microsoft.com/office/powerpoint/2010/main" val="3979698544"/>
-      </p:ext>
-    </p:extLst>
-  </p:cSld>
-  <p:clrMapOvr>
-    <a:masterClrMapping/>
-  </p:clrMapOvr>
-  <mc:AlternateContent xmlns:mc="http://schemas.openxmlformats.org/markup-compatibility/2006" xmlns:p14="http://schemas.microsoft.com/office/powerpoint/2010/main">
-    <mc:Choice Requires="p14">
-      <p:transition spd="med" p14:dur="700">
-        <p:fade/>
-      </p:transition>
-    </mc:Choice>
-    <mc:Fallback xmlns="">
-      <p:transition spd="med">
-        <p:fade/>
-      </p:transition>
-    </mc:Fallback>
-  </mc:AlternateContent>
-  <p:timing>
-    <p:tnLst>
-      <p:par>
-        <p:cTn id="1" dur="indefinite" restart="never" nodeType="tmRoot"/>
-      </p:par>
-    </p:tnLst>
-  </p:timing>
-</p:sld>
-</file>
-
-<file path=ppt/slides/slide16.xml><?xml version="1.0" encoding="utf-8"?>
-<p:sld xmlns:a="http://schemas.openxmlformats.org/drawingml/2006/main" xmlns:r="http://schemas.openxmlformats.org/officeDocument/2006/relationships" xmlns:p="http://schemas.openxmlformats.org/presentationml/2006/main">
-  <p:cSld>
-    <p:spTree>
-      <p:nvGrpSpPr>
-        <p:cNvPr id="1" name=""/>
-        <p:cNvGrpSpPr/>
-        <p:nvPr/>
-      </p:nvGrpSpPr>
-      <p:grpSpPr>
-        <a:xfrm>
-          <a:off x="0" y="0"/>
-          <a:ext cx="0" cy="0"/>
-          <a:chOff x="0" y="0"/>
-          <a:chExt cx="0" cy="0"/>
-        </a:xfrm>
-      </p:grpSpPr>
-      <p:sp>
-        <p:nvSpPr>
-          <p:cNvPr id="2" name="Titel 1"/>
-          <p:cNvSpPr>
-            <a:spLocks noGrp="1"/>
-          </p:cNvSpPr>
-          <p:nvPr>
-            <p:ph type="title"/>
-          </p:nvPr>
-        </p:nvSpPr>
-        <p:spPr/>
-        <p:txBody>
-          <a:bodyPr/>
-          <a:lstStyle/>
-          <a:p>
-            <a:r>
-              <a:rPr lang="de-DE" dirty="0" smtClean="0"/>
-              <a:t>Filter</a:t>
-            </a:r>
-            <a:endParaRPr lang="en-US" dirty="0"/>
-          </a:p>
-        </p:txBody>
-      </p:sp>
-      <p:sp>
-        <p:nvSpPr>
-          <p:cNvPr id="3" name="Inhaltsplatzhalter 2"/>
-          <p:cNvSpPr>
-            <a:spLocks noGrp="1"/>
-          </p:cNvSpPr>
-          <p:nvPr>
-            <p:ph idx="1"/>
-          </p:nvPr>
-        </p:nvSpPr>
-        <p:spPr/>
-        <p:txBody>
-          <a:bodyPr/>
-          <a:lstStyle/>
-          <a:p>
-            <a:r>
-              <a:rPr lang="de-DE" dirty="0" smtClean="0"/>
-              <a:t>Multibandsperre</a:t>
-            </a:r>
-            <a:endParaRPr lang="de-DE" dirty="0"/>
-          </a:p>
-        </p:txBody>
-      </p:sp>
-      <p:sp>
-        <p:nvSpPr>
-          <p:cNvPr id="4" name="Datumsplatzhalter 3"/>
-          <p:cNvSpPr>
-            <a:spLocks noGrp="1"/>
-          </p:cNvSpPr>
-          <p:nvPr>
-            <p:ph type="dt" sz="half" idx="10"/>
-          </p:nvPr>
-        </p:nvSpPr>
-        <p:spPr/>
-        <p:txBody>
-          <a:bodyPr/>
-          <a:lstStyle/>
-          <a:p>
-            <a:fld id="{296000BE-0612-4D88-A1AC-FF1287139C2E}" type="datetime1">
-              <a:rPr lang="de-DE" smtClean="0"/>
-              <a:t>20.06.2015</a:t>
-            </a:fld>
-            <a:endParaRPr lang="de-DE" dirty="0"/>
-          </a:p>
-        </p:txBody>
-      </p:sp>
-      <p:sp>
-        <p:nvSpPr>
-          <p:cNvPr id="5" name="Fußzeilenplatzhalter 4"/>
-          <p:cNvSpPr>
-            <a:spLocks noGrp="1"/>
-          </p:cNvSpPr>
-          <p:nvPr>
-            <p:ph type="ftr" sz="quarter" idx="11"/>
-          </p:nvPr>
-        </p:nvSpPr>
-        <p:spPr/>
-        <p:txBody>
-          <a:bodyPr/>
-          <a:lstStyle/>
-          <a:p>
-            <a:r>
-              <a:rPr lang="de-DE" smtClean="0"/>
-              <a:t>FM-Synthese</a:t>
-            </a:r>
-            <a:endParaRPr lang="de-DE" dirty="0"/>
-          </a:p>
-        </p:txBody>
-      </p:sp>
-      <p:sp>
-        <p:nvSpPr>
-          <p:cNvPr id="6" name="Foliennummernplatzhalter 5"/>
-          <p:cNvSpPr>
-            <a:spLocks noGrp="1"/>
-          </p:cNvSpPr>
-          <p:nvPr>
-            <p:ph type="sldNum" sz="quarter" idx="12"/>
-          </p:nvPr>
-        </p:nvSpPr>
-        <p:spPr/>
-        <p:txBody>
-          <a:bodyPr/>
-          <a:lstStyle/>
-          <a:p>
-            <a:fld id="{8740CB20-F870-467D-84CE-AB32061190A1}" type="slidenum">
-              <a:rPr lang="en-US" smtClean="0"/>
-              <a:t>16</a:t>
-            </a:fld>
-            <a:r>
-              <a:rPr lang="de-DE" smtClean="0"/>
-              <a:t>   </a:t>
-            </a:r>
-            <a:endParaRPr lang="de-DE" dirty="0"/>
-          </a:p>
-        </p:txBody>
-      </p:sp>
-      <p:pic>
-        <p:nvPicPr>
-          <p:cNvPr id="7" name="Grafik 6"/>
-          <p:cNvPicPr>
-            <a:picLocks noChangeAspect="1"/>
-          </p:cNvPicPr>
-          <p:nvPr/>
-        </p:nvPicPr>
-        <p:blipFill>
-          <a:blip r:embed="rId2">
-            <a:extLst>
-              <a:ext uri="{28A0092B-C50C-407E-A947-70E740481C1C}">
-                <a14:useLocalDpi xmlns:a14="http://schemas.microsoft.com/office/drawing/2010/main" val="0"/>
-              </a:ext>
-            </a:extLst>
-          </a:blip>
-          <a:stretch>
-            <a:fillRect/>
-          </a:stretch>
-        </p:blipFill>
-        <p:spPr>
-          <a:xfrm>
-            <a:off x="650365" y="1923678"/>
-            <a:ext cx="7843268" cy="2376261"/>
-          </a:xfrm>
-          <a:prstGeom prst="rect">
-            <a:avLst/>
-          </a:prstGeom>
-        </p:spPr>
-      </p:pic>
-    </p:spTree>
-    <p:extLst>
-      <p:ext uri="{BB962C8B-B14F-4D97-AF65-F5344CB8AC3E}">
-        <p14:creationId xmlns:p14="http://schemas.microsoft.com/office/powerpoint/2010/main" val="883418089"/>
-      </p:ext>
-    </p:extLst>
-  </p:cSld>
-  <p:clrMapOvr>
-    <a:masterClrMapping/>
-  </p:clrMapOvr>
-  <mc:AlternateContent xmlns:mc="http://schemas.openxmlformats.org/markup-compatibility/2006" xmlns:p14="http://schemas.microsoft.com/office/powerpoint/2010/main">
-    <mc:Choice Requires="p14">
-      <p:transition spd="med" p14:dur="700">
-        <p:fade/>
-      </p:transition>
-    </mc:Choice>
-    <mc:Fallback xmlns="">
-      <p:transition spd="med">
-        <p:fade/>
-      </p:transition>
-    </mc:Fallback>
-  </mc:AlternateContent>
-  <p:timing>
-    <p:tnLst>
-      <p:par>
-        <p:cTn id="1" dur="indefinite" restart="never" nodeType="tmRoot"/>
-      </p:par>
-    </p:tnLst>
-  </p:timing>
-</p:sld>
-</file>
-
-<file path=ppt/slides/slide17.xml><?xml version="1.0" encoding="utf-8"?>
-<p:sld xmlns:a="http://schemas.openxmlformats.org/drawingml/2006/main" xmlns:r="http://schemas.openxmlformats.org/officeDocument/2006/relationships" xmlns:p="http://schemas.openxmlformats.org/presentationml/2006/main">
-  <p:cSld>
-    <p:spTree>
-      <p:nvGrpSpPr>
-        <p:cNvPr id="1" name=""/>
-        <p:cNvGrpSpPr/>
-        <p:nvPr/>
-      </p:nvGrpSpPr>
-      <p:grpSpPr>
-        <a:xfrm>
-          <a:off x="0" y="0"/>
-          <a:ext cx="0" cy="0"/>
-          <a:chOff x="0" y="0"/>
-          <a:chExt cx="0" cy="0"/>
-        </a:xfrm>
-      </p:grpSpPr>
-      <p:sp>
-        <p:nvSpPr>
-          <p:cNvPr id="2" name="Titel 1"/>
-          <p:cNvSpPr>
-            <a:spLocks noGrp="1"/>
-          </p:cNvSpPr>
-          <p:nvPr>
-            <p:ph type="title"/>
-          </p:nvPr>
-        </p:nvSpPr>
-        <p:spPr/>
-        <p:txBody>
-          <a:bodyPr/>
-          <a:lstStyle/>
-          <a:p>
-            <a:r>
-              <a:rPr lang="de-DE" dirty="0" err="1" smtClean="0"/>
-              <a:t>Raumhall</a:t>
-            </a:r>
-            <a:endParaRPr lang="en-US" dirty="0"/>
-          </a:p>
-        </p:txBody>
-      </p:sp>
-      <p:sp>
-        <p:nvSpPr>
-          <p:cNvPr id="3" name="Inhaltsplatzhalter 2"/>
-          <p:cNvSpPr>
-            <a:spLocks noGrp="1"/>
-          </p:cNvSpPr>
-          <p:nvPr>
-            <p:ph idx="1"/>
-          </p:nvPr>
-        </p:nvSpPr>
-        <p:spPr/>
-        <p:txBody>
-          <a:bodyPr/>
-          <a:lstStyle/>
-          <a:p>
-            <a:r>
-              <a:rPr lang="de-DE" dirty="0" smtClean="0"/>
-              <a:t>Schall wird diffus reflektiert</a:t>
-            </a:r>
-          </a:p>
-          <a:p>
-            <a:r>
-              <a:rPr lang="de-DE" dirty="0" smtClean="0"/>
-              <a:t>unendlich viele Echos entstehen</a:t>
-            </a:r>
-            <a:endParaRPr lang="en-US" dirty="0"/>
-          </a:p>
-        </p:txBody>
-      </p:sp>
-      <p:sp>
-        <p:nvSpPr>
-          <p:cNvPr id="4" name="Datumsplatzhalter 3"/>
-          <p:cNvSpPr>
-            <a:spLocks noGrp="1"/>
-          </p:cNvSpPr>
-          <p:nvPr>
-            <p:ph type="dt" sz="half" idx="10"/>
-          </p:nvPr>
-        </p:nvSpPr>
-        <p:spPr/>
-        <p:txBody>
-          <a:bodyPr/>
-          <a:lstStyle/>
-          <a:p>
-            <a:fld id="{296000BE-0612-4D88-A1AC-FF1287139C2E}" type="datetime1">
-              <a:rPr lang="de-DE" smtClean="0"/>
-              <a:t>20.06.2015</a:t>
-            </a:fld>
-            <a:endParaRPr lang="de-DE" dirty="0"/>
-          </a:p>
-        </p:txBody>
-      </p:sp>
-      <p:sp>
-        <p:nvSpPr>
-          <p:cNvPr id="5" name="Fußzeilenplatzhalter 4"/>
-          <p:cNvSpPr>
-            <a:spLocks noGrp="1"/>
-          </p:cNvSpPr>
-          <p:nvPr>
-            <p:ph type="ftr" sz="quarter" idx="11"/>
-          </p:nvPr>
-        </p:nvSpPr>
-        <p:spPr/>
-        <p:txBody>
-          <a:bodyPr/>
-          <a:lstStyle/>
-          <a:p>
-            <a:r>
-              <a:rPr lang="de-DE" smtClean="0"/>
-              <a:t>FM-Synthese</a:t>
-            </a:r>
-            <a:endParaRPr lang="de-DE" dirty="0"/>
-          </a:p>
-        </p:txBody>
-      </p:sp>
-      <p:sp>
-        <p:nvSpPr>
-          <p:cNvPr id="6" name="Foliennummernplatzhalter 5"/>
-          <p:cNvSpPr>
-            <a:spLocks noGrp="1"/>
-          </p:cNvSpPr>
-          <p:nvPr>
-            <p:ph type="sldNum" sz="quarter" idx="12"/>
-          </p:nvPr>
-        </p:nvSpPr>
-        <p:spPr/>
-        <p:txBody>
-          <a:bodyPr/>
-          <a:lstStyle/>
-          <a:p>
-            <a:fld id="{8740CB20-F870-467D-84CE-AB32061190A1}" type="slidenum">
-              <a:rPr lang="en-US" smtClean="0"/>
-              <a:t>17</a:t>
-            </a:fld>
-            <a:r>
-              <a:rPr lang="de-DE" smtClean="0"/>
-              <a:t>   </a:t>
-            </a:r>
-            <a:endParaRPr lang="de-DE" dirty="0"/>
-          </a:p>
-        </p:txBody>
-      </p:sp>
-      <p:pic>
-        <p:nvPicPr>
-          <p:cNvPr id="7" name="Grafik 6"/>
-          <p:cNvPicPr>
-            <a:picLocks noChangeAspect="1"/>
-          </p:cNvPicPr>
-          <p:nvPr/>
-        </p:nvPicPr>
-        <p:blipFill>
-          <a:blip r:embed="rId2"/>
-          <a:stretch>
-            <a:fillRect/>
-          </a:stretch>
-        </p:blipFill>
-        <p:spPr>
-          <a:xfrm>
-            <a:off x="2189792" y="2283718"/>
-            <a:ext cx="4779696" cy="2007168"/>
-          </a:xfrm>
-          <a:prstGeom prst="rect">
-            <a:avLst/>
-          </a:prstGeom>
-        </p:spPr>
-      </p:pic>
-      <p:sp>
-        <p:nvSpPr>
-          <p:cNvPr id="8" name="Textfeld 7"/>
-          <p:cNvSpPr txBox="1"/>
-          <p:nvPr/>
-        </p:nvSpPr>
-        <p:spPr>
-          <a:xfrm>
-            <a:off x="2189792" y="4290886"/>
-            <a:ext cx="5976664" cy="276999"/>
-          </a:xfrm>
-          <a:prstGeom prst="rect">
-            <a:avLst/>
-          </a:prstGeom>
-          <a:noFill/>
-        </p:spPr>
-        <p:txBody>
-          <a:bodyPr wrap="square" rtlCol="0">
-            <a:spAutoFit/>
-          </a:bodyPr>
-          <a:lstStyle/>
-          <a:p>
-            <a:r>
-              <a:rPr lang="de-DE" sz="1200" dirty="0" smtClean="0"/>
-              <a:t>Quelle: Computergestützte Audio und Videotechnik [Sto11]</a:t>
-            </a:r>
-            <a:endParaRPr lang="en-US" sz="1200" dirty="0"/>
-          </a:p>
-        </p:txBody>
-      </p:sp>
-    </p:spTree>
-    <p:extLst>
-      <p:ext uri="{BB962C8B-B14F-4D97-AF65-F5344CB8AC3E}">
-        <p14:creationId xmlns:p14="http://schemas.microsoft.com/office/powerpoint/2010/main" val="253928005"/>
-      </p:ext>
-    </p:extLst>
-  </p:cSld>
-  <p:clrMapOvr>
-    <a:masterClrMapping/>
-  </p:clrMapOvr>
-  <mc:AlternateContent xmlns:mc="http://schemas.openxmlformats.org/markup-compatibility/2006" xmlns:p14="http://schemas.microsoft.com/office/powerpoint/2010/main">
-    <mc:Choice Requires="p14">
-      <p:transition spd="med" p14:dur="700">
-        <p:fade/>
-      </p:transition>
-    </mc:Choice>
-    <mc:Fallback xmlns="">
-      <p:transition spd="med">
-        <p:fade/>
-      </p:transition>
-    </mc:Fallback>
-  </mc:AlternateContent>
-  <p:timing>
-    <p:tnLst>
-      <p:par>
-        <p:cTn id="1" dur="indefinite" restart="never" nodeType="tmRoot">
-          <p:childTnLst>
-            <p:seq concurrent="1" nextAc="seek">
-              <p:cTn id="2" dur="indefinite" nodeType="mainSeq">
-                <p:childTnLst>
-                  <p:par>
-                    <p:cTn id="3" fill="hold">
-                      <p:stCondLst>
-                        <p:cond delay="indefinite"/>
-                      </p:stCondLst>
-                      <p:childTnLst>
-                        <p:par>
-                          <p:cTn id="4" fill="hold">
-                            <p:stCondLst>
-                              <p:cond delay="0"/>
-                            </p:stCondLst>
-                            <p:childTnLst>
-                              <p:par>
-                                <p:cTn id="5" presetID="10" presetClass="entr" presetSubtype="0" fill="hold" nodeType="clickEffect">
-                                  <p:stCondLst>
-                                    <p:cond delay="0"/>
-                                  </p:stCondLst>
-                                  <p:childTnLst>
-                                    <p:set>
-                                      <p:cBhvr>
-                                        <p:cTn id="6" dur="1" fill="hold">
-                                          <p:stCondLst>
-                                            <p:cond delay="0"/>
-                                          </p:stCondLst>
-                                        </p:cTn>
-                                        <p:tgtEl>
-                                          <p:spTgt spid="7"/>
-                                        </p:tgtEl>
-                                        <p:attrNameLst>
-                                          <p:attrName>style.visibility</p:attrName>
-                                        </p:attrNameLst>
-                                      </p:cBhvr>
-                                      <p:to>
-                                        <p:strVal val="visible"/>
-                                      </p:to>
-                                    </p:set>
-                                    <p:animEffect transition="in" filter="fade">
-                                      <p:cBhvr>
-                                        <p:cTn id="7" dur="500"/>
-                                        <p:tgtEl>
-                                          <p:spTgt spid="7"/>
-                                        </p:tgtEl>
-                                      </p:cBhvr>
-                                    </p:animEffect>
-                                  </p:childTnLst>
-                                </p:cTn>
-                              </p:par>
-                              <p:par>
-                                <p:cTn id="8" presetID="10" presetClass="entr" presetSubtype="0" fill="hold" grpId="0" nodeType="withEffect">
-                                  <p:stCondLst>
-                                    <p:cond delay="0"/>
-                                  </p:stCondLst>
-                                  <p:childTnLst>
-                                    <p:set>
-                                      <p:cBhvr>
-                                        <p:cTn id="9" dur="1" fill="hold">
-                                          <p:stCondLst>
-                                            <p:cond delay="0"/>
-                                          </p:stCondLst>
-                                        </p:cTn>
-                                        <p:tgtEl>
-                                          <p:spTgt spid="8"/>
-                                        </p:tgtEl>
-                                        <p:attrNameLst>
-                                          <p:attrName>style.visibility</p:attrName>
-                                        </p:attrNameLst>
-                                      </p:cBhvr>
-                                      <p:to>
-                                        <p:strVal val="visible"/>
-                                      </p:to>
-                                    </p:set>
-                                    <p:animEffect transition="in" filter="fade">
-                                      <p:cBhvr>
-                                        <p:cTn id="10" dur="500"/>
-                                        <p:tgtEl>
-                                          <p:spTgt spid="8"/>
-                                        </p:tgtEl>
-                                      </p:cBhvr>
-                                    </p:animEffect>
-                                  </p:childTnLst>
-                                </p:cTn>
-                              </p:par>
-                            </p:childTnLst>
-                          </p:cTn>
-                        </p:par>
-                      </p:childTnLst>
-                    </p:cTn>
-                  </p:par>
-                </p:childTnLst>
-              </p:cTn>
-              <p:prevCondLst>
-                <p:cond evt="onPrev" delay="0">
-                  <p:tgtEl>
-                    <p:sldTgt/>
-                  </p:tgtEl>
-                </p:cond>
-              </p:prevCondLst>
-              <p:nextCondLst>
-                <p:cond evt="onNext" delay="0">
-                  <p:tgtEl>
-                    <p:sldTgt/>
-                  </p:tgtEl>
-                </p:cond>
-              </p:nextCondLst>
-            </p:seq>
-          </p:childTnLst>
-        </p:cTn>
-      </p:par>
-    </p:tnLst>
-    <p:bldLst>
-      <p:bldP spid="8" grpId="0"/>
-    </p:bldLst>
-  </p:timing>
-</p:sld>
-</file>
-
-<file path=ppt/slides/slide18.xml><?xml version="1.0" encoding="utf-8"?>
-<p:sld xmlns:a="http://schemas.openxmlformats.org/drawingml/2006/main" xmlns:r="http://schemas.openxmlformats.org/officeDocument/2006/relationships" xmlns:p="http://schemas.openxmlformats.org/presentationml/2006/main">
-  <p:cSld>
-    <p:spTree>
-      <p:nvGrpSpPr>
-        <p:cNvPr id="1" name=""/>
-        <p:cNvGrpSpPr/>
-        <p:nvPr/>
-      </p:nvGrpSpPr>
-      <p:grpSpPr>
-        <a:xfrm>
-          <a:off x="0" y="0"/>
-          <a:ext cx="0" cy="0"/>
-          <a:chOff x="0" y="0"/>
-          <a:chExt cx="0" cy="0"/>
-        </a:xfrm>
-      </p:grpSpPr>
-      <p:sp>
-        <p:nvSpPr>
-          <p:cNvPr id="7" name="Titel 6"/>
-          <p:cNvSpPr>
-            <a:spLocks noGrp="1"/>
-          </p:cNvSpPr>
-          <p:nvPr>
-            <p:ph type="title"/>
-          </p:nvPr>
-        </p:nvSpPr>
-        <p:spPr/>
-        <p:txBody>
-          <a:bodyPr/>
-          <a:lstStyle/>
-          <a:p>
-            <a:r>
-              <a:rPr lang="de-DE" dirty="0" smtClean="0"/>
-              <a:t>Tonnachbildung </a:t>
-            </a:r>
-            <a:r>
-              <a:rPr lang="de-DE" dirty="0" err="1" smtClean="0"/>
-              <a:t>praxis</a:t>
-            </a:r>
-            <a:endParaRPr lang="en-US" dirty="0"/>
-          </a:p>
-        </p:txBody>
-      </p:sp>
-      <p:sp>
-        <p:nvSpPr>
-          <p:cNvPr id="2" name="Textplatzhalter 1"/>
-          <p:cNvSpPr>
-            <a:spLocks noGrp="1"/>
-          </p:cNvSpPr>
-          <p:nvPr>
-            <p:ph type="body" idx="1"/>
-          </p:nvPr>
-        </p:nvSpPr>
-        <p:spPr/>
-        <p:txBody>
-          <a:bodyPr/>
-          <a:lstStyle/>
-          <a:p>
-            <a:endParaRPr lang="en-US"/>
-          </a:p>
-        </p:txBody>
-      </p:sp>
-      <p:sp>
-        <p:nvSpPr>
-          <p:cNvPr id="4" name="Datumsplatzhalter 3"/>
-          <p:cNvSpPr>
-            <a:spLocks noGrp="1"/>
-          </p:cNvSpPr>
-          <p:nvPr>
-            <p:ph type="dt" sz="half" idx="10"/>
-          </p:nvPr>
-        </p:nvSpPr>
-        <p:spPr/>
-        <p:txBody>
-          <a:bodyPr/>
-          <a:lstStyle/>
-          <a:p>
-            <a:fld id="{296000BE-0612-4D88-A1AC-FF1287139C2E}" type="datetime1">
-              <a:rPr lang="de-DE" smtClean="0"/>
-              <a:t>20.06.2015</a:t>
-            </a:fld>
-            <a:endParaRPr lang="de-DE" dirty="0"/>
-          </a:p>
-        </p:txBody>
-      </p:sp>
-      <p:sp>
-        <p:nvSpPr>
-          <p:cNvPr id="5" name="Fußzeilenplatzhalter 4"/>
-          <p:cNvSpPr>
-            <a:spLocks noGrp="1"/>
-          </p:cNvSpPr>
-          <p:nvPr>
-            <p:ph type="ftr" sz="quarter" idx="11"/>
-          </p:nvPr>
-        </p:nvSpPr>
-        <p:spPr/>
-        <p:txBody>
-          <a:bodyPr/>
-          <a:lstStyle/>
-          <a:p>
-            <a:r>
-              <a:rPr lang="de-DE" smtClean="0"/>
-              <a:t>FM-Synthese</a:t>
-            </a:r>
-            <a:endParaRPr lang="de-DE" dirty="0"/>
-          </a:p>
-        </p:txBody>
-      </p:sp>
-      <p:sp>
-        <p:nvSpPr>
-          <p:cNvPr id="6" name="Foliennummernplatzhalter 5"/>
-          <p:cNvSpPr>
-            <a:spLocks noGrp="1"/>
-          </p:cNvSpPr>
-          <p:nvPr>
-            <p:ph type="sldNum" sz="quarter" idx="12"/>
-          </p:nvPr>
-        </p:nvSpPr>
-        <p:spPr/>
-        <p:txBody>
-          <a:bodyPr/>
-          <a:lstStyle/>
-          <a:p>
-            <a:fld id="{8740CB20-F870-467D-84CE-AB32061190A1}" type="slidenum">
-              <a:rPr lang="en-US" smtClean="0"/>
-              <a:t>18</a:t>
-            </a:fld>
-            <a:r>
-              <a:rPr lang="de-DE" smtClean="0"/>
-              <a:t>   </a:t>
-            </a:r>
-            <a:endParaRPr lang="de-DE" dirty="0"/>
-          </a:p>
-        </p:txBody>
-      </p:sp>
-    </p:spTree>
-    <p:extLst>
-      <p:ext uri="{BB962C8B-B14F-4D97-AF65-F5344CB8AC3E}">
-        <p14:creationId xmlns:p14="http://schemas.microsoft.com/office/powerpoint/2010/main" val="4117715782"/>
-      </p:ext>
-    </p:extLst>
-  </p:cSld>
-  <p:clrMapOvr>
-    <a:masterClrMapping/>
-  </p:clrMapOvr>
-  <mc:AlternateContent xmlns:mc="http://schemas.openxmlformats.org/markup-compatibility/2006" xmlns:p14="http://schemas.microsoft.com/office/powerpoint/2010/main">
-    <mc:Choice Requires="p14">
-      <p:transition spd="med" p14:dur="700">
-        <p:fade/>
-      </p:transition>
-    </mc:Choice>
-    <mc:Fallback xmlns="">
-      <p:transition spd="med">
-        <p:fade/>
-      </p:transition>
-    </mc:Fallback>
-  </mc:AlternateContent>
-  <p:timing>
-    <p:tnLst>
-      <p:par>
-        <p:cTn id="1" dur="indefinite" restart="never" nodeType="tmRoot"/>
-      </p:par>
-    </p:tnLst>
-  </p:timing>
-</p:sld>
-</file>
-
-<file path=ppt/slides/slide19.xml><?xml version="1.0" encoding="utf-8"?>
-<p:sld xmlns:a="http://schemas.openxmlformats.org/drawingml/2006/main" xmlns:r="http://schemas.openxmlformats.org/officeDocument/2006/relationships" xmlns:p="http://schemas.openxmlformats.org/presentationml/2006/main">
-  <p:cSld>
-    <p:spTree>
-      <p:nvGrpSpPr>
-        <p:cNvPr id="1" name=""/>
-        <p:cNvGrpSpPr/>
-        <p:nvPr/>
-      </p:nvGrpSpPr>
-      <p:grpSpPr>
-        <a:xfrm>
-          <a:off x="0" y="0"/>
-          <a:ext cx="0" cy="0"/>
-          <a:chOff x="0" y="0"/>
-          <a:chExt cx="0" cy="0"/>
-        </a:xfrm>
-      </p:grpSpPr>
-      <p:sp>
-        <p:nvSpPr>
           <p:cNvPr id="7" name="Titel 6"/>
           <p:cNvSpPr>
             <a:spLocks noGrp="1"/>
@@ -6558,10 +5303,10 @@
           <a:bodyPr/>
           <a:lstStyle/>
           <a:p>
-            <a:fld id="{C80D71F6-99A2-4718-B360-65885A8D0927}" type="datetime1">
+            <a:r>
               <a:rPr lang="de-DE" smtClean="0"/>
-              <a:t>20.06.2015</a:t>
-            </a:fld>
+              <a:t>23.06.2015</a:t>
+            </a:r>
             <a:endParaRPr lang="de-DE"/>
           </a:p>
         </p:txBody>
@@ -6607,7 +5352,7 @@
             <a:fld id="{6C6AE60A-B69C-4790-82F7-3882EDF23186}" type="slidenum">
               <a:rPr lang="de-DE" smtClean="0"/>
               <a:pPr/>
-              <a:t>19</a:t>
+              <a:t>13</a:t>
             </a:fld>
             <a:endParaRPr lang="de-DE"/>
           </a:p>
@@ -7038,7 +5783,7 @@
 </p:sld>
 </file>
 
-<file path=ppt/slides/slide2.xml><?xml version="1.0" encoding="utf-8"?>
+<file path=ppt/slides/slide14.xml><?xml version="1.0" encoding="utf-8"?>
 <p:sld xmlns:a="http://schemas.openxmlformats.org/drawingml/2006/main" xmlns:r="http://schemas.openxmlformats.org/officeDocument/2006/relationships" xmlns:p="http://schemas.openxmlformats.org/presentationml/2006/main">
   <p:cSld>
     <p:spTree>
@@ -7057,7 +5802,7 @@
       </p:grpSpPr>
       <p:sp>
         <p:nvSpPr>
-          <p:cNvPr id="9" name="Titel 1"/>
+          <p:cNvPr id="7" name="Titel 6"/>
           <p:cNvSpPr>
             <a:spLocks noGrp="1"/>
           </p:cNvSpPr>
@@ -7071,8 +5816,54 @@
           <a:lstStyle/>
           <a:p>
             <a:r>
+              <a:rPr lang="de-DE" dirty="0"/>
+              <a:t>FM-Synthesizer in C</a:t>
+            </a:r>
+            <a:r>
               <a:rPr lang="de-DE" dirty="0" smtClean="0"/>
-              <a:t>Gliederung</a:t>
+              <a:t>++</a:t>
+            </a:r>
+            <a:endParaRPr lang="en-US" dirty="0"/>
+          </a:p>
+        </p:txBody>
+      </p:sp>
+      <p:sp>
+        <p:nvSpPr>
+          <p:cNvPr id="2" name="Textplatzhalter 1"/>
+          <p:cNvSpPr>
+            <a:spLocks noGrp="1"/>
+          </p:cNvSpPr>
+          <p:nvPr>
+            <p:ph type="body" idx="1"/>
+          </p:nvPr>
+        </p:nvSpPr>
+        <p:spPr/>
+        <p:txBody>
+          <a:bodyPr/>
+          <a:lstStyle/>
+          <a:p>
+            <a:endParaRPr lang="en-US"/>
+          </a:p>
+        </p:txBody>
+      </p:sp>
+      <p:sp>
+        <p:nvSpPr>
+          <p:cNvPr id="4" name="Datumsplatzhalter 3"/>
+          <p:cNvSpPr>
+            <a:spLocks noGrp="1"/>
+          </p:cNvSpPr>
+          <p:nvPr>
+            <p:ph type="dt" sz="half" idx="10"/>
+          </p:nvPr>
+        </p:nvSpPr>
+        <p:spPr/>
+        <p:txBody>
+          <a:bodyPr/>
+          <a:lstStyle/>
+          <a:p>
+            <a:r>
+              <a:rPr lang="de-DE" smtClean="0"/>
+              <a:t>23.06.2015</a:t>
             </a:r>
             <a:endParaRPr lang="de-DE" dirty="0"/>
           </a:p>
@@ -7080,260 +5871,7 @@
       </p:sp>
       <p:sp>
         <p:nvSpPr>
-          <p:cNvPr id="10" name="Inhaltsplatzhalter 2"/>
-          <p:cNvSpPr txBox="1">
-            <a:spLocks/>
-          </p:cNvSpPr>
-          <p:nvPr/>
-        </p:nvSpPr>
-        <p:spPr>
-          <a:xfrm>
-            <a:off x="457200" y="1200151"/>
-            <a:ext cx="8229600" cy="3394472"/>
-          </a:xfrm>
-          <a:prstGeom prst="rect">
-            <a:avLst/>
-          </a:prstGeom>
-        </p:spPr>
-        <p:txBody>
-          <a:bodyPr vert="horz" lIns="91440" tIns="45720" rIns="91440" bIns="45720" rtlCol="0">
-            <a:normAutofit/>
-          </a:bodyPr>
-          <a:lstStyle>
-            <a:lvl1pPr marL="0" indent="0" algn="ctr" defTabSz="914400" rtl="0" eaLnBrk="1" latinLnBrk="0" hangingPunct="1">
-              <a:spcBef>
-                <a:spcPct val="20000"/>
-              </a:spcBef>
-              <a:buFont typeface="Arial" pitchFamily="34" charset="0"/>
-              <a:buNone/>
-              <a:defRPr sz="2800" kern="1200">
-                <a:solidFill>
-                  <a:schemeClr val="tx1">
-                    <a:tint val="75000"/>
-                  </a:schemeClr>
-                </a:solidFill>
-                <a:latin typeface="Lato" panose="020F0502020204030203" pitchFamily="34" charset="0"/>
-                <a:ea typeface="+mn-ea"/>
-                <a:cs typeface="+mn-cs"/>
-              </a:defRPr>
-            </a:lvl1pPr>
-            <a:lvl2pPr marL="457200" indent="0" algn="ctr" defTabSz="914400" rtl="0" eaLnBrk="1" latinLnBrk="0" hangingPunct="1">
-              <a:spcBef>
-                <a:spcPct val="20000"/>
-              </a:spcBef>
-              <a:buFont typeface="Arial" pitchFamily="34" charset="0"/>
-              <a:buNone/>
-              <a:defRPr sz="2000" kern="1200">
-                <a:solidFill>
-                  <a:schemeClr val="tx1">
-                    <a:tint val="75000"/>
-                  </a:schemeClr>
-                </a:solidFill>
-                <a:latin typeface="Lato" panose="020F0502020204030203" pitchFamily="34" charset="0"/>
-                <a:ea typeface="+mn-ea"/>
-                <a:cs typeface="+mn-cs"/>
-              </a:defRPr>
-            </a:lvl2pPr>
-            <a:lvl3pPr marL="914400" indent="0" algn="ctr" defTabSz="914400" rtl="0" eaLnBrk="1" latinLnBrk="0" hangingPunct="1">
-              <a:spcBef>
-                <a:spcPct val="20000"/>
-              </a:spcBef>
-              <a:buFont typeface="Arial" pitchFamily="34" charset="0"/>
-              <a:buNone/>
-              <a:defRPr sz="1600" kern="1200">
-                <a:solidFill>
-                  <a:schemeClr val="tx1">
-                    <a:tint val="75000"/>
-                  </a:schemeClr>
-                </a:solidFill>
-                <a:latin typeface="Lato" panose="020F0502020204030203" pitchFamily="34" charset="0"/>
-                <a:ea typeface="+mn-ea"/>
-                <a:cs typeface="+mn-cs"/>
-              </a:defRPr>
-            </a:lvl3pPr>
-            <a:lvl4pPr marL="1371600" indent="0" algn="ctr" defTabSz="914400" rtl="0" eaLnBrk="1" latinLnBrk="0" hangingPunct="1">
-              <a:spcBef>
-                <a:spcPct val="20000"/>
-              </a:spcBef>
-              <a:buFont typeface="Arial" pitchFamily="34" charset="0"/>
-              <a:buNone/>
-              <a:defRPr sz="1400" kern="1200">
-                <a:solidFill>
-                  <a:schemeClr val="tx1">
-                    <a:tint val="75000"/>
-                  </a:schemeClr>
-                </a:solidFill>
-                <a:latin typeface="Lato" panose="020F0502020204030203" pitchFamily="34" charset="0"/>
-                <a:ea typeface="+mn-ea"/>
-                <a:cs typeface="+mn-cs"/>
-              </a:defRPr>
-            </a:lvl4pPr>
-            <a:lvl5pPr marL="1828800" indent="0" algn="ctr" defTabSz="914400" rtl="0" eaLnBrk="1" latinLnBrk="0" hangingPunct="1">
-              <a:spcBef>
-                <a:spcPct val="20000"/>
-              </a:spcBef>
-              <a:buFont typeface="Arial" pitchFamily="34" charset="0"/>
-              <a:buNone/>
-              <a:defRPr sz="1400" kern="1200">
-                <a:solidFill>
-                  <a:schemeClr val="tx1">
-                    <a:tint val="75000"/>
-                  </a:schemeClr>
-                </a:solidFill>
-                <a:latin typeface="Lato" panose="020F0502020204030203" pitchFamily="34" charset="0"/>
-                <a:ea typeface="+mn-ea"/>
-                <a:cs typeface="+mn-cs"/>
-              </a:defRPr>
-            </a:lvl5pPr>
-            <a:lvl6pPr marL="2286000" indent="0" algn="ctr" defTabSz="914400" rtl="0" eaLnBrk="1" latinLnBrk="0" hangingPunct="1">
-              <a:spcBef>
-                <a:spcPct val="20000"/>
-              </a:spcBef>
-              <a:buFont typeface="Arial" pitchFamily="34" charset="0"/>
-              <a:buNone/>
-              <a:defRPr sz="2000" kern="1200">
-                <a:solidFill>
-                  <a:schemeClr val="tx1">
-                    <a:tint val="75000"/>
-                  </a:schemeClr>
-                </a:solidFill>
-                <a:latin typeface="+mn-lt"/>
-                <a:ea typeface="+mn-ea"/>
-                <a:cs typeface="+mn-cs"/>
-              </a:defRPr>
-            </a:lvl6pPr>
-            <a:lvl7pPr marL="2743200" indent="0" algn="ctr" defTabSz="914400" rtl="0" eaLnBrk="1" latinLnBrk="0" hangingPunct="1">
-              <a:spcBef>
-                <a:spcPct val="20000"/>
-              </a:spcBef>
-              <a:buFont typeface="Arial" pitchFamily="34" charset="0"/>
-              <a:buNone/>
-              <a:defRPr sz="2000" kern="1200">
-                <a:solidFill>
-                  <a:schemeClr val="tx1">
-                    <a:tint val="75000"/>
-                  </a:schemeClr>
-                </a:solidFill>
-                <a:latin typeface="+mn-lt"/>
-                <a:ea typeface="+mn-ea"/>
-                <a:cs typeface="+mn-cs"/>
-              </a:defRPr>
-            </a:lvl7pPr>
-            <a:lvl8pPr marL="3200400" indent="0" algn="ctr" defTabSz="914400" rtl="0" eaLnBrk="1" latinLnBrk="0" hangingPunct="1">
-              <a:spcBef>
-                <a:spcPct val="20000"/>
-              </a:spcBef>
-              <a:buFont typeface="Arial" pitchFamily="34" charset="0"/>
-              <a:buNone/>
-              <a:defRPr sz="2000" kern="1200">
-                <a:solidFill>
-                  <a:schemeClr val="tx1">
-                    <a:tint val="75000"/>
-                  </a:schemeClr>
-                </a:solidFill>
-                <a:latin typeface="+mn-lt"/>
-                <a:ea typeface="+mn-ea"/>
-                <a:cs typeface="+mn-cs"/>
-              </a:defRPr>
-            </a:lvl8pPr>
-            <a:lvl9pPr marL="3657600" indent="0" algn="ctr" defTabSz="914400" rtl="0" eaLnBrk="1" latinLnBrk="0" hangingPunct="1">
-              <a:spcBef>
-                <a:spcPct val="20000"/>
-              </a:spcBef>
-              <a:buFont typeface="Arial" pitchFamily="34" charset="0"/>
-              <a:buNone/>
-              <a:defRPr sz="2000" kern="1200">
-                <a:solidFill>
-                  <a:schemeClr val="tx1">
-                    <a:tint val="75000"/>
-                  </a:schemeClr>
-                </a:solidFill>
-                <a:latin typeface="+mn-lt"/>
-                <a:ea typeface="+mn-ea"/>
-                <a:cs typeface="+mn-cs"/>
-              </a:defRPr>
-            </a:lvl9pPr>
-          </a:lstStyle>
-          <a:p>
-            <a:pPr marL="457200" indent="-457200" algn="l">
-              <a:buFont typeface="Arial" panose="020B0604020202020204" pitchFamily="34" charset="0"/>
-              <a:buChar char="•"/>
-            </a:pPr>
-            <a:r>
-              <a:rPr lang="de-DE" dirty="0" smtClean="0">
-                <a:solidFill>
-                  <a:schemeClr val="tx1"/>
-                </a:solidFill>
-              </a:rPr>
-              <a:t>Tonnachbildung Theorie</a:t>
-            </a:r>
-          </a:p>
-          <a:p>
-            <a:pPr marL="457200" indent="-457200" algn="l">
-              <a:buFont typeface="Arial" panose="020B0604020202020204" pitchFamily="34" charset="0"/>
-              <a:buChar char="•"/>
-            </a:pPr>
-            <a:r>
-              <a:rPr lang="de-DE" dirty="0" smtClean="0">
-                <a:solidFill>
-                  <a:schemeClr val="tx1"/>
-                </a:solidFill>
-              </a:rPr>
-              <a:t>Tonnachbildung Praxis</a:t>
-            </a:r>
-            <a:endParaRPr lang="de-DE" dirty="0">
-              <a:solidFill>
-                <a:schemeClr val="tx1"/>
-              </a:solidFill>
-            </a:endParaRPr>
-          </a:p>
-          <a:p>
-            <a:pPr marL="457200" indent="-457200" algn="l">
-              <a:buFont typeface="Arial" panose="020B0604020202020204" pitchFamily="34" charset="0"/>
-              <a:buChar char="•"/>
-            </a:pPr>
-            <a:r>
-              <a:rPr lang="de-DE" dirty="0" smtClean="0">
-                <a:solidFill>
-                  <a:schemeClr val="tx1"/>
-                </a:solidFill>
-              </a:rPr>
-              <a:t>FM-Synthesizer in C++</a:t>
-            </a:r>
-            <a:endParaRPr lang="de-DE" dirty="0">
-              <a:solidFill>
-                <a:schemeClr val="tx1"/>
-              </a:solidFill>
-            </a:endParaRPr>
-          </a:p>
-        </p:txBody>
-      </p:sp>
-      <p:sp>
-        <p:nvSpPr>
-          <p:cNvPr id="3" name="Datumsplatzhalter 2"/>
-          <p:cNvSpPr>
-            <a:spLocks noGrp="1"/>
-          </p:cNvSpPr>
-          <p:nvPr>
-            <p:ph type="dt" sz="half" idx="10"/>
-          </p:nvPr>
-        </p:nvSpPr>
-        <p:spPr/>
-        <p:txBody>
-          <a:bodyPr/>
-          <a:lstStyle/>
-          <a:p>
-            <a:fld id="{54A5E96F-7890-4333-8D04-AF19E98716D9}" type="datetime1">
-              <a:rPr lang="de-DE" smtClean="0"/>
-              <a:t>20.06.2015</a:t>
-            </a:fld>
-            <a:endParaRPr lang="de-DE" dirty="0"/>
-          </a:p>
-        </p:txBody>
-      </p:sp>
-      <p:sp>
-        <p:nvSpPr>
-          <p:cNvPr id="4" name="Fußzeilenplatzhalter 3"/>
+          <p:cNvPr id="5" name="Fußzeilenplatzhalter 4"/>
           <p:cNvSpPr>
             <a:spLocks noGrp="1"/>
           </p:cNvSpPr>
@@ -7356,7 +5894,7 @@
       </p:sp>
       <p:sp>
         <p:nvSpPr>
-          <p:cNvPr id="5" name="Foliennummernplatzhalter 4"/>
+          <p:cNvPr id="6" name="Foliennummernplatzhalter 5"/>
           <p:cNvSpPr>
             <a:spLocks noGrp="1"/>
           </p:cNvSpPr>
@@ -7371,170 +5909,7 @@
           <a:p>
             <a:fld id="{8740CB20-F870-467D-84CE-AB32061190A1}" type="slidenum">
               <a:rPr lang="en-US" smtClean="0"/>
-              <a:t>2</a:t>
-            </a:fld>
-            <a:r>
-              <a:rPr lang="de-DE" smtClean="0"/>
-              <a:t>   </a:t>
-            </a:r>
-            <a:endParaRPr lang="de-DE" dirty="0"/>
-          </a:p>
-        </p:txBody>
-      </p:sp>
-    </p:spTree>
-  </p:cSld>
-  <p:clrMapOvr>
-    <a:masterClrMapping/>
-  </p:clrMapOvr>
-  <mc:AlternateContent xmlns:mc="http://schemas.openxmlformats.org/markup-compatibility/2006" xmlns:p14="http://schemas.microsoft.com/office/powerpoint/2010/main">
-    <mc:Choice Requires="p14">
-      <p:transition spd="med" p14:dur="700">
-        <p:fade/>
-      </p:transition>
-    </mc:Choice>
-    <mc:Fallback xmlns="">
-      <p:transition spd="med">
-        <p:fade/>
-      </p:transition>
-    </mc:Fallback>
-  </mc:AlternateContent>
-  <p:timing>
-    <p:tnLst>
-      <p:par>
-        <p:cTn id="1" dur="indefinite" restart="never" nodeType="tmRoot"/>
-      </p:par>
-    </p:tnLst>
-  </p:timing>
-</p:sld>
-</file>
-
-<file path=ppt/slides/slide20.xml><?xml version="1.0" encoding="utf-8"?>
-<p:sld xmlns:a="http://schemas.openxmlformats.org/drawingml/2006/main" xmlns:r="http://schemas.openxmlformats.org/officeDocument/2006/relationships" xmlns:p="http://schemas.openxmlformats.org/presentationml/2006/main">
-  <p:cSld>
-    <p:spTree>
-      <p:nvGrpSpPr>
-        <p:cNvPr id="1" name=""/>
-        <p:cNvGrpSpPr/>
-        <p:nvPr/>
-      </p:nvGrpSpPr>
-      <p:grpSpPr>
-        <a:xfrm>
-          <a:off x="0" y="0"/>
-          <a:ext cx="0" cy="0"/>
-          <a:chOff x="0" y="0"/>
-          <a:chExt cx="0" cy="0"/>
-        </a:xfrm>
-      </p:grpSpPr>
-      <p:sp>
-        <p:nvSpPr>
-          <p:cNvPr id="7" name="Titel 6"/>
-          <p:cNvSpPr>
-            <a:spLocks noGrp="1"/>
-          </p:cNvSpPr>
-          <p:nvPr>
-            <p:ph type="title"/>
-          </p:nvPr>
-        </p:nvSpPr>
-        <p:spPr/>
-        <p:txBody>
-          <a:bodyPr/>
-          <a:lstStyle/>
-          <a:p>
-            <a:r>
-              <a:rPr lang="de-DE" dirty="0"/>
-              <a:t>FM-Synthesizer in C</a:t>
-            </a:r>
-            <a:r>
-              <a:rPr lang="de-DE" dirty="0" smtClean="0"/>
-              <a:t>++</a:t>
-            </a:r>
-            <a:endParaRPr lang="en-US" dirty="0"/>
-          </a:p>
-        </p:txBody>
-      </p:sp>
-      <p:sp>
-        <p:nvSpPr>
-          <p:cNvPr id="2" name="Textplatzhalter 1"/>
-          <p:cNvSpPr>
-            <a:spLocks noGrp="1"/>
-          </p:cNvSpPr>
-          <p:nvPr>
-            <p:ph type="body" idx="1"/>
-          </p:nvPr>
-        </p:nvSpPr>
-        <p:spPr/>
-        <p:txBody>
-          <a:bodyPr/>
-          <a:lstStyle/>
-          <a:p>
-            <a:endParaRPr lang="en-US"/>
-          </a:p>
-        </p:txBody>
-      </p:sp>
-      <p:sp>
-        <p:nvSpPr>
-          <p:cNvPr id="4" name="Datumsplatzhalter 3"/>
-          <p:cNvSpPr>
-            <a:spLocks noGrp="1"/>
-          </p:cNvSpPr>
-          <p:nvPr>
-            <p:ph type="dt" sz="half" idx="10"/>
-          </p:nvPr>
-        </p:nvSpPr>
-        <p:spPr/>
-        <p:txBody>
-          <a:bodyPr/>
-          <a:lstStyle/>
-          <a:p>
-            <a:fld id="{296000BE-0612-4D88-A1AC-FF1287139C2E}" type="datetime1">
-              <a:rPr lang="de-DE" smtClean="0"/>
-              <a:t>20.06.2015</a:t>
-            </a:fld>
-            <a:endParaRPr lang="de-DE" dirty="0"/>
-          </a:p>
-        </p:txBody>
-      </p:sp>
-      <p:sp>
-        <p:nvSpPr>
-          <p:cNvPr id="5" name="Fußzeilenplatzhalter 4"/>
-          <p:cNvSpPr>
-            <a:spLocks noGrp="1"/>
-          </p:cNvSpPr>
-          <p:nvPr>
-            <p:ph type="ftr" sz="quarter" idx="11"/>
-          </p:nvPr>
-        </p:nvSpPr>
-        <p:spPr/>
-        <p:txBody>
-          <a:bodyPr/>
-          <a:lstStyle/>
-          <a:p>
-            <a:r>
-              <a:rPr lang="de-DE" smtClean="0"/>
-              <a:t>FM-Synthese</a:t>
-            </a:r>
-            <a:endParaRPr lang="de-DE" dirty="0"/>
-          </a:p>
-        </p:txBody>
-      </p:sp>
-      <p:sp>
-        <p:nvSpPr>
-          <p:cNvPr id="6" name="Foliennummernplatzhalter 5"/>
-          <p:cNvSpPr>
-            <a:spLocks noGrp="1"/>
-          </p:cNvSpPr>
-          <p:nvPr>
-            <p:ph type="sldNum" sz="quarter" idx="12"/>
-          </p:nvPr>
-        </p:nvSpPr>
-        <p:spPr/>
-        <p:txBody>
-          <a:bodyPr/>
-          <a:lstStyle/>
-          <a:p>
-            <a:fld id="{8740CB20-F870-467D-84CE-AB32061190A1}" type="slidenum">
-              <a:rPr lang="en-US" smtClean="0"/>
-              <a:t>20</a:t>
+              <a:t>14</a:t>
             </a:fld>
             <a:r>
               <a:rPr lang="de-DE" smtClean="0"/>
@@ -7576,7 +5951,7 @@
 </p:sld>
 </file>
 
-<file path=ppt/slides/slide21.xml><?xml version="1.0" encoding="utf-8"?>
+<file path=ppt/slides/slide15.xml><?xml version="1.0" encoding="utf-8"?>
 <p:sld xmlns:a="http://schemas.openxmlformats.org/drawingml/2006/main" xmlns:r="http://schemas.openxmlformats.org/officeDocument/2006/relationships" xmlns:p="http://schemas.openxmlformats.org/presentationml/2006/main">
   <p:cSld>
     <p:spTree>
@@ -7631,10 +6006,10 @@
           <a:bodyPr/>
           <a:lstStyle/>
           <a:p>
-            <a:fld id="{296000BE-0612-4D88-A1AC-FF1287139C2E}" type="datetime1">
+            <a:r>
               <a:rPr lang="de-DE" smtClean="0"/>
-              <a:t>20.06.2015</a:t>
-            </a:fld>
+              <a:t>23.06.2015</a:t>
+            </a:r>
             <a:endParaRPr lang="de-DE" dirty="0"/>
           </a:p>
         </p:txBody>
@@ -7679,7 +6054,7 @@
           <a:p>
             <a:fld id="{8740CB20-F870-467D-84CE-AB32061190A1}" type="slidenum">
               <a:rPr lang="en-US" smtClean="0"/>
-              <a:t>21</a:t>
+              <a:t>15</a:t>
             </a:fld>
             <a:r>
               <a:rPr lang="de-DE" smtClean="0"/>
@@ -7781,7 +6156,7 @@
 </p:sld>
 </file>
 
-<file path=ppt/slides/slide22.xml><?xml version="1.0" encoding="utf-8"?>
+<file path=ppt/slides/slide16.xml><?xml version="1.0" encoding="utf-8"?>
 <p:sld xmlns:a="http://schemas.openxmlformats.org/drawingml/2006/main" xmlns:r="http://schemas.openxmlformats.org/officeDocument/2006/relationships" xmlns:p="http://schemas.openxmlformats.org/presentationml/2006/main">
   <p:cSld>
     <p:spTree>
@@ -7871,10 +6246,10 @@
           <a:bodyPr/>
           <a:lstStyle/>
           <a:p>
-            <a:fld id="{296000BE-0612-4D88-A1AC-FF1287139C2E}" type="datetime1">
+            <a:r>
               <a:rPr lang="de-DE" smtClean="0"/>
-              <a:t>20.06.2015</a:t>
-            </a:fld>
+              <a:t>23.06.2015</a:t>
+            </a:r>
             <a:endParaRPr lang="de-DE" dirty="0"/>
           </a:p>
         </p:txBody>
@@ -7919,7 +6294,7 @@
           <a:p>
             <a:fld id="{8740CB20-F870-467D-84CE-AB32061190A1}" type="slidenum">
               <a:rPr lang="en-US" smtClean="0"/>
-              <a:t>22</a:t>
+              <a:t>16</a:t>
             </a:fld>
             <a:r>
               <a:rPr lang="de-DE" smtClean="0"/>
@@ -7961,7 +6336,7 @@
 </p:sld>
 </file>
 
-<file path=ppt/slides/slide23.xml><?xml version="1.0" encoding="utf-8"?>
+<file path=ppt/slides/slide17.xml><?xml version="1.0" encoding="utf-8"?>
 <p:sld xmlns:a="http://schemas.openxmlformats.org/drawingml/2006/main" xmlns:r="http://schemas.openxmlformats.org/officeDocument/2006/relationships" xmlns:p="http://schemas.openxmlformats.org/presentationml/2006/main">
   <p:cSld>
     <p:spTree>
@@ -8024,79 +6399,6 @@
               <a:t>Aufmerksamkeit</a:t>
             </a:r>
             <a:endParaRPr lang="en-US" dirty="0"/>
-          </a:p>
-        </p:txBody>
-      </p:sp>
-      <p:sp>
-        <p:nvSpPr>
-          <p:cNvPr id="4" name="Datumsplatzhalter 3"/>
-          <p:cNvSpPr>
-            <a:spLocks noGrp="1"/>
-          </p:cNvSpPr>
-          <p:nvPr>
-            <p:ph type="dt" sz="half" idx="10"/>
-          </p:nvPr>
-        </p:nvSpPr>
-        <p:spPr/>
-        <p:txBody>
-          <a:bodyPr/>
-          <a:lstStyle/>
-          <a:p>
-            <a:fld id="{296000BE-0612-4D88-A1AC-FF1287139C2E}" type="datetime1">
-              <a:rPr lang="de-DE" smtClean="0"/>
-              <a:t>20.06.2015</a:t>
-            </a:fld>
-            <a:endParaRPr lang="de-DE" dirty="0"/>
-          </a:p>
-        </p:txBody>
-      </p:sp>
-      <p:sp>
-        <p:nvSpPr>
-          <p:cNvPr id="5" name="Fußzeilenplatzhalter 4"/>
-          <p:cNvSpPr>
-            <a:spLocks noGrp="1"/>
-          </p:cNvSpPr>
-          <p:nvPr>
-            <p:ph type="ftr" sz="quarter" idx="11"/>
-          </p:nvPr>
-        </p:nvSpPr>
-        <p:spPr/>
-        <p:txBody>
-          <a:bodyPr/>
-          <a:lstStyle/>
-          <a:p>
-            <a:r>
-              <a:rPr lang="de-DE" smtClean="0"/>
-              <a:t>FM-Synthese</a:t>
-            </a:r>
-            <a:endParaRPr lang="de-DE" dirty="0"/>
-          </a:p>
-        </p:txBody>
-      </p:sp>
-      <p:sp>
-        <p:nvSpPr>
-          <p:cNvPr id="6" name="Foliennummernplatzhalter 5"/>
-          <p:cNvSpPr>
-            <a:spLocks noGrp="1"/>
-          </p:cNvSpPr>
-          <p:nvPr>
-            <p:ph type="sldNum" sz="quarter" idx="12"/>
-          </p:nvPr>
-        </p:nvSpPr>
-        <p:spPr/>
-        <p:txBody>
-          <a:bodyPr/>
-          <a:lstStyle/>
-          <a:p>
-            <a:fld id="{8740CB20-F870-467D-84CE-AB32061190A1}" type="slidenum">
-              <a:rPr lang="en-US" smtClean="0"/>
-              <a:t>23</a:t>
-            </a:fld>
-            <a:r>
-              <a:rPr lang="de-DE" smtClean="0"/>
-              <a:t>   </a:t>
-            </a:r>
-            <a:endParaRPr lang="de-DE" dirty="0"/>
           </a:p>
         </p:txBody>
       </p:sp>
@@ -8132,7 +6434,7 @@
 </p:sld>
 </file>
 
-<file path=ppt/slides/slide24.xml><?xml version="1.0" encoding="utf-8"?>
+<file path=ppt/slides/slide18.xml><?xml version="1.0" encoding="utf-8"?>
 <p:sld xmlns:a="http://schemas.openxmlformats.org/drawingml/2006/main" xmlns:r="http://schemas.openxmlformats.org/officeDocument/2006/relationships" xmlns:p="http://schemas.openxmlformats.org/presentationml/2006/main">
   <p:cSld>
     <p:spTree>
@@ -8187,10 +6489,10 @@
           <a:bodyPr/>
           <a:lstStyle/>
           <a:p>
-            <a:fld id="{296000BE-0612-4D88-A1AC-FF1287139C2E}" type="datetime1">
+            <a:r>
               <a:rPr lang="de-DE" smtClean="0"/>
-              <a:t>20.06.2015</a:t>
-            </a:fld>
+              <a:t>23.06.2015</a:t>
+            </a:r>
             <a:endParaRPr lang="de-DE" dirty="0"/>
           </a:p>
         </p:txBody>
@@ -8235,7 +6537,7 @@
           <a:p>
             <a:fld id="{8740CB20-F870-467D-84CE-AB32061190A1}" type="slidenum">
               <a:rPr lang="en-US" smtClean="0"/>
-              <a:t>24</a:t>
+              <a:t>18</a:t>
             </a:fld>
             <a:r>
               <a:rPr lang="de-DE" smtClean="0"/>
@@ -8412,6 +6714,718 @@
 </p:sld>
 </file>
 
+<file path=ppt/slides/slide19.xml><?xml version="1.0" encoding="utf-8"?>
+<p:sld xmlns:a="http://schemas.openxmlformats.org/drawingml/2006/main" xmlns:r="http://schemas.openxmlformats.org/officeDocument/2006/relationships" xmlns:p="http://schemas.openxmlformats.org/presentationml/2006/main" show="0">
+  <p:cSld>
+    <p:spTree>
+      <p:nvGrpSpPr>
+        <p:cNvPr id="1" name=""/>
+        <p:cNvGrpSpPr/>
+        <p:nvPr/>
+      </p:nvGrpSpPr>
+      <p:grpSpPr>
+        <a:xfrm>
+          <a:off x="0" y="0"/>
+          <a:ext cx="0" cy="0"/>
+          <a:chOff x="0" y="0"/>
+          <a:chExt cx="0" cy="0"/>
+        </a:xfrm>
+      </p:grpSpPr>
+      <p:sp>
+        <p:nvSpPr>
+          <p:cNvPr id="2" name="Titel 1"/>
+          <p:cNvSpPr>
+            <a:spLocks noGrp="1"/>
+          </p:cNvSpPr>
+          <p:nvPr>
+            <p:ph type="title"/>
+          </p:nvPr>
+        </p:nvSpPr>
+        <p:spPr/>
+        <p:txBody>
+          <a:bodyPr/>
+          <a:lstStyle/>
+          <a:p>
+            <a:r>
+              <a:rPr lang="de-DE" dirty="0" err="1" smtClean="0"/>
+              <a:t>Raumhall</a:t>
+            </a:r>
+            <a:endParaRPr lang="en-US" dirty="0"/>
+          </a:p>
+        </p:txBody>
+      </p:sp>
+      <p:sp>
+        <p:nvSpPr>
+          <p:cNvPr id="3" name="Inhaltsplatzhalter 2"/>
+          <p:cNvSpPr>
+            <a:spLocks noGrp="1"/>
+          </p:cNvSpPr>
+          <p:nvPr>
+            <p:ph idx="1"/>
+          </p:nvPr>
+        </p:nvSpPr>
+        <p:spPr/>
+        <p:txBody>
+          <a:bodyPr/>
+          <a:lstStyle/>
+          <a:p>
+            <a:r>
+              <a:rPr lang="de-DE" dirty="0" smtClean="0"/>
+              <a:t>Schall wird diffus reflektiert</a:t>
+            </a:r>
+          </a:p>
+          <a:p>
+            <a:r>
+              <a:rPr lang="de-DE" dirty="0" smtClean="0"/>
+              <a:t>unendlich viele Echos entstehen</a:t>
+            </a:r>
+            <a:endParaRPr lang="en-US" dirty="0"/>
+          </a:p>
+        </p:txBody>
+      </p:sp>
+      <p:sp>
+        <p:nvSpPr>
+          <p:cNvPr id="4" name="Datumsplatzhalter 3"/>
+          <p:cNvSpPr>
+            <a:spLocks noGrp="1"/>
+          </p:cNvSpPr>
+          <p:nvPr>
+            <p:ph type="dt" sz="half" idx="10"/>
+          </p:nvPr>
+        </p:nvSpPr>
+        <p:spPr/>
+        <p:txBody>
+          <a:bodyPr/>
+          <a:lstStyle/>
+          <a:p>
+            <a:r>
+              <a:rPr lang="de-DE" smtClean="0"/>
+              <a:t>23.06.2015</a:t>
+            </a:r>
+            <a:endParaRPr lang="de-DE" dirty="0"/>
+          </a:p>
+        </p:txBody>
+      </p:sp>
+      <p:sp>
+        <p:nvSpPr>
+          <p:cNvPr id="5" name="Fußzeilenplatzhalter 4"/>
+          <p:cNvSpPr>
+            <a:spLocks noGrp="1"/>
+          </p:cNvSpPr>
+          <p:nvPr>
+            <p:ph type="ftr" sz="quarter" idx="11"/>
+          </p:nvPr>
+        </p:nvSpPr>
+        <p:spPr/>
+        <p:txBody>
+          <a:bodyPr/>
+          <a:lstStyle/>
+          <a:p>
+            <a:r>
+              <a:rPr lang="de-DE" smtClean="0"/>
+              <a:t>FM-Synthese</a:t>
+            </a:r>
+            <a:endParaRPr lang="de-DE" dirty="0"/>
+          </a:p>
+        </p:txBody>
+      </p:sp>
+      <p:sp>
+        <p:nvSpPr>
+          <p:cNvPr id="6" name="Foliennummernplatzhalter 5"/>
+          <p:cNvSpPr>
+            <a:spLocks noGrp="1"/>
+          </p:cNvSpPr>
+          <p:nvPr>
+            <p:ph type="sldNum" sz="quarter" idx="12"/>
+          </p:nvPr>
+        </p:nvSpPr>
+        <p:spPr/>
+        <p:txBody>
+          <a:bodyPr/>
+          <a:lstStyle/>
+          <a:p>
+            <a:fld id="{8740CB20-F870-467D-84CE-AB32061190A1}" type="slidenum">
+              <a:rPr lang="en-US" smtClean="0"/>
+              <a:t>19</a:t>
+            </a:fld>
+            <a:r>
+              <a:rPr lang="de-DE" smtClean="0"/>
+              <a:t>   </a:t>
+            </a:r>
+            <a:endParaRPr lang="de-DE" dirty="0"/>
+          </a:p>
+        </p:txBody>
+      </p:sp>
+      <p:pic>
+        <p:nvPicPr>
+          <p:cNvPr id="7" name="Grafik 6"/>
+          <p:cNvPicPr>
+            <a:picLocks noChangeAspect="1"/>
+          </p:cNvPicPr>
+          <p:nvPr/>
+        </p:nvPicPr>
+        <p:blipFill>
+          <a:blip r:embed="rId2"/>
+          <a:stretch>
+            <a:fillRect/>
+          </a:stretch>
+        </p:blipFill>
+        <p:spPr>
+          <a:xfrm>
+            <a:off x="2189792" y="2283718"/>
+            <a:ext cx="4779696" cy="2007168"/>
+          </a:xfrm>
+          <a:prstGeom prst="rect">
+            <a:avLst/>
+          </a:prstGeom>
+        </p:spPr>
+      </p:pic>
+      <p:sp>
+        <p:nvSpPr>
+          <p:cNvPr id="8" name="Textfeld 7"/>
+          <p:cNvSpPr txBox="1"/>
+          <p:nvPr/>
+        </p:nvSpPr>
+        <p:spPr>
+          <a:xfrm>
+            <a:off x="2189792" y="4290886"/>
+            <a:ext cx="5976664" cy="276999"/>
+          </a:xfrm>
+          <a:prstGeom prst="rect">
+            <a:avLst/>
+          </a:prstGeom>
+          <a:noFill/>
+        </p:spPr>
+        <p:txBody>
+          <a:bodyPr wrap="square" rtlCol="0">
+            <a:spAutoFit/>
+          </a:bodyPr>
+          <a:lstStyle/>
+          <a:p>
+            <a:r>
+              <a:rPr lang="de-DE" sz="1200" dirty="0" smtClean="0"/>
+              <a:t>Quelle: Computergestützte Audio und Videotechnik [Sto11]</a:t>
+            </a:r>
+            <a:endParaRPr lang="en-US" sz="1200" dirty="0"/>
+          </a:p>
+        </p:txBody>
+      </p:sp>
+    </p:spTree>
+    <p:extLst>
+      <p:ext uri="{BB962C8B-B14F-4D97-AF65-F5344CB8AC3E}">
+        <p14:creationId xmlns:p14="http://schemas.microsoft.com/office/powerpoint/2010/main" val="253928005"/>
+      </p:ext>
+    </p:extLst>
+  </p:cSld>
+  <p:clrMapOvr>
+    <a:masterClrMapping/>
+  </p:clrMapOvr>
+  <mc:AlternateContent xmlns:mc="http://schemas.openxmlformats.org/markup-compatibility/2006">
+    <mc:Choice xmlns:p14="http://schemas.microsoft.com/office/powerpoint/2010/main" Requires="p14">
+      <p:transition spd="med" p14:dur="700">
+        <p:fade/>
+      </p:transition>
+    </mc:Choice>
+    <mc:Fallback>
+      <p:transition spd="med">
+        <p:fade/>
+      </p:transition>
+    </mc:Fallback>
+  </mc:AlternateContent>
+  <p:timing>
+    <p:tnLst>
+      <p:par>
+        <p:cTn id="1" dur="indefinite" restart="never" nodeType="tmRoot">
+          <p:childTnLst>
+            <p:seq concurrent="1" nextAc="seek">
+              <p:cTn id="2" dur="indefinite" nodeType="mainSeq">
+                <p:childTnLst>
+                  <p:par>
+                    <p:cTn id="3" fill="hold">
+                      <p:stCondLst>
+                        <p:cond delay="indefinite"/>
+                      </p:stCondLst>
+                      <p:childTnLst>
+                        <p:par>
+                          <p:cTn id="4" fill="hold">
+                            <p:stCondLst>
+                              <p:cond delay="0"/>
+                            </p:stCondLst>
+                            <p:childTnLst>
+                              <p:par>
+                                <p:cTn id="5" presetID="10" presetClass="entr" presetSubtype="0" fill="hold" nodeType="clickEffect">
+                                  <p:stCondLst>
+                                    <p:cond delay="0"/>
+                                  </p:stCondLst>
+                                  <p:childTnLst>
+                                    <p:set>
+                                      <p:cBhvr>
+                                        <p:cTn id="6" dur="1" fill="hold">
+                                          <p:stCondLst>
+                                            <p:cond delay="0"/>
+                                          </p:stCondLst>
+                                        </p:cTn>
+                                        <p:tgtEl>
+                                          <p:spTgt spid="7"/>
+                                        </p:tgtEl>
+                                        <p:attrNameLst>
+                                          <p:attrName>style.visibility</p:attrName>
+                                        </p:attrNameLst>
+                                      </p:cBhvr>
+                                      <p:to>
+                                        <p:strVal val="visible"/>
+                                      </p:to>
+                                    </p:set>
+                                    <p:animEffect transition="in" filter="fade">
+                                      <p:cBhvr>
+                                        <p:cTn id="7" dur="500"/>
+                                        <p:tgtEl>
+                                          <p:spTgt spid="7"/>
+                                        </p:tgtEl>
+                                      </p:cBhvr>
+                                    </p:animEffect>
+                                  </p:childTnLst>
+                                </p:cTn>
+                              </p:par>
+                              <p:par>
+                                <p:cTn id="8" presetID="10" presetClass="entr" presetSubtype="0" fill="hold" grpId="0" nodeType="withEffect">
+                                  <p:stCondLst>
+                                    <p:cond delay="0"/>
+                                  </p:stCondLst>
+                                  <p:childTnLst>
+                                    <p:set>
+                                      <p:cBhvr>
+                                        <p:cTn id="9" dur="1" fill="hold">
+                                          <p:stCondLst>
+                                            <p:cond delay="0"/>
+                                          </p:stCondLst>
+                                        </p:cTn>
+                                        <p:tgtEl>
+                                          <p:spTgt spid="8"/>
+                                        </p:tgtEl>
+                                        <p:attrNameLst>
+                                          <p:attrName>style.visibility</p:attrName>
+                                        </p:attrNameLst>
+                                      </p:cBhvr>
+                                      <p:to>
+                                        <p:strVal val="visible"/>
+                                      </p:to>
+                                    </p:set>
+                                    <p:animEffect transition="in" filter="fade">
+                                      <p:cBhvr>
+                                        <p:cTn id="10" dur="500"/>
+                                        <p:tgtEl>
+                                          <p:spTgt spid="8"/>
+                                        </p:tgtEl>
+                                      </p:cBhvr>
+                                    </p:animEffect>
+                                  </p:childTnLst>
+                                </p:cTn>
+                              </p:par>
+                            </p:childTnLst>
+                          </p:cTn>
+                        </p:par>
+                      </p:childTnLst>
+                    </p:cTn>
+                  </p:par>
+                </p:childTnLst>
+              </p:cTn>
+              <p:prevCondLst>
+                <p:cond evt="onPrev" delay="0">
+                  <p:tgtEl>
+                    <p:sldTgt/>
+                  </p:tgtEl>
+                </p:cond>
+              </p:prevCondLst>
+              <p:nextCondLst>
+                <p:cond evt="onNext" delay="0">
+                  <p:tgtEl>
+                    <p:sldTgt/>
+                  </p:tgtEl>
+                </p:cond>
+              </p:nextCondLst>
+            </p:seq>
+          </p:childTnLst>
+        </p:cTn>
+      </p:par>
+    </p:tnLst>
+    <p:bldLst>
+      <p:bldP spid="8" grpId="0"/>
+    </p:bldLst>
+  </p:timing>
+</p:sld>
+</file>
+
+<file path=ppt/slides/slide2.xml><?xml version="1.0" encoding="utf-8"?>
+<p:sld xmlns:a="http://schemas.openxmlformats.org/drawingml/2006/main" xmlns:r="http://schemas.openxmlformats.org/officeDocument/2006/relationships" xmlns:p="http://schemas.openxmlformats.org/presentationml/2006/main">
+  <p:cSld>
+    <p:spTree>
+      <p:nvGrpSpPr>
+        <p:cNvPr id="1" name=""/>
+        <p:cNvGrpSpPr/>
+        <p:nvPr/>
+      </p:nvGrpSpPr>
+      <p:grpSpPr>
+        <a:xfrm>
+          <a:off x="0" y="0"/>
+          <a:ext cx="0" cy="0"/>
+          <a:chOff x="0" y="0"/>
+          <a:chExt cx="0" cy="0"/>
+        </a:xfrm>
+      </p:grpSpPr>
+      <p:sp>
+        <p:nvSpPr>
+          <p:cNvPr id="9" name="Titel 1"/>
+          <p:cNvSpPr>
+            <a:spLocks noGrp="1"/>
+          </p:cNvSpPr>
+          <p:nvPr>
+            <p:ph type="title"/>
+          </p:nvPr>
+        </p:nvSpPr>
+        <p:spPr/>
+        <p:txBody>
+          <a:bodyPr/>
+          <a:lstStyle/>
+          <a:p>
+            <a:r>
+              <a:rPr lang="de-DE" dirty="0" smtClean="0"/>
+              <a:t>Gliederung</a:t>
+            </a:r>
+            <a:endParaRPr lang="de-DE" dirty="0"/>
+          </a:p>
+        </p:txBody>
+      </p:sp>
+      <p:sp>
+        <p:nvSpPr>
+          <p:cNvPr id="10" name="Inhaltsplatzhalter 2"/>
+          <p:cNvSpPr txBox="1">
+            <a:spLocks/>
+          </p:cNvSpPr>
+          <p:nvPr/>
+        </p:nvSpPr>
+        <p:spPr>
+          <a:xfrm>
+            <a:off x="457200" y="1200151"/>
+            <a:ext cx="8229600" cy="3394472"/>
+          </a:xfrm>
+          <a:prstGeom prst="rect">
+            <a:avLst/>
+          </a:prstGeom>
+        </p:spPr>
+        <p:txBody>
+          <a:bodyPr vert="horz" lIns="91440" tIns="45720" rIns="91440" bIns="45720" rtlCol="0">
+            <a:normAutofit/>
+          </a:bodyPr>
+          <a:lstStyle>
+            <a:lvl1pPr marL="0" indent="0" algn="ctr" defTabSz="914400" rtl="0" eaLnBrk="1" latinLnBrk="0" hangingPunct="1">
+              <a:spcBef>
+                <a:spcPct val="20000"/>
+              </a:spcBef>
+              <a:buFont typeface="Arial" pitchFamily="34" charset="0"/>
+              <a:buNone/>
+              <a:defRPr sz="2800" kern="1200">
+                <a:solidFill>
+                  <a:schemeClr val="tx1">
+                    <a:tint val="75000"/>
+                  </a:schemeClr>
+                </a:solidFill>
+                <a:latin typeface="Lato" panose="020F0502020204030203" pitchFamily="34" charset="0"/>
+                <a:ea typeface="+mn-ea"/>
+                <a:cs typeface="+mn-cs"/>
+              </a:defRPr>
+            </a:lvl1pPr>
+            <a:lvl2pPr marL="457200" indent="0" algn="ctr" defTabSz="914400" rtl="0" eaLnBrk="1" latinLnBrk="0" hangingPunct="1">
+              <a:spcBef>
+                <a:spcPct val="20000"/>
+              </a:spcBef>
+              <a:buFont typeface="Arial" pitchFamily="34" charset="0"/>
+              <a:buNone/>
+              <a:defRPr sz="2000" kern="1200">
+                <a:solidFill>
+                  <a:schemeClr val="tx1">
+                    <a:tint val="75000"/>
+                  </a:schemeClr>
+                </a:solidFill>
+                <a:latin typeface="Lato" panose="020F0502020204030203" pitchFamily="34" charset="0"/>
+                <a:ea typeface="+mn-ea"/>
+                <a:cs typeface="+mn-cs"/>
+              </a:defRPr>
+            </a:lvl2pPr>
+            <a:lvl3pPr marL="914400" indent="0" algn="ctr" defTabSz="914400" rtl="0" eaLnBrk="1" latinLnBrk="0" hangingPunct="1">
+              <a:spcBef>
+                <a:spcPct val="20000"/>
+              </a:spcBef>
+              <a:buFont typeface="Arial" pitchFamily="34" charset="0"/>
+              <a:buNone/>
+              <a:defRPr sz="1600" kern="1200">
+                <a:solidFill>
+                  <a:schemeClr val="tx1">
+                    <a:tint val="75000"/>
+                  </a:schemeClr>
+                </a:solidFill>
+                <a:latin typeface="Lato" panose="020F0502020204030203" pitchFamily="34" charset="0"/>
+                <a:ea typeface="+mn-ea"/>
+                <a:cs typeface="+mn-cs"/>
+              </a:defRPr>
+            </a:lvl3pPr>
+            <a:lvl4pPr marL="1371600" indent="0" algn="ctr" defTabSz="914400" rtl="0" eaLnBrk="1" latinLnBrk="0" hangingPunct="1">
+              <a:spcBef>
+                <a:spcPct val="20000"/>
+              </a:spcBef>
+              <a:buFont typeface="Arial" pitchFamily="34" charset="0"/>
+              <a:buNone/>
+              <a:defRPr sz="1400" kern="1200">
+                <a:solidFill>
+                  <a:schemeClr val="tx1">
+                    <a:tint val="75000"/>
+                  </a:schemeClr>
+                </a:solidFill>
+                <a:latin typeface="Lato" panose="020F0502020204030203" pitchFamily="34" charset="0"/>
+                <a:ea typeface="+mn-ea"/>
+                <a:cs typeface="+mn-cs"/>
+              </a:defRPr>
+            </a:lvl4pPr>
+            <a:lvl5pPr marL="1828800" indent="0" algn="ctr" defTabSz="914400" rtl="0" eaLnBrk="1" latinLnBrk="0" hangingPunct="1">
+              <a:spcBef>
+                <a:spcPct val="20000"/>
+              </a:spcBef>
+              <a:buFont typeface="Arial" pitchFamily="34" charset="0"/>
+              <a:buNone/>
+              <a:defRPr sz="1400" kern="1200">
+                <a:solidFill>
+                  <a:schemeClr val="tx1">
+                    <a:tint val="75000"/>
+                  </a:schemeClr>
+                </a:solidFill>
+                <a:latin typeface="Lato" panose="020F0502020204030203" pitchFamily="34" charset="0"/>
+                <a:ea typeface="+mn-ea"/>
+                <a:cs typeface="+mn-cs"/>
+              </a:defRPr>
+            </a:lvl5pPr>
+            <a:lvl6pPr marL="2286000" indent="0" algn="ctr" defTabSz="914400" rtl="0" eaLnBrk="1" latinLnBrk="0" hangingPunct="1">
+              <a:spcBef>
+                <a:spcPct val="20000"/>
+              </a:spcBef>
+              <a:buFont typeface="Arial" pitchFamily="34" charset="0"/>
+              <a:buNone/>
+              <a:defRPr sz="2000" kern="1200">
+                <a:solidFill>
+                  <a:schemeClr val="tx1">
+                    <a:tint val="75000"/>
+                  </a:schemeClr>
+                </a:solidFill>
+                <a:latin typeface="+mn-lt"/>
+                <a:ea typeface="+mn-ea"/>
+                <a:cs typeface="+mn-cs"/>
+              </a:defRPr>
+            </a:lvl6pPr>
+            <a:lvl7pPr marL="2743200" indent="0" algn="ctr" defTabSz="914400" rtl="0" eaLnBrk="1" latinLnBrk="0" hangingPunct="1">
+              <a:spcBef>
+                <a:spcPct val="20000"/>
+              </a:spcBef>
+              <a:buFont typeface="Arial" pitchFamily="34" charset="0"/>
+              <a:buNone/>
+              <a:defRPr sz="2000" kern="1200">
+                <a:solidFill>
+                  <a:schemeClr val="tx1">
+                    <a:tint val="75000"/>
+                  </a:schemeClr>
+                </a:solidFill>
+                <a:latin typeface="+mn-lt"/>
+                <a:ea typeface="+mn-ea"/>
+                <a:cs typeface="+mn-cs"/>
+              </a:defRPr>
+            </a:lvl7pPr>
+            <a:lvl8pPr marL="3200400" indent="0" algn="ctr" defTabSz="914400" rtl="0" eaLnBrk="1" latinLnBrk="0" hangingPunct="1">
+              <a:spcBef>
+                <a:spcPct val="20000"/>
+              </a:spcBef>
+              <a:buFont typeface="Arial" pitchFamily="34" charset="0"/>
+              <a:buNone/>
+              <a:defRPr sz="2000" kern="1200">
+                <a:solidFill>
+                  <a:schemeClr val="tx1">
+                    <a:tint val="75000"/>
+                  </a:schemeClr>
+                </a:solidFill>
+                <a:latin typeface="+mn-lt"/>
+                <a:ea typeface="+mn-ea"/>
+                <a:cs typeface="+mn-cs"/>
+              </a:defRPr>
+            </a:lvl8pPr>
+            <a:lvl9pPr marL="3657600" indent="0" algn="ctr" defTabSz="914400" rtl="0" eaLnBrk="1" latinLnBrk="0" hangingPunct="1">
+              <a:spcBef>
+                <a:spcPct val="20000"/>
+              </a:spcBef>
+              <a:buFont typeface="Arial" pitchFamily="34" charset="0"/>
+              <a:buNone/>
+              <a:defRPr sz="2000" kern="1200">
+                <a:solidFill>
+                  <a:schemeClr val="tx1">
+                    <a:tint val="75000"/>
+                  </a:schemeClr>
+                </a:solidFill>
+                <a:latin typeface="+mn-lt"/>
+                <a:ea typeface="+mn-ea"/>
+                <a:cs typeface="+mn-cs"/>
+              </a:defRPr>
+            </a:lvl9pPr>
+          </a:lstStyle>
+          <a:p>
+            <a:pPr marL="457200" indent="-457200" algn="l">
+              <a:buFont typeface="Arial" panose="020B0604020202020204" pitchFamily="34" charset="0"/>
+              <a:buChar char="•"/>
+            </a:pPr>
+            <a:r>
+              <a:rPr lang="de-DE" dirty="0" smtClean="0">
+                <a:solidFill>
+                  <a:schemeClr val="tx1"/>
+                </a:solidFill>
+              </a:rPr>
+              <a:t>Tonnachbildung Theorie</a:t>
+            </a:r>
+          </a:p>
+          <a:p>
+            <a:pPr marL="457200" indent="-457200" algn="l">
+              <a:buFont typeface="Arial" panose="020B0604020202020204" pitchFamily="34" charset="0"/>
+              <a:buChar char="•"/>
+            </a:pPr>
+            <a:r>
+              <a:rPr lang="de-DE" dirty="0" smtClean="0">
+                <a:solidFill>
+                  <a:schemeClr val="tx1"/>
+                </a:solidFill>
+              </a:rPr>
+              <a:t>Tonnachbildung Praxis</a:t>
+            </a:r>
+            <a:endParaRPr lang="de-DE" dirty="0">
+              <a:solidFill>
+                <a:schemeClr val="tx1"/>
+              </a:solidFill>
+            </a:endParaRPr>
+          </a:p>
+          <a:p>
+            <a:pPr marL="457200" indent="-457200" algn="l">
+              <a:buFont typeface="Arial" panose="020B0604020202020204" pitchFamily="34" charset="0"/>
+              <a:buChar char="•"/>
+            </a:pPr>
+            <a:r>
+              <a:rPr lang="de-DE" dirty="0" smtClean="0">
+                <a:solidFill>
+                  <a:schemeClr val="tx1"/>
+                </a:solidFill>
+              </a:rPr>
+              <a:t>FM-Synthesizer in C++</a:t>
+            </a:r>
+            <a:endParaRPr lang="de-DE" dirty="0">
+              <a:solidFill>
+                <a:schemeClr val="tx1"/>
+              </a:solidFill>
+            </a:endParaRPr>
+          </a:p>
+        </p:txBody>
+      </p:sp>
+      <p:sp>
+        <p:nvSpPr>
+          <p:cNvPr id="3" name="Datumsplatzhalter 2"/>
+          <p:cNvSpPr>
+            <a:spLocks noGrp="1"/>
+          </p:cNvSpPr>
+          <p:nvPr>
+            <p:ph type="dt" sz="half" idx="10"/>
+          </p:nvPr>
+        </p:nvSpPr>
+        <p:spPr/>
+        <p:txBody>
+          <a:bodyPr/>
+          <a:lstStyle/>
+          <a:p>
+            <a:r>
+              <a:rPr lang="de-DE" smtClean="0"/>
+              <a:t>23.06.2015</a:t>
+            </a:r>
+            <a:endParaRPr lang="de-DE" dirty="0"/>
+          </a:p>
+        </p:txBody>
+      </p:sp>
+      <p:sp>
+        <p:nvSpPr>
+          <p:cNvPr id="4" name="Fußzeilenplatzhalter 3"/>
+          <p:cNvSpPr>
+            <a:spLocks noGrp="1"/>
+          </p:cNvSpPr>
+          <p:nvPr>
+            <p:ph type="ftr" sz="quarter" idx="11"/>
+          </p:nvPr>
+        </p:nvSpPr>
+        <p:spPr/>
+        <p:txBody>
+          <a:bodyPr/>
+          <a:lstStyle/>
+          <a:p>
+            <a:r>
+              <a:rPr lang="de-DE" smtClean="0"/>
+              <a:t>FM-Synthese</a:t>
+            </a:r>
+            <a:endParaRPr lang="de-DE" dirty="0"/>
+          </a:p>
+        </p:txBody>
+      </p:sp>
+      <p:sp>
+        <p:nvSpPr>
+          <p:cNvPr id="5" name="Foliennummernplatzhalter 4"/>
+          <p:cNvSpPr>
+            <a:spLocks noGrp="1"/>
+          </p:cNvSpPr>
+          <p:nvPr>
+            <p:ph type="sldNum" sz="quarter" idx="12"/>
+          </p:nvPr>
+        </p:nvSpPr>
+        <p:spPr/>
+        <p:txBody>
+          <a:bodyPr/>
+          <a:lstStyle/>
+          <a:p>
+            <a:fld id="{8740CB20-F870-467D-84CE-AB32061190A1}" type="slidenum">
+              <a:rPr lang="en-US" smtClean="0"/>
+              <a:t>2</a:t>
+            </a:fld>
+            <a:r>
+              <a:rPr lang="de-DE" smtClean="0"/>
+              <a:t>   </a:t>
+            </a:r>
+            <a:endParaRPr lang="de-DE" dirty="0"/>
+          </a:p>
+        </p:txBody>
+      </p:sp>
+    </p:spTree>
+  </p:cSld>
+  <p:clrMapOvr>
+    <a:masterClrMapping/>
+  </p:clrMapOvr>
+  <mc:AlternateContent xmlns:mc="http://schemas.openxmlformats.org/markup-compatibility/2006" xmlns:p14="http://schemas.microsoft.com/office/powerpoint/2010/main">
+    <mc:Choice Requires="p14">
+      <p:transition spd="med" p14:dur="700">
+        <p:fade/>
+      </p:transition>
+    </mc:Choice>
+    <mc:Fallback xmlns="">
+      <p:transition spd="med">
+        <p:fade/>
+      </p:transition>
+    </mc:Fallback>
+  </mc:AlternateContent>
+  <p:timing>
+    <p:tnLst>
+      <p:par>
+        <p:cTn id="1" dur="indefinite" restart="never" nodeType="tmRoot"/>
+      </p:par>
+    </p:tnLst>
+  </p:timing>
+</p:sld>
+</file>
+
 <file path=ppt/slides/slide3.xml><?xml version="1.0" encoding="utf-8"?>
 <p:sld xmlns:a="http://schemas.openxmlformats.org/drawingml/2006/main" xmlns:r="http://schemas.openxmlformats.org/officeDocument/2006/relationships" xmlns:p="http://schemas.openxmlformats.org/presentationml/2006/main">
   <p:cSld>
@@ -8486,10 +7500,10 @@
           <a:bodyPr/>
           <a:lstStyle/>
           <a:p>
-            <a:fld id="{D63A8337-BE16-45CB-AB94-830A8AFD22E2}" type="datetime1">
+            <a:r>
               <a:rPr lang="de-DE" smtClean="0"/>
-              <a:t>20.06.2015</a:t>
-            </a:fld>
+              <a:t>23.06.2015</a:t>
+            </a:r>
             <a:endParaRPr lang="de-DE"/>
           </a:p>
         </p:txBody>
@@ -8661,10 +7675,10 @@
           <a:bodyPr/>
           <a:lstStyle/>
           <a:p>
-            <a:fld id="{C80D71F6-99A2-4718-B360-65885A8D0927}" type="datetime1">
+            <a:r>
               <a:rPr lang="de-DE" smtClean="0"/>
-              <a:t>21.06.2015</a:t>
-            </a:fld>
+              <a:t>23.06.2015</a:t>
+            </a:r>
             <a:endParaRPr lang="de-DE"/>
           </a:p>
         </p:txBody>
@@ -8755,13 +7769,13 @@
   <p:clrMapOvr>
     <a:masterClrMapping/>
   </p:clrMapOvr>
-  <mc:AlternateContent xmlns:mc="http://schemas.openxmlformats.org/markup-compatibility/2006">
-    <mc:Choice xmlns:p14="http://schemas.microsoft.com/office/powerpoint/2010/main" Requires="p14">
+  <mc:AlternateContent xmlns:mc="http://schemas.openxmlformats.org/markup-compatibility/2006" xmlns:p14="http://schemas.microsoft.com/office/powerpoint/2010/main">
+    <mc:Choice Requires="p14">
       <p:transition spd="med" p14:dur="700">
         <p:fade/>
       </p:transition>
     </mc:Choice>
-    <mc:Fallback>
+    <mc:Fallback xmlns="">
       <p:transition spd="med">
         <p:fade/>
       </p:transition>
@@ -8986,10 +8000,10 @@
           <a:bodyPr/>
           <a:lstStyle/>
           <a:p>
-            <a:fld id="{296000BE-0612-4D88-A1AC-FF1287139C2E}" type="datetime1">
+            <a:r>
               <a:rPr lang="de-DE" smtClean="0"/>
-              <a:t>20.06.2015</a:t>
-            </a:fld>
+              <a:t>23.06.2015</a:t>
+            </a:r>
             <a:endParaRPr lang="de-DE" dirty="0"/>
           </a:p>
         </p:txBody>
@@ -9923,10 +8937,10 @@
           <a:bodyPr/>
           <a:lstStyle/>
           <a:p>
-            <a:fld id="{296000BE-0612-4D88-A1AC-FF1287139C2E}" type="datetime1">
+            <a:r>
               <a:rPr lang="de-DE" smtClean="0"/>
-              <a:t>20.06.2015</a:t>
-            </a:fld>
+              <a:t>23.06.2015</a:t>
+            </a:r>
             <a:endParaRPr lang="de-DE" dirty="0"/>
           </a:p>
         </p:txBody>
@@ -10386,10 +9400,10 @@
           <a:bodyPr/>
           <a:lstStyle/>
           <a:p>
-            <a:fld id="{296000BE-0612-4D88-A1AC-FF1287139C2E}" type="datetime1">
+            <a:r>
               <a:rPr lang="de-DE" smtClean="0"/>
-              <a:t>20.06.2015</a:t>
-            </a:fld>
+              <a:t>23.06.2015</a:t>
+            </a:r>
             <a:endParaRPr lang="de-DE" dirty="0"/>
           </a:p>
         </p:txBody>
@@ -11092,10 +10106,10 @@
           <a:bodyPr/>
           <a:lstStyle/>
           <a:p>
-            <a:fld id="{296000BE-0612-4D88-A1AC-FF1287139C2E}" type="datetime1">
+            <a:r>
               <a:rPr lang="de-DE" smtClean="0"/>
-              <a:t>20.06.2015</a:t>
-            </a:fld>
+              <a:t>23.06.2015</a:t>
+            </a:r>
             <a:endParaRPr lang="de-DE" dirty="0"/>
           </a:p>
         </p:txBody>
@@ -11337,10 +10351,10 @@
           <a:bodyPr/>
           <a:lstStyle/>
           <a:p>
-            <a:fld id="{296000BE-0612-4D88-A1AC-FF1287139C2E}" type="datetime1">
+            <a:r>
               <a:rPr lang="de-DE" smtClean="0"/>
-              <a:t>20.06.2015</a:t>
-            </a:fld>
+              <a:t>23.06.2015</a:t>
+            </a:r>
             <a:endParaRPr lang="de-DE" dirty="0"/>
           </a:p>
         </p:txBody>

</xml_diff>